<commit_message>
finish demo 1 outline
</commit_message>
<xml_diff>
--- a/Brent-Hiram-BackToBasicsAnalyticsForActuaries_format.pptx
+++ b/Brent-Hiram-BackToBasicsAnalyticsForActuaries_format.pptx
@@ -5,10 +5,10 @@
     <p:sldMasterId id="2147483660" r:id="rId1"/>
   </p:sldMasterIdLst>
   <p:notesMasterIdLst>
-    <p:notesMasterId r:id="rId25"/>
+    <p:notesMasterId r:id="rId26"/>
   </p:notesMasterIdLst>
   <p:handoutMasterIdLst>
-    <p:handoutMasterId r:id="rId26"/>
+    <p:handoutMasterId r:id="rId27"/>
   </p:handoutMasterIdLst>
   <p:sldIdLst>
     <p:sldId id="256" r:id="rId2"/>
@@ -25,15 +25,16 @@
     <p:sldId id="290" r:id="rId13"/>
     <p:sldId id="291" r:id="rId14"/>
     <p:sldId id="292" r:id="rId15"/>
-    <p:sldId id="288" r:id="rId16"/>
-    <p:sldId id="282" r:id="rId17"/>
-    <p:sldId id="283" r:id="rId18"/>
-    <p:sldId id="284" r:id="rId19"/>
-    <p:sldId id="286" r:id="rId20"/>
-    <p:sldId id="279" r:id="rId21"/>
-    <p:sldId id="287" r:id="rId22"/>
-    <p:sldId id="270" r:id="rId23"/>
-    <p:sldId id="269" r:id="rId24"/>
+    <p:sldId id="293" r:id="rId16"/>
+    <p:sldId id="288" r:id="rId17"/>
+    <p:sldId id="282" r:id="rId18"/>
+    <p:sldId id="283" r:id="rId19"/>
+    <p:sldId id="284" r:id="rId20"/>
+    <p:sldId id="286" r:id="rId21"/>
+    <p:sldId id="279" r:id="rId22"/>
+    <p:sldId id="287" r:id="rId23"/>
+    <p:sldId id="270" r:id="rId24"/>
+    <p:sldId id="269" r:id="rId25"/>
   </p:sldIdLst>
   <p:sldSz cx="12192000" cy="6858000"/>
   <p:notesSz cx="6858000" cy="9144000"/>
@@ -6621,15 +6622,7 @@
                   <a:schemeClr val="bg1"/>
                 </a:solidFill>
               </a:rPr>
-              <a:t>Intelligent R &amp; </a:t>
-            </a:r>
-            <a:r>
-              <a:rPr lang="en-US" dirty="0" smtClean="0">
-                <a:solidFill>
-                  <a:schemeClr val="bg1"/>
-                </a:solidFill>
-              </a:rPr>
-              <a:t>SQL</a:t>
+              <a:t>Intelligent R &amp; SQL</a:t>
             </a:r>
           </a:p>
           <a:p>
@@ -6676,11 +6669,6 @@
               </a:rPr>
               <a:t>R in the database &amp; Azure Data Studio</a:t>
             </a:r>
-            <a:endParaRPr lang="en-US" dirty="0" smtClean="0">
-              <a:solidFill>
-                <a:schemeClr val="bg1"/>
-              </a:solidFill>
-            </a:endParaRPr>
           </a:p>
           <a:p>
             <a:pPr marL="0" indent="0">
@@ -6801,7 +6789,7 @@
                 <a14:useLocalDpi xmlns:a14="http://schemas.microsoft.com/office/drawing/2010/main"/>
               </a:ext>
               <a:ext uri="{96DAC541-7B7A-43D3-8B79-37D633B846F1}">
-                <asvg:svgBlip xmlns:asvg="http://schemas.microsoft.com/office/drawing/2016/SVG/main" xmlns="" r:embed="rId5"/>
+                <asvg:svgBlip xmlns="" xmlns:asvg="http://schemas.microsoft.com/office/drawing/2016/SVG/main" r:embed="rId5"/>
               </a:ext>
             </a:extLst>
           </a:blip>
@@ -7039,7 +7027,7 @@
                 <a14:useLocalDpi xmlns:a14="http://schemas.microsoft.com/office/drawing/2010/main"/>
               </a:ext>
               <a:ext uri="{96DAC541-7B7A-43D3-8B79-37D633B846F1}">
-                <asvg:svgBlip xmlns:asvg="http://schemas.microsoft.com/office/drawing/2016/SVG/main" xmlns="" r:embed="rId7"/>
+                <asvg:svgBlip xmlns="" xmlns:asvg="http://schemas.microsoft.com/office/drawing/2016/SVG/main" r:embed="rId7"/>
               </a:ext>
             </a:extLst>
           </a:blip>
@@ -7174,30 +7162,6 @@
             </a:p>
           </p:txBody>
         </p:sp>
-        <p:pic>
-          <p:nvPicPr>
-            <p:cNvPr id="5" name="Picture 4"/>
-            <p:cNvPicPr>
-              <a:picLocks noChangeAspect="1"/>
-            </p:cNvPicPr>
-            <p:nvPr/>
-          </p:nvPicPr>
-          <p:blipFill>
-            <a:blip r:embed="rId2"/>
-            <a:stretch>
-              <a:fillRect/>
-            </a:stretch>
-          </p:blipFill>
-          <p:spPr>
-            <a:xfrm>
-              <a:off x="2501544" y="1749280"/>
-              <a:ext cx="771525" cy="857250"/>
-            </a:xfrm>
-            <a:prstGeom prst="rect">
-              <a:avLst/>
-            </a:prstGeom>
-          </p:spPr>
-        </p:pic>
         <p:sp>
           <p:nvSpPr>
             <p:cNvPr id="7" name="Rectangle 6"/>
@@ -7234,9 +7198,7 @@
         <p:cxnSp>
           <p:nvCxnSpPr>
             <p:cNvPr id="15" name="Straight Arrow Connector 14"/>
-            <p:cNvCxnSpPr>
-              <a:stCxn id="5" idx="2"/>
-            </p:cNvCxnSpPr>
+            <p:cNvCxnSpPr/>
             <p:nvPr/>
           </p:nvCxnSpPr>
           <p:spPr>
@@ -7620,7 +7582,7 @@
             <p:nvPr/>
           </p:nvPicPr>
           <p:blipFill>
-            <a:blip r:embed="rId3"/>
+            <a:blip r:embed="rId2"/>
             <a:stretch>
               <a:fillRect/>
             </a:stretch>
@@ -7983,7 +7945,7 @@
             <p:nvPr/>
           </p:nvPicPr>
           <p:blipFill>
-            <a:blip r:embed="rId4"/>
+            <a:blip r:embed="rId3"/>
             <a:stretch>
               <a:fillRect/>
             </a:stretch>
@@ -8007,7 +7969,7 @@
             <p:nvPr/>
           </p:nvPicPr>
           <p:blipFill>
-            <a:blip r:embed="rId5"/>
+            <a:blip r:embed="rId4"/>
             <a:stretch>
               <a:fillRect/>
             </a:stretch>
@@ -8277,7 +8239,7 @@
             <p:nvPr/>
           </p:nvPicPr>
           <p:blipFill>
-            <a:blip r:embed="rId6" cstate="print">
+            <a:blip r:embed="rId5" cstate="print">
               <a:extLst>
                 <a:ext uri="{28A0092B-C50C-407E-A947-70E740481C1C}">
                   <a14:useLocalDpi xmlns:a14="http://schemas.microsoft.com/office/drawing/2010/main" val="0"/>
@@ -8339,6 +8301,30 @@
           </p:txBody>
         </p:sp>
       </p:grpSp>
+      <p:pic>
+        <p:nvPicPr>
+          <p:cNvPr id="2" name="Picture 1"/>
+          <p:cNvPicPr>
+            <a:picLocks noChangeAspect="1"/>
+          </p:cNvPicPr>
+          <p:nvPr/>
+        </p:nvPicPr>
+        <p:blipFill>
+          <a:blip r:embed="rId6"/>
+          <a:stretch>
+            <a:fillRect/>
+          </a:stretch>
+        </p:blipFill>
+        <p:spPr>
+          <a:xfrm>
+            <a:off x="2539644" y="1809116"/>
+            <a:ext cx="695325" cy="600075"/>
+          </a:xfrm>
+          <a:prstGeom prst="rect">
+            <a:avLst/>
+          </a:prstGeom>
+        </p:spPr>
+      </p:pic>
     </p:spTree>
     <p:extLst>
       <p:ext uri="{BB962C8B-B14F-4D97-AF65-F5344CB8AC3E}">
@@ -9196,8 +9182,8 @@
         </p:nvSpPr>
         <p:spPr>
           <a:xfrm>
-            <a:off x="6436596" y="1401417"/>
-            <a:ext cx="5426765" cy="4651511"/>
+            <a:off x="6436596" y="2507092"/>
+            <a:ext cx="5426765" cy="3545836"/>
           </a:xfrm>
           <a:prstGeom prst="rect">
             <a:avLst/>
@@ -9382,54 +9368,6 @@
           </a:fontRef>
         </p:style>
       </p:cxnSp>
-      <p:pic>
-        <p:nvPicPr>
-          <p:cNvPr id="69" name="Picture 68"/>
-          <p:cNvPicPr>
-            <a:picLocks noChangeAspect="1"/>
-          </p:cNvPicPr>
-          <p:nvPr/>
-        </p:nvPicPr>
-        <p:blipFill>
-          <a:blip r:embed="rId2"/>
-          <a:stretch>
-            <a:fillRect/>
-          </a:stretch>
-        </p:blipFill>
-        <p:spPr>
-          <a:xfrm>
-            <a:off x="8881188" y="2330729"/>
-            <a:ext cx="771525" cy="757748"/>
-          </a:xfrm>
-          <a:prstGeom prst="rect">
-            <a:avLst/>
-          </a:prstGeom>
-        </p:spPr>
-      </p:pic>
-      <p:pic>
-        <p:nvPicPr>
-          <p:cNvPr id="70" name="Picture 69"/>
-          <p:cNvPicPr>
-            <a:picLocks noChangeAspect="1"/>
-          </p:cNvPicPr>
-          <p:nvPr/>
-        </p:nvPicPr>
-        <p:blipFill>
-          <a:blip r:embed="rId3"/>
-          <a:stretch>
-            <a:fillRect/>
-          </a:stretch>
-        </p:blipFill>
-        <p:spPr>
-          <a:xfrm>
-            <a:off x="7061696" y="2512499"/>
-            <a:ext cx="399202" cy="514356"/>
-          </a:xfrm>
-          <a:prstGeom prst="rect">
-            <a:avLst/>
-          </a:prstGeom>
-        </p:spPr>
-      </p:pic>
       <p:sp>
         <p:nvSpPr>
           <p:cNvPr id="71" name="TextBox 70"/>
@@ -9468,7 +9406,7 @@
         </p:nvSpPr>
         <p:spPr>
           <a:xfrm>
-            <a:off x="6455440" y="1401417"/>
+            <a:off x="6433920" y="2523279"/>
             <a:ext cx="1858618" cy="369332"/>
           </a:xfrm>
           <a:prstGeom prst="rect">
@@ -9492,16 +9430,14 @@
       </p:sp>
       <p:cxnSp>
         <p:nvCxnSpPr>
-          <p:cNvPr id="73" name="Straight Arrow Connector 72"/>
-          <p:cNvCxnSpPr>
-            <a:stCxn id="70" idx="3"/>
-          </p:cNvCxnSpPr>
+          <p:cNvPr id="85" name="Straight Arrow Connector 84"/>
+          <p:cNvCxnSpPr/>
           <p:nvPr/>
         </p:nvCxnSpPr>
         <p:spPr>
           <a:xfrm>
-            <a:off x="7460898" y="2769677"/>
-            <a:ext cx="1186145" cy="0"/>
+            <a:off x="10451467" y="3871609"/>
+            <a:ext cx="0" cy="499253"/>
           </a:xfrm>
           <a:prstGeom prst="straightConnector1">
             <a:avLst/>
@@ -9528,101 +9464,315 @@
           </a:fontRef>
         </p:style>
       </p:cxnSp>
+      <p:grpSp>
+        <p:nvGrpSpPr>
+          <p:cNvPr id="3" name="Group 2"/>
+          <p:cNvGrpSpPr/>
+          <p:nvPr/>
+        </p:nvGrpSpPr>
+        <p:grpSpPr>
+          <a:xfrm>
+            <a:off x="6443115" y="2613748"/>
+            <a:ext cx="4889608" cy="1537031"/>
+            <a:chOff x="6443115" y="1816077"/>
+            <a:chExt cx="4889608" cy="1537031"/>
+          </a:xfrm>
+        </p:grpSpPr>
+        <p:pic>
+          <p:nvPicPr>
+            <p:cNvPr id="69" name="Picture 68"/>
+            <p:cNvPicPr>
+              <a:picLocks noChangeAspect="1"/>
+            </p:cNvPicPr>
+            <p:nvPr/>
+          </p:nvPicPr>
+          <p:blipFill>
+            <a:blip r:embed="rId2"/>
+            <a:stretch>
+              <a:fillRect/>
+            </a:stretch>
+          </p:blipFill>
+          <p:spPr>
+            <a:xfrm>
+              <a:off x="8881188" y="2330729"/>
+              <a:ext cx="771525" cy="757748"/>
+            </a:xfrm>
+            <a:prstGeom prst="rect">
+              <a:avLst/>
+            </a:prstGeom>
+          </p:spPr>
+        </p:pic>
+        <p:pic>
+          <p:nvPicPr>
+            <p:cNvPr id="70" name="Picture 69"/>
+            <p:cNvPicPr>
+              <a:picLocks noChangeAspect="1"/>
+            </p:cNvPicPr>
+            <p:nvPr/>
+          </p:nvPicPr>
+          <p:blipFill>
+            <a:blip r:embed="rId3"/>
+            <a:stretch>
+              <a:fillRect/>
+            </a:stretch>
+          </p:blipFill>
+          <p:spPr>
+            <a:xfrm>
+              <a:off x="7090879" y="2512499"/>
+              <a:ext cx="399202" cy="514356"/>
+            </a:xfrm>
+            <a:prstGeom prst="rect">
+              <a:avLst/>
+            </a:prstGeom>
+          </p:spPr>
+        </p:pic>
+        <p:cxnSp>
+          <p:nvCxnSpPr>
+            <p:cNvPr id="73" name="Straight Arrow Connector 72"/>
+            <p:cNvCxnSpPr>
+              <a:stCxn id="70" idx="3"/>
+            </p:cNvCxnSpPr>
+            <p:nvPr/>
+          </p:nvCxnSpPr>
+          <p:spPr>
+            <a:xfrm>
+              <a:off x="7490081" y="2769677"/>
+              <a:ext cx="1186145" cy="0"/>
+            </a:xfrm>
+            <a:prstGeom prst="straightConnector1">
+              <a:avLst/>
+            </a:prstGeom>
+            <a:ln>
+              <a:solidFill>
+                <a:schemeClr val="tx1"/>
+              </a:solidFill>
+              <a:tailEnd type="triangle"/>
+            </a:ln>
+          </p:spPr>
+          <p:style>
+            <a:lnRef idx="1">
+              <a:schemeClr val="accent1"/>
+            </a:lnRef>
+            <a:fillRef idx="0">
+              <a:schemeClr val="accent1"/>
+            </a:fillRef>
+            <a:effectRef idx="0">
+              <a:schemeClr val="accent1"/>
+            </a:effectRef>
+            <a:fontRef idx="minor">
+              <a:schemeClr val="tx1"/>
+            </a:fontRef>
+          </p:style>
+        </p:cxnSp>
+        <p:sp>
+          <p:nvSpPr>
+            <p:cNvPr id="75" name="Rectangle 74"/>
+            <p:cNvSpPr/>
+            <p:nvPr/>
+          </p:nvSpPr>
+          <p:spPr>
+            <a:xfrm>
+              <a:off x="7731023" y="2480550"/>
+              <a:ext cx="804276" cy="227395"/>
+            </a:xfrm>
+            <a:prstGeom prst="rect">
+              <a:avLst/>
+            </a:prstGeom>
+            <a:noFill/>
+            <a:ln w="9525">
+              <a:noFill/>
+            </a:ln>
+          </p:spPr>
+          <p:style>
+            <a:lnRef idx="2">
+              <a:schemeClr val="accent1">
+                <a:shade val="50000"/>
+              </a:schemeClr>
+            </a:lnRef>
+            <a:fillRef idx="1">
+              <a:schemeClr val="accent1"/>
+            </a:fillRef>
+            <a:effectRef idx="0">
+              <a:schemeClr val="accent1"/>
+            </a:effectRef>
+            <a:fontRef idx="minor">
+              <a:schemeClr val="lt1"/>
+            </a:fontRef>
+          </p:style>
+          <p:txBody>
+            <a:bodyPr rtlCol="0" anchor="ctr"/>
+            <a:lstStyle/>
+            <a:p>
+              <a:pPr algn="ctr"/>
+              <a:r>
+                <a:rPr lang="en-GB" sz="1200" dirty="0" smtClean="0">
+                  <a:solidFill>
+                    <a:schemeClr val="tx1"/>
+                  </a:solidFill>
+                </a:rPr>
+                <a:t>Memory</a:t>
+              </a:r>
+              <a:endParaRPr lang="en-GB" sz="1200" dirty="0">
+                <a:solidFill>
+                  <a:schemeClr val="tx1"/>
+                </a:solidFill>
+              </a:endParaRPr>
+            </a:p>
+          </p:txBody>
+        </p:sp>
+        <p:sp>
+          <p:nvSpPr>
+            <p:cNvPr id="80" name="Rectangle 79"/>
+            <p:cNvSpPr/>
+            <p:nvPr/>
+          </p:nvSpPr>
+          <p:spPr>
+            <a:xfrm>
+              <a:off x="6443115" y="3076109"/>
+              <a:ext cx="2203232" cy="276999"/>
+            </a:xfrm>
+            <a:prstGeom prst="rect">
+              <a:avLst/>
+            </a:prstGeom>
+          </p:spPr>
+          <p:txBody>
+            <a:bodyPr wrap="none">
+              <a:spAutoFit/>
+            </a:bodyPr>
+            <a:lstStyle/>
+            <a:p>
+              <a:r>
+                <a:rPr lang="en-GB" sz="1200" dirty="0" smtClean="0"/>
+                <a:t>E:\Data_UserDB\ImpactSOA.mdf</a:t>
+              </a:r>
+              <a:endParaRPr lang="en-GB" sz="1200" dirty="0"/>
+            </a:p>
+          </p:txBody>
+        </p:sp>
+        <p:sp>
+          <p:nvSpPr>
+            <p:cNvPr id="81" name="Rectangle 80"/>
+            <p:cNvSpPr/>
+            <p:nvPr/>
+          </p:nvSpPr>
+          <p:spPr>
+            <a:xfrm>
+              <a:off x="8697920" y="1816077"/>
+              <a:ext cx="2634803" cy="1463837"/>
+            </a:xfrm>
+            <a:prstGeom prst="rect">
+              <a:avLst/>
+            </a:prstGeom>
+            <a:noFill/>
+            <a:ln w="19050"/>
+          </p:spPr>
+          <p:style>
+            <a:lnRef idx="2">
+              <a:schemeClr val="accent1">
+                <a:shade val="50000"/>
+              </a:schemeClr>
+            </a:lnRef>
+            <a:fillRef idx="1">
+              <a:schemeClr val="accent1"/>
+            </a:fillRef>
+            <a:effectRef idx="0">
+              <a:schemeClr val="accent1"/>
+            </a:effectRef>
+            <a:fontRef idx="minor">
+              <a:schemeClr val="lt1"/>
+            </a:fontRef>
+          </p:style>
+          <p:txBody>
+            <a:bodyPr rtlCol="0" anchor="ctr"/>
+            <a:lstStyle/>
+            <a:p>
+              <a:pPr algn="ctr"/>
+              <a:endParaRPr lang="en-GB"/>
+            </a:p>
+          </p:txBody>
+        </p:sp>
+        <p:sp>
+          <p:nvSpPr>
+            <p:cNvPr id="82" name="TextBox 81"/>
+            <p:cNvSpPr txBox="1"/>
+            <p:nvPr/>
+          </p:nvSpPr>
+          <p:spPr>
+            <a:xfrm>
+              <a:off x="8696231" y="1887606"/>
+              <a:ext cx="1858618" cy="369332"/>
+            </a:xfrm>
+            <a:prstGeom prst="rect">
+              <a:avLst/>
+            </a:prstGeom>
+            <a:noFill/>
+          </p:spPr>
+          <p:txBody>
+            <a:bodyPr wrap="square" rtlCol="0">
+              <a:spAutoFit/>
+            </a:bodyPr>
+            <a:lstStyle/>
+            <a:p>
+              <a:r>
+                <a:rPr lang="en-GB" dirty="0" smtClean="0"/>
+                <a:t>Engine</a:t>
+              </a:r>
+              <a:endParaRPr lang="en-GB" dirty="0"/>
+            </a:p>
+          </p:txBody>
+        </p:sp>
+        <p:pic>
+          <p:nvPicPr>
+            <p:cNvPr id="87" name="Picture 2" descr="R Logo Icon - Download in Flat Style"/>
+            <p:cNvPicPr>
+              <a:picLocks noChangeAspect="1" noChangeArrowheads="1"/>
+            </p:cNvPicPr>
+            <p:nvPr/>
+          </p:nvPicPr>
+          <p:blipFill>
+            <a:blip r:embed="rId4" cstate="print">
+              <a:extLst>
+                <a:ext uri="{28A0092B-C50C-407E-A947-70E740481C1C}">
+                  <a14:useLocalDpi xmlns:a14="http://schemas.microsoft.com/office/drawing/2010/main" val="0"/>
+                </a:ext>
+              </a:extLst>
+            </a:blip>
+            <a:srcRect/>
+            <a:stretch>
+              <a:fillRect/>
+            </a:stretch>
+          </p:blipFill>
+          <p:spPr bwMode="auto">
+            <a:xfrm>
+              <a:off x="10019445" y="2323313"/>
+              <a:ext cx="736591" cy="736591"/>
+            </a:xfrm>
+            <a:prstGeom prst="rect">
+              <a:avLst/>
+            </a:prstGeom>
+            <a:noFill/>
+            <a:extLst>
+              <a:ext uri="{909E8E84-426E-40DD-AFC4-6F175D3DCCD1}">
+                <a14:hiddenFill xmlns:a14="http://schemas.microsoft.com/office/drawing/2010/main">
+                  <a:solidFill>
+                    <a:srgbClr val="FFFFFF"/>
+                  </a:solidFill>
+                </a14:hiddenFill>
+              </a:ext>
+            </a:extLst>
+          </p:spPr>
+        </p:pic>
+      </p:grpSp>
       <p:sp>
         <p:nvSpPr>
-          <p:cNvPr id="75" name="Rectangle 74"/>
+          <p:cNvPr id="41" name="Rectangle 40"/>
           <p:cNvSpPr/>
           <p:nvPr/>
         </p:nvSpPr>
         <p:spPr>
           <a:xfrm>
-            <a:off x="7731023" y="2480550"/>
-            <a:ext cx="804276" cy="227395"/>
-          </a:xfrm>
-          <a:prstGeom prst="rect">
-            <a:avLst/>
-          </a:prstGeom>
-          <a:noFill/>
-          <a:ln w="9525">
-            <a:noFill/>
-          </a:ln>
-        </p:spPr>
-        <p:style>
-          <a:lnRef idx="2">
-            <a:schemeClr val="accent1">
-              <a:shade val="50000"/>
-            </a:schemeClr>
-          </a:lnRef>
-          <a:fillRef idx="1">
-            <a:schemeClr val="accent1"/>
-          </a:fillRef>
-          <a:effectRef idx="0">
-            <a:schemeClr val="accent1"/>
-          </a:effectRef>
-          <a:fontRef idx="minor">
-            <a:schemeClr val="lt1"/>
-          </a:fontRef>
-        </p:style>
-        <p:txBody>
-          <a:bodyPr rtlCol="0" anchor="ctr"/>
-          <a:lstStyle/>
-          <a:p>
-            <a:pPr algn="ctr"/>
-            <a:r>
-              <a:rPr lang="en-GB" sz="1200" dirty="0" smtClean="0">
-                <a:solidFill>
-                  <a:schemeClr val="tx1"/>
-                </a:solidFill>
-              </a:rPr>
-              <a:t>Memory</a:t>
-            </a:r>
-            <a:endParaRPr lang="en-GB" sz="1200" dirty="0">
-              <a:solidFill>
-                <a:schemeClr val="tx1"/>
-              </a:solidFill>
-            </a:endParaRPr>
-          </a:p>
-        </p:txBody>
-      </p:sp>
-      <p:sp>
-        <p:nvSpPr>
-          <p:cNvPr id="80" name="Rectangle 79"/>
-          <p:cNvSpPr/>
-          <p:nvPr/>
-        </p:nvSpPr>
-        <p:spPr>
-          <a:xfrm>
-            <a:off x="6443115" y="3076109"/>
-            <a:ext cx="2203232" cy="276999"/>
-          </a:xfrm>
-          <a:prstGeom prst="rect">
-            <a:avLst/>
-          </a:prstGeom>
-        </p:spPr>
-        <p:txBody>
-          <a:bodyPr wrap="none">
-            <a:spAutoFit/>
-          </a:bodyPr>
-          <a:lstStyle/>
-          <a:p>
-            <a:r>
-              <a:rPr lang="en-GB" sz="1200" dirty="0" smtClean="0"/>
-              <a:t>E:\Data_UserDB\ImpactSOA.mdf</a:t>
-            </a:r>
-            <a:endParaRPr lang="en-GB" sz="1200" dirty="0"/>
-          </a:p>
-        </p:txBody>
-      </p:sp>
-      <p:sp>
-        <p:nvSpPr>
-          <p:cNvPr id="81" name="Rectangle 80"/>
-          <p:cNvSpPr/>
-          <p:nvPr/>
-        </p:nvSpPr>
-        <p:spPr>
-          <a:xfrm>
-            <a:off x="8697920" y="1868558"/>
-            <a:ext cx="3073795" cy="1411356"/>
+            <a:off x="6433920" y="1401416"/>
+            <a:ext cx="5426765" cy="971535"/>
           </a:xfrm>
           <a:prstGeom prst="rect">
             <a:avLst/>
@@ -9655,15 +9805,39 @@
           </a:p>
         </p:txBody>
       </p:sp>
+      <p:pic>
+        <p:nvPicPr>
+          <p:cNvPr id="8" name="Picture 7"/>
+          <p:cNvPicPr>
+            <a:picLocks noChangeAspect="1"/>
+          </p:cNvPicPr>
+          <p:nvPr/>
+        </p:nvPicPr>
+        <p:blipFill>
+          <a:blip r:embed="rId5"/>
+          <a:stretch>
+            <a:fillRect/>
+          </a:stretch>
+        </p:blipFill>
+        <p:spPr>
+          <a:xfrm>
+            <a:off x="7785498" y="1584605"/>
+            <a:ext cx="695325" cy="600075"/>
+          </a:xfrm>
+          <a:prstGeom prst="rect">
+            <a:avLst/>
+          </a:prstGeom>
+        </p:spPr>
+      </p:pic>
       <p:sp>
         <p:nvSpPr>
-          <p:cNvPr id="82" name="TextBox 81"/>
+          <p:cNvPr id="43" name="TextBox 42"/>
           <p:cNvSpPr txBox="1"/>
           <p:nvPr/>
         </p:nvSpPr>
         <p:spPr>
           <a:xfrm>
-            <a:off x="8696231" y="1887606"/>
+            <a:off x="6443115" y="1401417"/>
             <a:ext cx="1858618" cy="369332"/>
           </a:xfrm>
           <a:prstGeom prst="rect">
@@ -9679,22 +9853,63 @@
           <a:p>
             <a:r>
               <a:rPr lang="en-GB" dirty="0" smtClean="0"/>
-              <a:t>Engine</a:t>
+              <a:t>Desktop</a:t>
             </a:r>
             <a:endParaRPr lang="en-GB" dirty="0"/>
           </a:p>
         </p:txBody>
       </p:sp>
+      <p:pic>
+        <p:nvPicPr>
+          <p:cNvPr id="1030" name="Picture 6" descr="Hasan Savran: Step by step Querying SQL Database with Python by using Azure  Data Studio"/>
+          <p:cNvPicPr>
+            <a:picLocks noChangeAspect="1" noChangeArrowheads="1"/>
+          </p:cNvPicPr>
+          <p:nvPr/>
+        </p:nvPicPr>
+        <p:blipFill>
+          <a:blip r:embed="rId6" cstate="print">
+            <a:extLst>
+              <a:ext uri="{28A0092B-C50C-407E-A947-70E740481C1C}">
+                <a14:useLocalDpi xmlns:a14="http://schemas.microsoft.com/office/drawing/2010/main" val="0"/>
+              </a:ext>
+            </a:extLst>
+          </a:blip>
+          <a:srcRect/>
+          <a:stretch>
+            <a:fillRect/>
+          </a:stretch>
+        </p:blipFill>
+        <p:spPr bwMode="auto">
+          <a:xfrm>
+            <a:off x="8646347" y="1595297"/>
+            <a:ext cx="1619850" cy="519198"/>
+          </a:xfrm>
+          <a:prstGeom prst="rect">
+            <a:avLst/>
+          </a:prstGeom>
+          <a:noFill/>
+          <a:extLst>
+            <a:ext uri="{909E8E84-426E-40DD-AFC4-6F175D3DCCD1}">
+              <a14:hiddenFill xmlns:a14="http://schemas.microsoft.com/office/drawing/2010/main">
+                <a:solidFill>
+                  <a:srgbClr val="FFFFFF"/>
+                </a:solidFill>
+              </a14:hiddenFill>
+            </a:ext>
+          </a:extLst>
+        </p:spPr>
+      </p:pic>
       <p:cxnSp>
         <p:nvCxnSpPr>
-          <p:cNvPr id="85" name="Straight Arrow Connector 84"/>
+          <p:cNvPr id="56" name="Straight Arrow Connector 55"/>
           <p:cNvCxnSpPr/>
           <p:nvPr/>
         </p:nvCxnSpPr>
         <p:spPr>
           <a:xfrm>
-            <a:off x="10451467" y="3130826"/>
-            <a:ext cx="0" cy="1240036"/>
+            <a:off x="9036905" y="2171682"/>
+            <a:ext cx="0" cy="600701"/>
           </a:xfrm>
           <a:prstGeom prst="straightConnector1">
             <a:avLst/>
@@ -9721,47 +9936,6 @@
           </a:fontRef>
         </p:style>
       </p:cxnSp>
-      <p:pic>
-        <p:nvPicPr>
-          <p:cNvPr id="87" name="Picture 2" descr="R Logo Icon - Download in Flat Style"/>
-          <p:cNvPicPr>
-            <a:picLocks noChangeAspect="1" noChangeArrowheads="1"/>
-          </p:cNvPicPr>
-          <p:nvPr/>
-        </p:nvPicPr>
-        <p:blipFill>
-          <a:blip r:embed="rId4" cstate="print">
-            <a:extLst>
-              <a:ext uri="{28A0092B-C50C-407E-A947-70E740481C1C}">
-                <a14:useLocalDpi xmlns:a14="http://schemas.microsoft.com/office/drawing/2010/main" val="0"/>
-              </a:ext>
-            </a:extLst>
-          </a:blip>
-          <a:srcRect/>
-          <a:stretch>
-            <a:fillRect/>
-          </a:stretch>
-        </p:blipFill>
-        <p:spPr bwMode="auto">
-          <a:xfrm>
-            <a:off x="10019445" y="2323313"/>
-            <a:ext cx="736591" cy="736591"/>
-          </a:xfrm>
-          <a:prstGeom prst="rect">
-            <a:avLst/>
-          </a:prstGeom>
-          <a:noFill/>
-          <a:extLst>
-            <a:ext uri="{909E8E84-426E-40DD-AFC4-6F175D3DCCD1}">
-              <a14:hiddenFill xmlns:a14="http://schemas.microsoft.com/office/drawing/2010/main">
-                <a:solidFill>
-                  <a:srgbClr val="FFFFFF"/>
-                </a:solidFill>
-              </a14:hiddenFill>
-            </a:ext>
-          </a:extLst>
-        </p:spPr>
-      </p:pic>
     </p:spTree>
     <p:extLst>
       <p:ext uri="{BB962C8B-B14F-4D97-AF65-F5344CB8AC3E}">
@@ -9801,131 +9975,6 @@
       </p:grpSpPr>
       <p:sp>
         <p:nvSpPr>
-          <p:cNvPr id="2" name="Title 1"/>
-          <p:cNvSpPr>
-            <a:spLocks noGrp="1"/>
-          </p:cNvSpPr>
-          <p:nvPr>
-            <p:ph type="title"/>
-          </p:nvPr>
-        </p:nvSpPr>
-        <p:spPr/>
-        <p:txBody>
-          <a:bodyPr/>
-          <a:lstStyle/>
-          <a:p>
-            <a:r>
-              <a:rPr lang="en-GB" dirty="0" smtClean="0"/>
-              <a:t>Resources Demo 1</a:t>
-            </a:r>
-            <a:endParaRPr lang="en-GB" dirty="0"/>
-          </a:p>
-        </p:txBody>
-      </p:sp>
-      <p:sp>
-        <p:nvSpPr>
-          <p:cNvPr id="3" name="Content Placeholder 2"/>
-          <p:cNvSpPr>
-            <a:spLocks noGrp="1"/>
-          </p:cNvSpPr>
-          <p:nvPr>
-            <p:ph sz="quarter" idx="12"/>
-          </p:nvPr>
-        </p:nvSpPr>
-        <p:spPr/>
-        <p:txBody>
-          <a:bodyPr>
-            <a:normAutofit/>
-          </a:bodyPr>
-          <a:lstStyle/>
-          <a:p>
-            <a:r>
-              <a:rPr lang="en-GB" dirty="0">
-                <a:hlinkClick r:id="rId2"/>
-              </a:rPr>
-              <a:t>https://</a:t>
-            </a:r>
-            <a:r>
-              <a:rPr lang="en-GB" dirty="0" smtClean="0">
-                <a:hlinkClick r:id="rId2"/>
-              </a:rPr>
-              <a:t>bit.ly/3zvALdN</a:t>
-            </a:r>
-            <a:r>
-              <a:rPr lang="en-GB" dirty="0" smtClean="0"/>
-              <a:t> (Part A)</a:t>
-            </a:r>
-          </a:p>
-          <a:p>
-            <a:r>
-              <a:rPr lang="en-US" dirty="0">
-                <a:hlinkClick r:id="rId3"/>
-              </a:rPr>
-              <a:t>https://</a:t>
-            </a:r>
-            <a:r>
-              <a:rPr lang="en-US" dirty="0" smtClean="0">
-                <a:hlinkClick r:id="rId3"/>
-              </a:rPr>
-              <a:t>bit.ly/3kr7j4j</a:t>
-            </a:r>
-            <a:r>
-              <a:rPr lang="en-US" dirty="0" smtClean="0"/>
-              <a:t> </a:t>
-            </a:r>
-            <a:r>
-              <a:rPr lang="en-GB" dirty="0" smtClean="0"/>
-              <a:t>(</a:t>
-            </a:r>
-            <a:r>
-              <a:rPr lang="en-GB" dirty="0"/>
-              <a:t>Part </a:t>
-            </a:r>
-            <a:r>
-              <a:rPr lang="en-GB" dirty="0" smtClean="0"/>
-              <a:t>B)</a:t>
-            </a:r>
-            <a:endParaRPr lang="en-US" dirty="0" smtClean="0">
-              <a:hlinkClick r:id="rId4"/>
-            </a:endParaRPr>
-          </a:p>
-          <a:p>
-            <a:r>
-              <a:rPr lang="en-US" dirty="0" smtClean="0">
-                <a:hlinkClick r:id="rId4"/>
-              </a:rPr>
-              <a:t>https://www.rstudio.com/products/rstudio/download/</a:t>
-            </a:r>
-            <a:endParaRPr lang="en-US" dirty="0" smtClean="0"/>
-          </a:p>
-          <a:p>
-            <a:r>
-              <a:rPr lang="en-US" dirty="0">
-                <a:hlinkClick r:id="rId5"/>
-              </a:rPr>
-              <a:t>Reading data from Microsoft SQL Server into R - Stack Overflow</a:t>
-            </a:r>
-            <a:endParaRPr lang="en-GB" dirty="0" smtClean="0"/>
-          </a:p>
-          <a:p>
-            <a:r>
-              <a:rPr lang="en-US" dirty="0" smtClean="0">
-                <a:hlinkClick r:id="rId6"/>
-              </a:rPr>
-              <a:t>Install </a:t>
-            </a:r>
-            <a:r>
-              <a:rPr lang="en-US" dirty="0">
-                <a:hlinkClick r:id="rId6"/>
-              </a:rPr>
-              <a:t>on Windows - SQL Server Machine Learning Services | Microsoft Docs</a:t>
-            </a:r>
-            <a:endParaRPr lang="en-GB" dirty="0" smtClean="0"/>
-          </a:p>
-        </p:txBody>
-      </p:sp>
-      <p:sp>
-        <p:nvSpPr>
           <p:cNvPr id="4" name="Slide Number Placeholder 3"/>
           <p:cNvSpPr>
             <a:spLocks noGrp="1"/>
@@ -9948,10 +9997,265 @@
           </a:p>
         </p:txBody>
       </p:sp>
+      <p:pic>
+        <p:nvPicPr>
+          <p:cNvPr id="8" name="Picture 7"/>
+          <p:cNvPicPr>
+            <a:picLocks noChangeAspect="1"/>
+          </p:cNvPicPr>
+          <p:nvPr/>
+        </p:nvPicPr>
+        <p:blipFill>
+          <a:blip r:embed="rId2"/>
+          <a:stretch>
+            <a:fillRect/>
+          </a:stretch>
+        </p:blipFill>
+        <p:spPr>
+          <a:xfrm>
+            <a:off x="-11944" y="0"/>
+            <a:ext cx="12203944" cy="6858000"/>
+          </a:xfrm>
+          <a:prstGeom prst="rect">
+            <a:avLst/>
+          </a:prstGeom>
+        </p:spPr>
+      </p:pic>
+      <p:sp>
+        <p:nvSpPr>
+          <p:cNvPr id="9" name="Rectangle 8"/>
+          <p:cNvSpPr/>
+          <p:nvPr/>
+        </p:nvSpPr>
+        <p:spPr>
+          <a:xfrm>
+            <a:off x="369652" y="233464"/>
+            <a:ext cx="3949430" cy="710119"/>
+          </a:xfrm>
+          <a:prstGeom prst="rect">
+            <a:avLst/>
+          </a:prstGeom>
+          <a:noFill/>
+          <a:ln w="38100" cap="flat" cmpd="sng" algn="ctr">
+            <a:solidFill>
+              <a:srgbClr val="00B050"/>
+            </a:solidFill>
+            <a:prstDash val="solid"/>
+            <a:round/>
+            <a:headEnd type="none" w="med" len="med"/>
+            <a:tailEnd type="none" w="med" len="med"/>
+          </a:ln>
+        </p:spPr>
+        <p:style>
+          <a:lnRef idx="0">
+            <a:scrgbClr r="0" g="0" b="0"/>
+          </a:lnRef>
+          <a:fillRef idx="0">
+            <a:scrgbClr r="0" g="0" b="0"/>
+          </a:fillRef>
+          <a:effectRef idx="0">
+            <a:scrgbClr r="0" g="0" b="0"/>
+          </a:effectRef>
+          <a:fontRef idx="minor">
+            <a:schemeClr val="accent5"/>
+          </a:fontRef>
+        </p:style>
+        <p:txBody>
+          <a:bodyPr rtlCol="0" anchor="ctr"/>
+          <a:lstStyle/>
+          <a:p>
+            <a:pPr algn="ctr"/>
+            <a:endParaRPr lang="en-GB"/>
+          </a:p>
+        </p:txBody>
+      </p:sp>
+      <p:sp>
+        <p:nvSpPr>
+          <p:cNvPr id="10" name="Rectangle 9"/>
+          <p:cNvSpPr/>
+          <p:nvPr/>
+        </p:nvSpPr>
+        <p:spPr>
+          <a:xfrm>
+            <a:off x="651753" y="505838"/>
+            <a:ext cx="856034" cy="77822"/>
+          </a:xfrm>
+          <a:prstGeom prst="rect">
+            <a:avLst/>
+          </a:prstGeom>
+          <a:solidFill>
+            <a:schemeClr val="bg1">
+              <a:lumMod val="95000"/>
+            </a:schemeClr>
+          </a:solidFill>
+          <a:ln>
+            <a:noFill/>
+          </a:ln>
+        </p:spPr>
+        <p:style>
+          <a:lnRef idx="2">
+            <a:schemeClr val="accent1">
+              <a:shade val="50000"/>
+            </a:schemeClr>
+          </a:lnRef>
+          <a:fillRef idx="1">
+            <a:schemeClr val="accent1"/>
+          </a:fillRef>
+          <a:effectRef idx="0">
+            <a:schemeClr val="accent1"/>
+          </a:effectRef>
+          <a:fontRef idx="minor">
+            <a:schemeClr val="lt1"/>
+          </a:fontRef>
+        </p:style>
+        <p:txBody>
+          <a:bodyPr rtlCol="0" anchor="ctr"/>
+          <a:lstStyle/>
+          <a:p>
+            <a:pPr algn="ctr"/>
+            <a:endParaRPr lang="en-GB"/>
+          </a:p>
+        </p:txBody>
+      </p:sp>
+      <p:pic>
+        <p:nvPicPr>
+          <p:cNvPr id="11" name="Graphic 25" descr="Line arrow: Clockwise curve with solid fill">
+            <a:extLst>
+              <a:ext uri="{FF2B5EF4-FFF2-40B4-BE49-F238E27FC236}">
+                <a16:creationId xmlns:a16="http://schemas.microsoft.com/office/drawing/2014/main" id="{156DB502-568D-40BE-BDB7-95848A5949D7}"/>
+              </a:ext>
+            </a:extLst>
+          </p:cNvPr>
+          <p:cNvPicPr>
+            <a:picLocks noChangeAspect="1"/>
+          </p:cNvPicPr>
+          <p:nvPr/>
+        </p:nvPicPr>
+        <p:blipFill>
+          <a:blip r:embed="rId3">
+            <a:extLst>
+              <a:ext uri="{28A0092B-C50C-407E-A947-70E740481C1C}">
+                <a14:useLocalDpi xmlns:a14="http://schemas.microsoft.com/office/drawing/2010/main"/>
+              </a:ext>
+              <a:ext uri="{96DAC541-7B7A-43D3-8B79-37D633B846F1}">
+                <asvg:svgBlip xmlns="" xmlns:asvg="http://schemas.microsoft.com/office/drawing/2016/SVG/main" r:embed="rId5"/>
+              </a:ext>
+            </a:extLst>
+          </a:blip>
+          <a:stretch>
+            <a:fillRect/>
+          </a:stretch>
+        </p:blipFill>
+        <p:spPr>
+          <a:xfrm rot="10800000" flipH="1">
+            <a:off x="5709019" y="321571"/>
+            <a:ext cx="914400" cy="914400"/>
+          </a:xfrm>
+          <a:prstGeom prst="rect">
+            <a:avLst/>
+          </a:prstGeom>
+        </p:spPr>
+      </p:pic>
+      <p:sp>
+        <p:nvSpPr>
+          <p:cNvPr id="12" name="Rectangle 11"/>
+          <p:cNvSpPr/>
+          <p:nvPr/>
+        </p:nvSpPr>
+        <p:spPr>
+          <a:xfrm>
+            <a:off x="5982511" y="0"/>
+            <a:ext cx="1147863" cy="233464"/>
+          </a:xfrm>
+          <a:prstGeom prst="rect">
+            <a:avLst/>
+          </a:prstGeom>
+          <a:noFill/>
+          <a:ln w="38100" cap="flat" cmpd="sng" algn="ctr">
+            <a:solidFill>
+              <a:srgbClr val="0070C0"/>
+            </a:solidFill>
+            <a:prstDash val="solid"/>
+            <a:round/>
+            <a:headEnd type="none" w="med" len="med"/>
+            <a:tailEnd type="none" w="med" len="med"/>
+          </a:ln>
+        </p:spPr>
+        <p:style>
+          <a:lnRef idx="0">
+            <a:scrgbClr r="0" g="0" b="0"/>
+          </a:lnRef>
+          <a:fillRef idx="0">
+            <a:scrgbClr r="0" g="0" b="0"/>
+          </a:fillRef>
+          <a:effectRef idx="0">
+            <a:scrgbClr r="0" g="0" b="0"/>
+          </a:effectRef>
+          <a:fontRef idx="minor">
+            <a:schemeClr val="accent5"/>
+          </a:fontRef>
+        </p:style>
+        <p:txBody>
+          <a:bodyPr rtlCol="0" anchor="ctr"/>
+          <a:lstStyle/>
+          <a:p>
+            <a:pPr algn="ctr"/>
+            <a:endParaRPr lang="en-GB"/>
+          </a:p>
+        </p:txBody>
+      </p:sp>
+      <p:sp>
+        <p:nvSpPr>
+          <p:cNvPr id="13" name="Rectangle 12"/>
+          <p:cNvSpPr/>
+          <p:nvPr/>
+        </p:nvSpPr>
+        <p:spPr>
+          <a:xfrm>
+            <a:off x="1" y="2088204"/>
+            <a:ext cx="369652" cy="324255"/>
+          </a:xfrm>
+          <a:prstGeom prst="rect">
+            <a:avLst/>
+          </a:prstGeom>
+          <a:noFill/>
+          <a:ln w="38100" cap="flat" cmpd="sng" algn="ctr">
+            <a:solidFill>
+              <a:srgbClr val="0070C0"/>
+            </a:solidFill>
+            <a:prstDash val="solid"/>
+            <a:round/>
+            <a:headEnd type="none" w="med" len="med"/>
+            <a:tailEnd type="none" w="med" len="med"/>
+          </a:ln>
+        </p:spPr>
+        <p:style>
+          <a:lnRef idx="0">
+            <a:scrgbClr r="0" g="0" b="0"/>
+          </a:lnRef>
+          <a:fillRef idx="0">
+            <a:scrgbClr r="0" g="0" b="0"/>
+          </a:fillRef>
+          <a:effectRef idx="0">
+            <a:scrgbClr r="0" g="0" b="0"/>
+          </a:effectRef>
+          <a:fontRef idx="minor">
+            <a:schemeClr val="accent5"/>
+          </a:fontRef>
+        </p:style>
+        <p:txBody>
+          <a:bodyPr rtlCol="0" anchor="ctr"/>
+          <a:lstStyle/>
+          <a:p>
+            <a:pPr algn="ctr"/>
+            <a:endParaRPr lang="en-GB"/>
+          </a:p>
+        </p:txBody>
+      </p:sp>
     </p:spTree>
     <p:extLst>
       <p:ext uri="{BB962C8B-B14F-4D97-AF65-F5344CB8AC3E}">
-        <p14:creationId xmlns:p14="http://schemas.microsoft.com/office/powerpoint/2010/main" val="511472320"/>
+        <p14:creationId xmlns:p14="http://schemas.microsoft.com/office/powerpoint/2010/main" val="2070473287"/>
       </p:ext>
     </p:extLst>
   </p:cSld>
@@ -9995,19 +10299,14 @@
             <p:ph type="title"/>
           </p:nvPr>
         </p:nvSpPr>
-        <p:spPr>
-          <a:xfrm>
-            <a:off x="720676" y="1270001"/>
-            <a:ext cx="10767024" cy="774699"/>
-          </a:xfrm>
-        </p:spPr>
+        <p:spPr/>
         <p:txBody>
-          <a:bodyPr anchor="t"/>
+          <a:bodyPr/>
           <a:lstStyle/>
           <a:p>
             <a:r>
               <a:rPr lang="en-GB" dirty="0" smtClean="0"/>
-              <a:t>DEMO 2</a:t>
+              <a:t>Resources Demo 1</a:t>
             </a:r>
             <a:endParaRPr lang="en-GB" dirty="0"/>
           </a:p>
@@ -10015,308 +10314,147 @@
       </p:sp>
       <p:sp>
         <p:nvSpPr>
-          <p:cNvPr id="5" name="Content Placeholder 2">
-            <a:extLst>
-              <a:ext uri="{FF2B5EF4-FFF2-40B4-BE49-F238E27FC236}">
-                <a16:creationId xmlns:a16="http://schemas.microsoft.com/office/drawing/2014/main" id="{ED9D4C28-B53F-2540-A01A-B6984758A45C}"/>
-              </a:ext>
-            </a:extLst>
-          </p:cNvPr>
-          <p:cNvSpPr txBox="1">
-            <a:spLocks/>
+          <p:cNvPr id="3" name="Content Placeholder 2"/>
+          <p:cNvSpPr>
+            <a:spLocks noGrp="1"/>
           </p:cNvSpPr>
-          <p:nvPr/>
+          <p:nvPr>
+            <p:ph sz="quarter" idx="12"/>
+          </p:nvPr>
         </p:nvSpPr>
-        <p:spPr>
-          <a:xfrm>
-            <a:off x="720676" y="2044700"/>
-            <a:ext cx="10767024" cy="3778994"/>
-          </a:xfrm>
-          <a:prstGeom prst="rect">
-            <a:avLst/>
-          </a:prstGeom>
-        </p:spPr>
+        <p:spPr/>
         <p:txBody>
-          <a:bodyPr/>
-          <a:lstStyle>
-            <a:lvl1pPr marL="228600" indent="-228600" algn="l" defTabSz="914400" rtl="0" eaLnBrk="1" latinLnBrk="0" hangingPunct="1">
-              <a:lnSpc>
-                <a:spcPct val="90000"/>
-              </a:lnSpc>
-              <a:spcBef>
-                <a:spcPts val="1000"/>
-              </a:spcBef>
-              <a:buFont typeface="Arial" panose="020B0604020202020204" pitchFamily="34" charset="0"/>
-              <a:buChar char="•"/>
-              <a:defRPr sz="2800" kern="1200">
-                <a:solidFill>
-                  <a:schemeClr val="tx1"/>
-                </a:solidFill>
-                <a:latin typeface="+mn-lt"/>
-                <a:ea typeface="+mn-ea"/>
-                <a:cs typeface="+mn-cs"/>
-              </a:defRPr>
-            </a:lvl1pPr>
-            <a:lvl2pPr marL="685800" indent="-228600" algn="l" defTabSz="914400" rtl="0" eaLnBrk="1" latinLnBrk="0" hangingPunct="1">
-              <a:lnSpc>
-                <a:spcPct val="90000"/>
-              </a:lnSpc>
-              <a:spcBef>
-                <a:spcPts val="500"/>
-              </a:spcBef>
-              <a:buFont typeface="Arial" panose="020B0604020202020204" pitchFamily="34" charset="0"/>
-              <a:buChar char="•"/>
-              <a:defRPr sz="2400" kern="1200">
-                <a:solidFill>
-                  <a:schemeClr val="tx1"/>
-                </a:solidFill>
-                <a:latin typeface="+mn-lt"/>
-                <a:ea typeface="+mn-ea"/>
-                <a:cs typeface="+mn-cs"/>
-              </a:defRPr>
-            </a:lvl2pPr>
-            <a:lvl3pPr marL="1143000" indent="-228600" algn="l" defTabSz="914400" rtl="0" eaLnBrk="1" latinLnBrk="0" hangingPunct="1">
-              <a:lnSpc>
-                <a:spcPct val="90000"/>
-              </a:lnSpc>
-              <a:spcBef>
-                <a:spcPts val="500"/>
-              </a:spcBef>
-              <a:buFont typeface="Arial" panose="020B0604020202020204" pitchFamily="34" charset="0"/>
-              <a:buChar char="•"/>
-              <a:defRPr sz="2000" kern="1200">
-                <a:solidFill>
-                  <a:schemeClr val="tx1"/>
-                </a:solidFill>
-                <a:latin typeface="+mn-lt"/>
-                <a:ea typeface="+mn-ea"/>
-                <a:cs typeface="+mn-cs"/>
-              </a:defRPr>
-            </a:lvl3pPr>
-            <a:lvl4pPr marL="1600200" indent="-228600" algn="l" defTabSz="914400" rtl="0" eaLnBrk="1" latinLnBrk="0" hangingPunct="1">
-              <a:lnSpc>
-                <a:spcPct val="90000"/>
-              </a:lnSpc>
-              <a:spcBef>
-                <a:spcPts val="500"/>
-              </a:spcBef>
-              <a:buFont typeface="Arial" panose="020B0604020202020204" pitchFamily="34" charset="0"/>
-              <a:buChar char="•"/>
-              <a:defRPr sz="1800" kern="1200">
-                <a:solidFill>
-                  <a:schemeClr val="tx1"/>
-                </a:solidFill>
-                <a:latin typeface="+mn-lt"/>
-                <a:ea typeface="+mn-ea"/>
-                <a:cs typeface="+mn-cs"/>
-              </a:defRPr>
-            </a:lvl4pPr>
-            <a:lvl5pPr marL="2057400" indent="-228600" algn="l" defTabSz="914400" rtl="0" eaLnBrk="1" latinLnBrk="0" hangingPunct="1">
-              <a:lnSpc>
-                <a:spcPct val="90000"/>
-              </a:lnSpc>
-              <a:spcBef>
-                <a:spcPts val="500"/>
-              </a:spcBef>
-              <a:buFont typeface="Arial" panose="020B0604020202020204" pitchFamily="34" charset="0"/>
-              <a:buChar char="•"/>
-              <a:defRPr sz="1800" kern="1200">
-                <a:solidFill>
-                  <a:schemeClr val="tx1"/>
-                </a:solidFill>
-                <a:latin typeface="+mn-lt"/>
-                <a:ea typeface="+mn-ea"/>
-                <a:cs typeface="+mn-cs"/>
-              </a:defRPr>
-            </a:lvl5pPr>
-            <a:lvl6pPr marL="2514600" indent="-228600" algn="l" defTabSz="914400" rtl="0" eaLnBrk="1" latinLnBrk="0" hangingPunct="1">
-              <a:lnSpc>
-                <a:spcPct val="90000"/>
-              </a:lnSpc>
-              <a:spcBef>
-                <a:spcPts val="500"/>
-              </a:spcBef>
-              <a:buFont typeface="Arial" panose="020B0604020202020204" pitchFamily="34" charset="0"/>
-              <a:buChar char="•"/>
-              <a:defRPr sz="1800" kern="1200">
-                <a:solidFill>
-                  <a:schemeClr val="tx1"/>
-                </a:solidFill>
-                <a:latin typeface="+mn-lt"/>
-                <a:ea typeface="+mn-ea"/>
-                <a:cs typeface="+mn-cs"/>
-              </a:defRPr>
-            </a:lvl6pPr>
-            <a:lvl7pPr marL="2971800" indent="-228600" algn="l" defTabSz="914400" rtl="0" eaLnBrk="1" latinLnBrk="0" hangingPunct="1">
-              <a:lnSpc>
-                <a:spcPct val="90000"/>
-              </a:lnSpc>
-              <a:spcBef>
-                <a:spcPts val="500"/>
-              </a:spcBef>
-              <a:buFont typeface="Arial" panose="020B0604020202020204" pitchFamily="34" charset="0"/>
-              <a:buChar char="•"/>
-              <a:defRPr sz="1800" kern="1200">
-                <a:solidFill>
-                  <a:schemeClr val="tx1"/>
-                </a:solidFill>
-                <a:latin typeface="+mn-lt"/>
-                <a:ea typeface="+mn-ea"/>
-                <a:cs typeface="+mn-cs"/>
-              </a:defRPr>
-            </a:lvl7pPr>
-            <a:lvl8pPr marL="3429000" indent="-228600" algn="l" defTabSz="914400" rtl="0" eaLnBrk="1" latinLnBrk="0" hangingPunct="1">
-              <a:lnSpc>
-                <a:spcPct val="90000"/>
-              </a:lnSpc>
-              <a:spcBef>
-                <a:spcPts val="500"/>
-              </a:spcBef>
-              <a:buFont typeface="Arial" panose="020B0604020202020204" pitchFamily="34" charset="0"/>
-              <a:buChar char="•"/>
-              <a:defRPr sz="1800" kern="1200">
-                <a:solidFill>
-                  <a:schemeClr val="tx1"/>
-                </a:solidFill>
-                <a:latin typeface="+mn-lt"/>
-                <a:ea typeface="+mn-ea"/>
-                <a:cs typeface="+mn-cs"/>
-              </a:defRPr>
-            </a:lvl8pPr>
-            <a:lvl9pPr marL="3886200" indent="-228600" algn="l" defTabSz="914400" rtl="0" eaLnBrk="1" latinLnBrk="0" hangingPunct="1">
-              <a:lnSpc>
-                <a:spcPct val="90000"/>
-              </a:lnSpc>
-              <a:spcBef>
-                <a:spcPts val="500"/>
-              </a:spcBef>
-              <a:buFont typeface="Arial" panose="020B0604020202020204" pitchFamily="34" charset="0"/>
-              <a:buChar char="•"/>
-              <a:defRPr sz="1800" kern="1200">
-                <a:solidFill>
-                  <a:schemeClr val="tx1"/>
-                </a:solidFill>
-                <a:latin typeface="+mn-lt"/>
-                <a:ea typeface="+mn-ea"/>
-                <a:cs typeface="+mn-cs"/>
-              </a:defRPr>
-            </a:lvl9pPr>
-          </a:lstStyle>
-          <a:p>
-            <a:pPr marL="0" indent="0">
-              <a:buNone/>
-              <a:defRPr/>
-            </a:pPr>
+          <a:bodyPr>
+            <a:normAutofit/>
+          </a:bodyPr>
+          <a:lstStyle/>
+          <a:p>
+            <a:r>
+              <a:rPr lang="en-GB" dirty="0">
+                <a:hlinkClick r:id="rId2"/>
+              </a:rPr>
+              <a:t>https://</a:t>
+            </a:r>
+            <a:r>
+              <a:rPr lang="en-GB" dirty="0" smtClean="0">
+                <a:hlinkClick r:id="rId2"/>
+              </a:rPr>
+              <a:t>bit.ly/3zvALdN</a:t>
+            </a:r>
+            <a:r>
+              <a:rPr lang="en-GB" dirty="0" smtClean="0"/>
+              <a:t> (Part A)</a:t>
+            </a:r>
+          </a:p>
+          <a:p>
             <a:r>
               <a:rPr lang="en-US" dirty="0">
-                <a:solidFill>
-                  <a:schemeClr val="bg1"/>
-                </a:solidFill>
+                <a:hlinkClick r:id="rId3"/>
               </a:rPr>
-              <a:t>Azure </a:t>
+              <a:t>https://</a:t>
             </a:r>
             <a:r>
               <a:rPr lang="en-US" dirty="0" smtClean="0">
-                <a:solidFill>
-                  <a:schemeClr val="bg1"/>
-                </a:solidFill>
+                <a:hlinkClick r:id="rId3"/>
               </a:rPr>
-              <a:t>DevOps</a:t>
+              <a:t>bit.ly/3kr7j4j</a:t>
             </a:r>
-          </a:p>
-          <a:p>
-            <a:pPr marL="514350" indent="-514350">
-              <a:buFont typeface="+mj-lt"/>
-              <a:buAutoNum type="alphaLcParenR"/>
-              <a:defRPr/>
-            </a:pPr>
+            <a:r>
+              <a:rPr lang="en-US" dirty="0" smtClean="0"/>
+              <a:t> </a:t>
+            </a:r>
+            <a:r>
+              <a:rPr lang="en-GB" dirty="0" smtClean="0"/>
+              <a:t>(</a:t>
+            </a:r>
+            <a:r>
+              <a:rPr lang="en-GB" dirty="0"/>
+              <a:t>Part </a:t>
+            </a:r>
+            <a:r>
+              <a:rPr lang="en-GB" dirty="0" smtClean="0"/>
+              <a:t>B)</a:t>
+            </a:r>
+            <a:endParaRPr lang="en-US" dirty="0" smtClean="0">
+              <a:hlinkClick r:id="rId4"/>
+            </a:endParaRPr>
+          </a:p>
+          <a:p>
             <a:r>
               <a:rPr lang="en-US" dirty="0" smtClean="0">
-                <a:solidFill>
-                  <a:schemeClr val="bg1"/>
-                </a:solidFill>
+                <a:hlinkClick r:id="rId4"/>
               </a:rPr>
-              <a:t>Boards</a:t>
+              <a:t>https://www.rstudio.com/products/rstudio/download/</a:t>
             </a:r>
-            <a:endParaRPr lang="en-US" dirty="0">
-              <a:solidFill>
-                <a:schemeClr val="bg1"/>
-              </a:solidFill>
-            </a:endParaRPr>
-          </a:p>
-          <a:p>
-            <a:pPr marL="514350" indent="-514350">
-              <a:buFont typeface="+mj-lt"/>
-              <a:buAutoNum type="alphaLcParenR"/>
-              <a:defRPr/>
-            </a:pPr>
+            <a:endParaRPr lang="en-US" dirty="0" smtClean="0"/>
+          </a:p>
+          <a:p>
+            <a:r>
+              <a:rPr lang="en-US" dirty="0">
+                <a:hlinkClick r:id="rId5"/>
+              </a:rPr>
+              <a:t>Reading data from Microsoft SQL Server into R - Stack Overflow</a:t>
+            </a:r>
+            <a:endParaRPr lang="en-GB" dirty="0" smtClean="0"/>
+          </a:p>
+          <a:p>
             <a:r>
               <a:rPr lang="en-US" dirty="0" smtClean="0">
-                <a:solidFill>
-                  <a:schemeClr val="bg1"/>
-                </a:solidFill>
+                <a:hlinkClick r:id="rId6"/>
               </a:rPr>
-              <a:t>Repos: enable more rapid actuarial development</a:t>
+              <a:t>Install </a:t>
             </a:r>
-            <a:endParaRPr lang="en-US" dirty="0">
-              <a:solidFill>
-                <a:schemeClr val="bg1"/>
-              </a:solidFill>
-            </a:endParaRPr>
-          </a:p>
-          <a:p>
-            <a:pPr marL="514350" indent="-514350">
-              <a:buFont typeface="+mj-lt"/>
-              <a:buAutoNum type="alphaLcParenR"/>
-              <a:defRPr/>
-            </a:pPr>
             <a:r>
-              <a:rPr lang="en-US" dirty="0" smtClean="0">
-                <a:solidFill>
-                  <a:schemeClr val="bg1"/>
-                </a:solidFill>
+              <a:rPr lang="en-US" dirty="0">
+                <a:hlinkClick r:id="rId6"/>
               </a:rPr>
-              <a:t>Pipelines: maturing to CI/CD</a:t>
+              <a:t>on Windows - SQL Server Machine Learning Services | Microsoft Docs</a:t>
             </a:r>
-            <a:endParaRPr lang="en-US" dirty="0">
-              <a:solidFill>
-                <a:schemeClr val="bg1"/>
-              </a:solidFill>
-            </a:endParaRPr>
-          </a:p>
-          <a:p>
-            <a:pPr marL="0" indent="0">
-              <a:buNone/>
-            </a:pPr>
-            <a:endParaRPr lang="en-US" dirty="0">
-              <a:solidFill>
-                <a:schemeClr val="bg1"/>
-              </a:solidFill>
-            </a:endParaRPr>
-          </a:p>
-          <a:p>
-            <a:pPr marL="0" indent="0">
-              <a:buNone/>
-              <a:defRPr/>
-            </a:pPr>
-            <a:endParaRPr lang="en-US" dirty="0">
-              <a:solidFill>
-                <a:schemeClr val="bg1"/>
-              </a:solidFill>
-            </a:endParaRPr>
+            <a:endParaRPr lang="en-GB" dirty="0" smtClean="0"/>
+          </a:p>
+        </p:txBody>
+      </p:sp>
+      <p:sp>
+        <p:nvSpPr>
+          <p:cNvPr id="4" name="Slide Number Placeholder 3"/>
+          <p:cNvSpPr>
+            <a:spLocks noGrp="1"/>
+          </p:cNvSpPr>
+          <p:nvPr>
+            <p:ph type="sldNum" idx="4"/>
+          </p:nvPr>
+        </p:nvSpPr>
+        <p:spPr/>
+        <p:txBody>
+          <a:bodyPr/>
+          <a:lstStyle/>
+          <a:p>
+            <a:fld id="{00000000-1234-1234-1234-123412341234}" type="slidenum">
+              <a:rPr lang="en-US" smtClean="0"/>
+              <a:pPr/>
+              <a:t>16</a:t>
+            </a:fld>
+            <a:endParaRPr lang="en-US" sz="1300" dirty="0"/>
           </a:p>
         </p:txBody>
       </p:sp>
     </p:spTree>
     <p:extLst>
       <p:ext uri="{BB962C8B-B14F-4D97-AF65-F5344CB8AC3E}">
-        <p14:creationId xmlns:p14="http://schemas.microsoft.com/office/powerpoint/2010/main" val="4011260058"/>
+        <p14:creationId xmlns:p14="http://schemas.microsoft.com/office/powerpoint/2010/main" val="511472320"/>
       </p:ext>
     </p:extLst>
   </p:cSld>
   <p:clrMapOvr>
     <a:masterClrMapping/>
   </p:clrMapOvr>
+  <p:timing>
+    <p:tnLst>
+      <p:par>
+        <p:cTn id="1" dur="indefinite" restart="never" nodeType="tmRoot"/>
+      </p:par>
+    </p:tnLst>
+  </p:timing>
 </p:sld>
 </file>
 
@@ -10359,7 +10497,7 @@
           <a:p>
             <a:r>
               <a:rPr lang="en-GB" dirty="0" smtClean="0"/>
-              <a:t>DEMO 3</a:t>
+              <a:t>DEMO 2</a:t>
             </a:r>
             <a:endParaRPr lang="en-GB" dirty="0"/>
           </a:p>
@@ -10573,15 +10711,7 @@
                   <a:schemeClr val="bg1"/>
                 </a:solidFill>
               </a:rPr>
-              <a:t>Data </a:t>
-            </a:r>
-            <a:r>
-              <a:rPr lang="en-US" dirty="0" smtClean="0">
-                <a:solidFill>
-                  <a:schemeClr val="bg1"/>
-                </a:solidFill>
-              </a:rPr>
-              <a:t>Factory</a:t>
+              <a:t>DevOps</a:t>
             </a:r>
           </a:p>
           <a:p>
@@ -10596,7 +10726,7 @@
                   <a:schemeClr val="bg1"/>
                 </a:solidFill>
               </a:rPr>
-              <a:t>Pipelines for Orchestrating Automation</a:t>
+              <a:t>Boards</a:t>
             </a:r>
             <a:endParaRPr lang="en-US" dirty="0">
               <a:solidFill>
@@ -10616,7 +10746,7 @@
                   <a:schemeClr val="bg1"/>
                 </a:solidFill>
               </a:rPr>
-              <a:t>Transformations: Wrangling &amp; Mapping Data Flows</a:t>
+              <a:t>Repos: enable more rapid actuarial development</a:t>
             </a:r>
             <a:endParaRPr lang="en-US" dirty="0">
               <a:solidFill>
@@ -10636,8 +10766,18 @@
                   <a:schemeClr val="bg1"/>
                 </a:solidFill>
               </a:rPr>
-              <a:t>Data movement: Including on-premises sources</a:t>
+              <a:t>Pipelines: maturing to CI/CD</a:t>
             </a:r>
+            <a:endParaRPr lang="en-US" dirty="0">
+              <a:solidFill>
+                <a:schemeClr val="bg1"/>
+              </a:solidFill>
+            </a:endParaRPr>
+          </a:p>
+          <a:p>
+            <a:pPr marL="0" indent="0">
+              <a:buNone/>
+            </a:pPr>
             <a:endParaRPr lang="en-US" dirty="0">
               <a:solidFill>
                 <a:schemeClr val="bg1"/>
@@ -10660,7 +10800,7 @@
     </p:spTree>
     <p:extLst>
       <p:ext uri="{BB962C8B-B14F-4D97-AF65-F5344CB8AC3E}">
-        <p14:creationId xmlns:p14="http://schemas.microsoft.com/office/powerpoint/2010/main" val="2835038701"/>
+        <p14:creationId xmlns:p14="http://schemas.microsoft.com/office/powerpoint/2010/main" val="4011260058"/>
       </p:ext>
     </p:extLst>
   </p:cSld>
@@ -10709,7 +10849,7 @@
           <a:p>
             <a:r>
               <a:rPr lang="en-GB" dirty="0" smtClean="0"/>
-              <a:t>DEMO 4</a:t>
+              <a:t>DEMO 3</a:t>
             </a:r>
             <a:endParaRPr lang="en-GB" dirty="0"/>
           </a:p>
@@ -10910,7 +11050,7 @@
               <a:defRPr/>
             </a:pPr>
             <a:r>
-              <a:rPr lang="en-US" dirty="0" smtClean="0">
+              <a:rPr lang="en-US" dirty="0">
                 <a:solidFill>
                   <a:schemeClr val="bg1"/>
                 </a:solidFill>
@@ -10923,7 +11063,7 @@
                   <a:schemeClr val="bg1"/>
                 </a:solidFill>
               </a:rPr>
-              <a:t>Synapse</a:t>
+              <a:t>Data Factory</a:t>
             </a:r>
           </a:p>
           <a:p>
@@ -10938,7 +11078,7 @@
                   <a:schemeClr val="bg1"/>
                 </a:solidFill>
               </a:rPr>
-              <a:t>Data exploration</a:t>
+              <a:t>Pipelines for Orchestrating Automation</a:t>
             </a:r>
             <a:endParaRPr lang="en-US" dirty="0">
               <a:solidFill>
@@ -10958,7 +11098,7 @@
                   <a:schemeClr val="bg1"/>
                 </a:solidFill>
               </a:rPr>
-              <a:t>Notebook development</a:t>
+              <a:t>Transformations: Wrangling &amp; Mapping Data Flows</a:t>
             </a:r>
             <a:endParaRPr lang="en-US" dirty="0">
               <a:solidFill>
@@ -10978,22 +11118,7 @@
                   <a:schemeClr val="bg1"/>
                 </a:solidFill>
               </a:rPr>
-              <a:t>Server-less pools</a:t>
-            </a:r>
-          </a:p>
-          <a:p>
-            <a:pPr marL="514350" indent="-514350">
-              <a:buFont typeface="+mj-lt"/>
-              <a:buAutoNum type="alphaLcParenR"/>
-              <a:defRPr/>
-            </a:pPr>
-            <a:r>
-              <a:rPr lang="en-US" dirty="0" smtClean="0">
-                <a:solidFill>
-                  <a:schemeClr val="bg1"/>
-                </a:solidFill>
-              </a:rPr>
-              <a:t>Purview: Data Dictionary &amp; Process Flows</a:t>
+              <a:t>Data movement: Including on-premises sources</a:t>
             </a:r>
             <a:endParaRPr lang="en-US" dirty="0">
               <a:solidFill>
@@ -11006,17 +11131,6 @@
               <a:buNone/>
               <a:defRPr/>
             </a:pPr>
-            <a:endParaRPr lang="en-US" dirty="0" smtClean="0">
-              <a:solidFill>
-                <a:schemeClr val="bg1"/>
-              </a:solidFill>
-            </a:endParaRPr>
-          </a:p>
-          <a:p>
-            <a:pPr marL="0" indent="0">
-              <a:buFont typeface="Arial" panose="020B0604020202020204" pitchFamily="34" charset="0"/>
-              <a:buNone/>
-            </a:pPr>
             <a:endParaRPr lang="en-US" dirty="0">
               <a:solidFill>
                 <a:schemeClr val="bg1"/>
@@ -11028,7 +11142,7 @@
     </p:spTree>
     <p:extLst>
       <p:ext uri="{BB962C8B-B14F-4D97-AF65-F5344CB8AC3E}">
-        <p14:creationId xmlns:p14="http://schemas.microsoft.com/office/powerpoint/2010/main" val="3632825499"/>
+        <p14:creationId xmlns:p14="http://schemas.microsoft.com/office/powerpoint/2010/main" val="2835038701"/>
       </p:ext>
     </p:extLst>
   </p:cSld>
@@ -11057,13 +11171,7 @@
       </p:grpSpPr>
       <p:sp>
         <p:nvSpPr>
-          <p:cNvPr id="2" name="Title 1">
-            <a:extLst>
-              <a:ext uri="{FF2B5EF4-FFF2-40B4-BE49-F238E27FC236}">
-                <a16:creationId xmlns:a16="http://schemas.microsoft.com/office/drawing/2014/main" id="{F54E66FD-9E22-544E-881E-D4336EEFC608}"/>
-              </a:ext>
-            </a:extLst>
-          </p:cNvPr>
+          <p:cNvPr id="2" name="Title 1"/>
           <p:cNvSpPr>
             <a:spLocks noGrp="1"/>
           </p:cNvSpPr>
@@ -11071,184 +11179,30 @@
             <p:ph type="title"/>
           </p:nvPr>
         </p:nvSpPr>
-        <p:spPr/>
+        <p:spPr>
+          <a:xfrm>
+            <a:off x="720676" y="1270001"/>
+            <a:ext cx="10767024" cy="774699"/>
+          </a:xfrm>
+        </p:spPr>
         <p:txBody>
-          <a:bodyPr/>
+          <a:bodyPr anchor="t"/>
           <a:lstStyle/>
           <a:p>
             <a:r>
-              <a:rPr lang="en-US" dirty="0" smtClean="0"/>
-              <a:t>Resources</a:t>
+              <a:rPr lang="en-GB" dirty="0" smtClean="0"/>
+              <a:t>DEMO 4</a:t>
             </a:r>
-            <a:endParaRPr lang="en-US" dirty="0"/>
+            <a:endParaRPr lang="en-GB" dirty="0"/>
           </a:p>
         </p:txBody>
       </p:sp>
       <p:sp>
         <p:nvSpPr>
-          <p:cNvPr id="3" name="Content Placeholder 2">
+          <p:cNvPr id="5" name="Content Placeholder 2">
             <a:extLst>
               <a:ext uri="{FF2B5EF4-FFF2-40B4-BE49-F238E27FC236}">
                 <a16:creationId xmlns:a16="http://schemas.microsoft.com/office/drawing/2014/main" id="{ED9D4C28-B53F-2540-A01A-B6984758A45C}"/>
-              </a:ext>
-            </a:extLst>
-          </p:cNvPr>
-          <p:cNvSpPr>
-            <a:spLocks noGrp="1"/>
-          </p:cNvSpPr>
-          <p:nvPr>
-            <p:ph sz="quarter" idx="12"/>
-          </p:nvPr>
-        </p:nvSpPr>
-        <p:spPr/>
-        <p:txBody>
-          <a:bodyPr>
-            <a:normAutofit/>
-          </a:bodyPr>
-          <a:lstStyle/>
-          <a:p>
-            <a:pPr marL="514350" indent="-514350">
-              <a:buFont typeface="+mj-lt"/>
-              <a:buAutoNum type="arabicPeriod"/>
-              <a:defRPr/>
-            </a:pPr>
-            <a:r>
-              <a:rPr lang="en-US" dirty="0" smtClean="0">
-                <a:gradFill>
-                  <a:gsLst>
-                    <a:gs pos="0">
-                      <a:schemeClr val="tx1"/>
-                    </a:gs>
-                    <a:gs pos="100000">
-                      <a:schemeClr val="tx1"/>
-                    </a:gs>
-                  </a:gsLst>
-                  <a:lin ang="5400000" scaled="1"/>
-                </a:gradFill>
-              </a:rPr>
-              <a:t>A</a:t>
-            </a:r>
-          </a:p>
-          <a:p>
-            <a:pPr marL="514350" indent="-514350">
-              <a:buFont typeface="+mj-lt"/>
-              <a:buAutoNum type="arabicPeriod"/>
-              <a:defRPr/>
-            </a:pPr>
-            <a:r>
-              <a:rPr lang="en-US" dirty="0" smtClean="0">
-                <a:gradFill>
-                  <a:gsLst>
-                    <a:gs pos="0">
-                      <a:schemeClr val="tx1"/>
-                    </a:gs>
-                    <a:gs pos="100000">
-                      <a:schemeClr val="tx1"/>
-                    </a:gs>
-                  </a:gsLst>
-                  <a:lin ang="5400000" scaled="1"/>
-                </a:gradFill>
-              </a:rPr>
-              <a:t>B</a:t>
-            </a:r>
-          </a:p>
-          <a:p>
-            <a:pPr marL="514350" indent="-514350">
-              <a:buFont typeface="+mj-lt"/>
-              <a:buAutoNum type="arabicPeriod"/>
-              <a:defRPr/>
-            </a:pPr>
-            <a:r>
-              <a:rPr lang="en-US" dirty="0" smtClean="0">
-                <a:gradFill>
-                  <a:gsLst>
-                    <a:gs pos="0">
-                      <a:schemeClr val="tx1"/>
-                    </a:gs>
-                    <a:gs pos="100000">
-                      <a:schemeClr val="tx1"/>
-                    </a:gs>
-                  </a:gsLst>
-                  <a:lin ang="5400000" scaled="1"/>
-                </a:gradFill>
-              </a:rPr>
-              <a:t>C</a:t>
-            </a:r>
-          </a:p>
-          <a:p>
-            <a:pPr marL="514350" indent="-514350">
-              <a:buFont typeface="+mj-lt"/>
-              <a:buAutoNum type="arabicPeriod"/>
-              <a:defRPr/>
-            </a:pPr>
-            <a:r>
-              <a:rPr lang="en-US" dirty="0" smtClean="0">
-                <a:gradFill>
-                  <a:gsLst>
-                    <a:gs pos="0">
-                      <a:schemeClr val="tx1"/>
-                    </a:gs>
-                    <a:gs pos="100000">
-                      <a:schemeClr val="tx1"/>
-                    </a:gs>
-                  </a:gsLst>
-                  <a:lin ang="5400000" scaled="1"/>
-                </a:gradFill>
-              </a:rPr>
-              <a:t>D</a:t>
-            </a:r>
-          </a:p>
-          <a:p>
-            <a:pPr marL="514350" indent="-514350">
-              <a:buFont typeface="+mj-lt"/>
-              <a:buAutoNum type="arabicPeriod"/>
-              <a:defRPr/>
-            </a:pPr>
-            <a:r>
-              <a:rPr lang="en-US" dirty="0" smtClean="0">
-                <a:gradFill>
-                  <a:gsLst>
-                    <a:gs pos="0">
-                      <a:schemeClr val="tx1"/>
-                    </a:gs>
-                    <a:gs pos="100000">
-                      <a:schemeClr val="tx1"/>
-                    </a:gs>
-                  </a:gsLst>
-                  <a:lin ang="5400000" scaled="1"/>
-                </a:gradFill>
-              </a:rPr>
-              <a:t>E</a:t>
-            </a:r>
-          </a:p>
-          <a:p>
-            <a:pPr marL="514350" indent="-514350">
-              <a:buFont typeface="+mj-lt"/>
-              <a:buAutoNum type="arabicPeriod"/>
-              <a:defRPr/>
-            </a:pPr>
-            <a:endParaRPr lang="en-US" dirty="0">
-              <a:gradFill>
-                <a:gsLst>
-                  <a:gs pos="0">
-                    <a:schemeClr val="tx1"/>
-                  </a:gs>
-                  <a:gs pos="100000">
-                    <a:schemeClr val="tx1"/>
-                  </a:gs>
-                </a:gsLst>
-                <a:lin ang="5400000" scaled="1"/>
-              </a:gradFill>
-            </a:endParaRPr>
-          </a:p>
-        </p:txBody>
-      </p:sp>
-      <p:sp>
-        <p:nvSpPr>
-          <p:cNvPr id="5" name="Google Shape;13;p7">
-            <a:extLst>
-              <a:ext uri="{FF2B5EF4-FFF2-40B4-BE49-F238E27FC236}">
-                <a16:creationId xmlns:a16="http://schemas.microsoft.com/office/drawing/2014/main" id="{3477D219-60EB-C54A-A37C-9A6DF49CDFBA}"/>
               </a:ext>
             </a:extLst>
           </p:cNvPr>
@@ -11259,274 +11213,296 @@
         </p:nvSpPr>
         <p:spPr>
           <a:xfrm>
-            <a:off x="5853565" y="6565157"/>
-            <a:ext cx="484870" cy="149788"/>
+            <a:off x="720676" y="2044700"/>
+            <a:ext cx="10767024" cy="3778994"/>
           </a:xfrm>
           <a:prstGeom prst="rect">
             <a:avLst/>
           </a:prstGeom>
-          <a:noFill/>
-          <a:ln>
-            <a:noFill/>
-          </a:ln>
         </p:spPr>
         <p:txBody>
-          <a:bodyPr spcFirstLastPara="1" wrap="square" lIns="91425" tIns="45700" rIns="91425" bIns="45700" anchor="ctr" anchorCtr="0">
-            <a:noAutofit/>
-          </a:bodyPr>
+          <a:bodyPr/>
           <a:lstStyle>
-            <a:defPPr>
-              <a:defRPr lang="en-US"/>
-            </a:defPPr>
-            <a:lvl1pPr marL="0" marR="0" lvl="0" indent="0" algn="r" defTabSz="914400" rtl="0" eaLnBrk="1" latinLnBrk="0" hangingPunct="1">
-              <a:lnSpc>
-                <a:spcPct val="100000"/>
-              </a:lnSpc>
-              <a:spcBef>
-                <a:spcPts val="0"/>
-              </a:spcBef>
-              <a:spcAft>
-                <a:spcPts val="0"/>
-              </a:spcAft>
-              <a:buClr>
-                <a:srgbClr val="000000"/>
-              </a:buClr>
-              <a:buSzPts val="825"/>
-              <a:buFont typeface="Arial"/>
-              <a:buNone/>
-              <a:defRPr sz="1300" b="0" i="0" u="none" strike="noStrike" kern="1200" cap="none">
-                <a:solidFill>
-                  <a:schemeClr val="lt1"/>
-                </a:solidFill>
-                <a:latin typeface="Calibri"/>
-                <a:ea typeface="Calibri"/>
-                <a:cs typeface="Calibri"/>
-                <a:sym typeface="Calibri"/>
+            <a:lvl1pPr marL="228600" indent="-228600" algn="l" defTabSz="914400" rtl="0" eaLnBrk="1" latinLnBrk="0" hangingPunct="1">
+              <a:lnSpc>
+                <a:spcPct val="90000"/>
+              </a:lnSpc>
+              <a:spcBef>
+                <a:spcPts val="1000"/>
+              </a:spcBef>
+              <a:buFont typeface="Arial" panose="020B0604020202020204" pitchFamily="34" charset="0"/>
+              <a:buChar char="•"/>
+              <a:defRPr sz="2800" kern="1200">
+                <a:solidFill>
+                  <a:schemeClr val="tx1"/>
+                </a:solidFill>
+                <a:latin typeface="+mn-lt"/>
+                <a:ea typeface="+mn-ea"/>
+                <a:cs typeface="+mn-cs"/>
               </a:defRPr>
             </a:lvl1pPr>
-            <a:lvl2pPr marL="0" marR="0" lvl="1" indent="0" algn="r" defTabSz="914400" rtl="0" eaLnBrk="1" latinLnBrk="0" hangingPunct="1">
-              <a:lnSpc>
-                <a:spcPct val="100000"/>
-              </a:lnSpc>
-              <a:spcBef>
-                <a:spcPts val="0"/>
-              </a:spcBef>
-              <a:spcAft>
-                <a:spcPts val="0"/>
-              </a:spcAft>
-              <a:buClr>
-                <a:srgbClr val="000000"/>
-              </a:buClr>
-              <a:buSzPts val="825"/>
-              <a:buFont typeface="Arial"/>
-              <a:buNone/>
-              <a:defRPr sz="825" b="0" i="0" u="none" strike="noStrike" kern="1200" cap="none">
-                <a:solidFill>
-                  <a:schemeClr val="lt1"/>
-                </a:solidFill>
-                <a:latin typeface="Calibri"/>
-                <a:ea typeface="Calibri"/>
-                <a:cs typeface="Calibri"/>
-                <a:sym typeface="Calibri"/>
+            <a:lvl2pPr marL="685800" indent="-228600" algn="l" defTabSz="914400" rtl="0" eaLnBrk="1" latinLnBrk="0" hangingPunct="1">
+              <a:lnSpc>
+                <a:spcPct val="90000"/>
+              </a:lnSpc>
+              <a:spcBef>
+                <a:spcPts val="500"/>
+              </a:spcBef>
+              <a:buFont typeface="Arial" panose="020B0604020202020204" pitchFamily="34" charset="0"/>
+              <a:buChar char="•"/>
+              <a:defRPr sz="2400" kern="1200">
+                <a:solidFill>
+                  <a:schemeClr val="tx1"/>
+                </a:solidFill>
+                <a:latin typeface="+mn-lt"/>
+                <a:ea typeface="+mn-ea"/>
+                <a:cs typeface="+mn-cs"/>
               </a:defRPr>
             </a:lvl2pPr>
-            <a:lvl3pPr marL="0" marR="0" lvl="2" indent="0" algn="r" defTabSz="914400" rtl="0" eaLnBrk="1" latinLnBrk="0" hangingPunct="1">
-              <a:lnSpc>
-                <a:spcPct val="100000"/>
-              </a:lnSpc>
-              <a:spcBef>
-                <a:spcPts val="0"/>
-              </a:spcBef>
-              <a:spcAft>
-                <a:spcPts val="0"/>
-              </a:spcAft>
-              <a:buClr>
-                <a:srgbClr val="000000"/>
-              </a:buClr>
-              <a:buSzPts val="825"/>
-              <a:buFont typeface="Arial"/>
-              <a:buNone/>
-              <a:defRPr sz="825" b="0" i="0" u="none" strike="noStrike" kern="1200" cap="none">
-                <a:solidFill>
-                  <a:schemeClr val="lt1"/>
-                </a:solidFill>
-                <a:latin typeface="Calibri"/>
-                <a:ea typeface="Calibri"/>
-                <a:cs typeface="Calibri"/>
-                <a:sym typeface="Calibri"/>
+            <a:lvl3pPr marL="1143000" indent="-228600" algn="l" defTabSz="914400" rtl="0" eaLnBrk="1" latinLnBrk="0" hangingPunct="1">
+              <a:lnSpc>
+                <a:spcPct val="90000"/>
+              </a:lnSpc>
+              <a:spcBef>
+                <a:spcPts val="500"/>
+              </a:spcBef>
+              <a:buFont typeface="Arial" panose="020B0604020202020204" pitchFamily="34" charset="0"/>
+              <a:buChar char="•"/>
+              <a:defRPr sz="2000" kern="1200">
+                <a:solidFill>
+                  <a:schemeClr val="tx1"/>
+                </a:solidFill>
+                <a:latin typeface="+mn-lt"/>
+                <a:ea typeface="+mn-ea"/>
+                <a:cs typeface="+mn-cs"/>
               </a:defRPr>
             </a:lvl3pPr>
-            <a:lvl4pPr marL="0" marR="0" lvl="3" indent="0" algn="r" defTabSz="914400" rtl="0" eaLnBrk="1" latinLnBrk="0" hangingPunct="1">
-              <a:lnSpc>
-                <a:spcPct val="100000"/>
-              </a:lnSpc>
-              <a:spcBef>
-                <a:spcPts val="0"/>
-              </a:spcBef>
-              <a:spcAft>
-                <a:spcPts val="0"/>
-              </a:spcAft>
-              <a:buClr>
-                <a:srgbClr val="000000"/>
-              </a:buClr>
-              <a:buSzPts val="825"/>
-              <a:buFont typeface="Arial"/>
-              <a:buNone/>
-              <a:defRPr sz="825" b="0" i="0" u="none" strike="noStrike" kern="1200" cap="none">
-                <a:solidFill>
-                  <a:schemeClr val="lt1"/>
-                </a:solidFill>
-                <a:latin typeface="Calibri"/>
-                <a:ea typeface="Calibri"/>
-                <a:cs typeface="Calibri"/>
-                <a:sym typeface="Calibri"/>
+            <a:lvl4pPr marL="1600200" indent="-228600" algn="l" defTabSz="914400" rtl="0" eaLnBrk="1" latinLnBrk="0" hangingPunct="1">
+              <a:lnSpc>
+                <a:spcPct val="90000"/>
+              </a:lnSpc>
+              <a:spcBef>
+                <a:spcPts val="500"/>
+              </a:spcBef>
+              <a:buFont typeface="Arial" panose="020B0604020202020204" pitchFamily="34" charset="0"/>
+              <a:buChar char="•"/>
+              <a:defRPr sz="1800" kern="1200">
+                <a:solidFill>
+                  <a:schemeClr val="tx1"/>
+                </a:solidFill>
+                <a:latin typeface="+mn-lt"/>
+                <a:ea typeface="+mn-ea"/>
+                <a:cs typeface="+mn-cs"/>
               </a:defRPr>
             </a:lvl4pPr>
-            <a:lvl5pPr marL="0" marR="0" lvl="4" indent="0" algn="r" defTabSz="914400" rtl="0" eaLnBrk="1" latinLnBrk="0" hangingPunct="1">
-              <a:lnSpc>
-                <a:spcPct val="100000"/>
-              </a:lnSpc>
-              <a:spcBef>
-                <a:spcPts val="0"/>
-              </a:spcBef>
-              <a:spcAft>
-                <a:spcPts val="0"/>
-              </a:spcAft>
-              <a:buClr>
-                <a:srgbClr val="000000"/>
-              </a:buClr>
-              <a:buSzPts val="825"/>
-              <a:buFont typeface="Arial"/>
-              <a:buNone/>
-              <a:defRPr sz="825" b="0" i="0" u="none" strike="noStrike" kern="1200" cap="none">
-                <a:solidFill>
-                  <a:schemeClr val="lt1"/>
-                </a:solidFill>
-                <a:latin typeface="Calibri"/>
-                <a:ea typeface="Calibri"/>
-                <a:cs typeface="Calibri"/>
-                <a:sym typeface="Calibri"/>
+            <a:lvl5pPr marL="2057400" indent="-228600" algn="l" defTabSz="914400" rtl="0" eaLnBrk="1" latinLnBrk="0" hangingPunct="1">
+              <a:lnSpc>
+                <a:spcPct val="90000"/>
+              </a:lnSpc>
+              <a:spcBef>
+                <a:spcPts val="500"/>
+              </a:spcBef>
+              <a:buFont typeface="Arial" panose="020B0604020202020204" pitchFamily="34" charset="0"/>
+              <a:buChar char="•"/>
+              <a:defRPr sz="1800" kern="1200">
+                <a:solidFill>
+                  <a:schemeClr val="tx1"/>
+                </a:solidFill>
+                <a:latin typeface="+mn-lt"/>
+                <a:ea typeface="+mn-ea"/>
+                <a:cs typeface="+mn-cs"/>
               </a:defRPr>
             </a:lvl5pPr>
-            <a:lvl6pPr marL="0" marR="0" lvl="5" indent="0" algn="r" defTabSz="914400" rtl="0" eaLnBrk="1" latinLnBrk="0" hangingPunct="1">
-              <a:lnSpc>
-                <a:spcPct val="100000"/>
-              </a:lnSpc>
-              <a:spcBef>
-                <a:spcPts val="0"/>
-              </a:spcBef>
-              <a:spcAft>
-                <a:spcPts val="0"/>
-              </a:spcAft>
-              <a:buClr>
-                <a:srgbClr val="000000"/>
-              </a:buClr>
-              <a:buSzPts val="825"/>
-              <a:buFont typeface="Arial"/>
-              <a:buNone/>
-              <a:defRPr sz="825" b="0" i="0" u="none" strike="noStrike" kern="1200" cap="none">
-                <a:solidFill>
-                  <a:schemeClr val="lt1"/>
-                </a:solidFill>
-                <a:latin typeface="Calibri"/>
-                <a:ea typeface="Calibri"/>
-                <a:cs typeface="Calibri"/>
-                <a:sym typeface="Calibri"/>
+            <a:lvl6pPr marL="2514600" indent="-228600" algn="l" defTabSz="914400" rtl="0" eaLnBrk="1" latinLnBrk="0" hangingPunct="1">
+              <a:lnSpc>
+                <a:spcPct val="90000"/>
+              </a:lnSpc>
+              <a:spcBef>
+                <a:spcPts val="500"/>
+              </a:spcBef>
+              <a:buFont typeface="Arial" panose="020B0604020202020204" pitchFamily="34" charset="0"/>
+              <a:buChar char="•"/>
+              <a:defRPr sz="1800" kern="1200">
+                <a:solidFill>
+                  <a:schemeClr val="tx1"/>
+                </a:solidFill>
+                <a:latin typeface="+mn-lt"/>
+                <a:ea typeface="+mn-ea"/>
+                <a:cs typeface="+mn-cs"/>
               </a:defRPr>
             </a:lvl6pPr>
-            <a:lvl7pPr marL="0" marR="0" lvl="6" indent="0" algn="r" defTabSz="914400" rtl="0" eaLnBrk="1" latinLnBrk="0" hangingPunct="1">
-              <a:lnSpc>
-                <a:spcPct val="100000"/>
-              </a:lnSpc>
-              <a:spcBef>
-                <a:spcPts val="0"/>
-              </a:spcBef>
-              <a:spcAft>
-                <a:spcPts val="0"/>
-              </a:spcAft>
-              <a:buClr>
-                <a:srgbClr val="000000"/>
-              </a:buClr>
-              <a:buSzPts val="825"/>
-              <a:buFont typeface="Arial"/>
-              <a:buNone/>
-              <a:defRPr sz="825" b="0" i="0" u="none" strike="noStrike" kern="1200" cap="none">
-                <a:solidFill>
-                  <a:schemeClr val="lt1"/>
-                </a:solidFill>
-                <a:latin typeface="Calibri"/>
-                <a:ea typeface="Calibri"/>
-                <a:cs typeface="Calibri"/>
-                <a:sym typeface="Calibri"/>
+            <a:lvl7pPr marL="2971800" indent="-228600" algn="l" defTabSz="914400" rtl="0" eaLnBrk="1" latinLnBrk="0" hangingPunct="1">
+              <a:lnSpc>
+                <a:spcPct val="90000"/>
+              </a:lnSpc>
+              <a:spcBef>
+                <a:spcPts val="500"/>
+              </a:spcBef>
+              <a:buFont typeface="Arial" panose="020B0604020202020204" pitchFamily="34" charset="0"/>
+              <a:buChar char="•"/>
+              <a:defRPr sz="1800" kern="1200">
+                <a:solidFill>
+                  <a:schemeClr val="tx1"/>
+                </a:solidFill>
+                <a:latin typeface="+mn-lt"/>
+                <a:ea typeface="+mn-ea"/>
+                <a:cs typeface="+mn-cs"/>
               </a:defRPr>
             </a:lvl7pPr>
-            <a:lvl8pPr marL="0" marR="0" lvl="7" indent="0" algn="r" defTabSz="914400" rtl="0" eaLnBrk="1" latinLnBrk="0" hangingPunct="1">
-              <a:lnSpc>
-                <a:spcPct val="100000"/>
-              </a:lnSpc>
-              <a:spcBef>
-                <a:spcPts val="0"/>
-              </a:spcBef>
-              <a:spcAft>
-                <a:spcPts val="0"/>
-              </a:spcAft>
-              <a:buClr>
-                <a:srgbClr val="000000"/>
-              </a:buClr>
-              <a:buSzPts val="825"/>
-              <a:buFont typeface="Arial"/>
-              <a:buNone/>
-              <a:defRPr sz="825" b="0" i="0" u="none" strike="noStrike" kern="1200" cap="none">
-                <a:solidFill>
-                  <a:schemeClr val="lt1"/>
-                </a:solidFill>
-                <a:latin typeface="Calibri"/>
-                <a:ea typeface="Calibri"/>
-                <a:cs typeface="Calibri"/>
-                <a:sym typeface="Calibri"/>
+            <a:lvl8pPr marL="3429000" indent="-228600" algn="l" defTabSz="914400" rtl="0" eaLnBrk="1" latinLnBrk="0" hangingPunct="1">
+              <a:lnSpc>
+                <a:spcPct val="90000"/>
+              </a:lnSpc>
+              <a:spcBef>
+                <a:spcPts val="500"/>
+              </a:spcBef>
+              <a:buFont typeface="Arial" panose="020B0604020202020204" pitchFamily="34" charset="0"/>
+              <a:buChar char="•"/>
+              <a:defRPr sz="1800" kern="1200">
+                <a:solidFill>
+                  <a:schemeClr val="tx1"/>
+                </a:solidFill>
+                <a:latin typeface="+mn-lt"/>
+                <a:ea typeface="+mn-ea"/>
+                <a:cs typeface="+mn-cs"/>
               </a:defRPr>
             </a:lvl8pPr>
-            <a:lvl9pPr marL="0" marR="0" lvl="8" indent="0" algn="r" defTabSz="914400" rtl="0" eaLnBrk="1" latinLnBrk="0" hangingPunct="1">
-              <a:lnSpc>
-                <a:spcPct val="100000"/>
-              </a:lnSpc>
-              <a:spcBef>
-                <a:spcPts val="0"/>
-              </a:spcBef>
-              <a:spcAft>
-                <a:spcPts val="0"/>
-              </a:spcAft>
-              <a:buClr>
-                <a:srgbClr val="000000"/>
-              </a:buClr>
-              <a:buSzPts val="825"/>
-              <a:buFont typeface="Arial"/>
-              <a:buNone/>
-              <a:defRPr sz="825" b="0" i="0" u="none" strike="noStrike" kern="1200" cap="none">
-                <a:solidFill>
-                  <a:schemeClr val="lt1"/>
-                </a:solidFill>
-                <a:latin typeface="Calibri"/>
-                <a:ea typeface="Calibri"/>
-                <a:cs typeface="Calibri"/>
-                <a:sym typeface="Calibri"/>
+            <a:lvl9pPr marL="3886200" indent="-228600" algn="l" defTabSz="914400" rtl="0" eaLnBrk="1" latinLnBrk="0" hangingPunct="1">
+              <a:lnSpc>
+                <a:spcPct val="90000"/>
+              </a:lnSpc>
+              <a:spcBef>
+                <a:spcPts val="500"/>
+              </a:spcBef>
+              <a:buFont typeface="Arial" panose="020B0604020202020204" pitchFamily="34" charset="0"/>
+              <a:buChar char="•"/>
+              <a:defRPr sz="1800" kern="1200">
+                <a:solidFill>
+                  <a:schemeClr val="tx1"/>
+                </a:solidFill>
+                <a:latin typeface="+mn-lt"/>
+                <a:ea typeface="+mn-ea"/>
+                <a:cs typeface="+mn-cs"/>
               </a:defRPr>
             </a:lvl9pPr>
           </a:lstStyle>
           <a:p>
-            <a:fld id="{00000000-1234-1234-1234-123412341234}" type="slidenum">
-              <a:rPr lang="en-US" smtClean="0"/>
-              <a:pPr/>
-              <a:t>19</a:t>
-            </a:fld>
-            <a:endParaRPr lang="en-US" dirty="0"/>
+            <a:pPr marL="0" indent="0">
+              <a:buNone/>
+              <a:defRPr/>
+            </a:pPr>
+            <a:r>
+              <a:rPr lang="en-US" dirty="0" smtClean="0">
+                <a:solidFill>
+                  <a:schemeClr val="bg1"/>
+                </a:solidFill>
+              </a:rPr>
+              <a:t>Azure Synapse</a:t>
+            </a:r>
+          </a:p>
+          <a:p>
+            <a:pPr marL="514350" indent="-514350">
+              <a:buFont typeface="+mj-lt"/>
+              <a:buAutoNum type="alphaLcParenR"/>
+              <a:defRPr/>
+            </a:pPr>
+            <a:r>
+              <a:rPr lang="en-US" dirty="0" smtClean="0">
+                <a:solidFill>
+                  <a:schemeClr val="bg1"/>
+                </a:solidFill>
+              </a:rPr>
+              <a:t>Data exploration</a:t>
+            </a:r>
+            <a:endParaRPr lang="en-US" dirty="0">
+              <a:solidFill>
+                <a:schemeClr val="bg1"/>
+              </a:solidFill>
+            </a:endParaRPr>
+          </a:p>
+          <a:p>
+            <a:pPr marL="514350" indent="-514350">
+              <a:buFont typeface="+mj-lt"/>
+              <a:buAutoNum type="alphaLcParenR"/>
+              <a:defRPr/>
+            </a:pPr>
+            <a:r>
+              <a:rPr lang="en-US" dirty="0" smtClean="0">
+                <a:solidFill>
+                  <a:schemeClr val="bg1"/>
+                </a:solidFill>
+              </a:rPr>
+              <a:t>Notebook development</a:t>
+            </a:r>
+            <a:endParaRPr lang="en-US" dirty="0">
+              <a:solidFill>
+                <a:schemeClr val="bg1"/>
+              </a:solidFill>
+            </a:endParaRPr>
+          </a:p>
+          <a:p>
+            <a:pPr marL="514350" indent="-514350">
+              <a:buFont typeface="+mj-lt"/>
+              <a:buAutoNum type="alphaLcParenR"/>
+              <a:defRPr/>
+            </a:pPr>
+            <a:r>
+              <a:rPr lang="en-US" dirty="0" smtClean="0">
+                <a:solidFill>
+                  <a:schemeClr val="bg1"/>
+                </a:solidFill>
+              </a:rPr>
+              <a:t>Server-less pools</a:t>
+            </a:r>
+          </a:p>
+          <a:p>
+            <a:pPr marL="514350" indent="-514350">
+              <a:buFont typeface="+mj-lt"/>
+              <a:buAutoNum type="alphaLcParenR"/>
+              <a:defRPr/>
+            </a:pPr>
+            <a:r>
+              <a:rPr lang="en-US" dirty="0" smtClean="0">
+                <a:solidFill>
+                  <a:schemeClr val="bg1"/>
+                </a:solidFill>
+              </a:rPr>
+              <a:t>Purview: Data Dictionary &amp; Process Flows</a:t>
+            </a:r>
+            <a:endParaRPr lang="en-US" dirty="0">
+              <a:solidFill>
+                <a:schemeClr val="bg1"/>
+              </a:solidFill>
+            </a:endParaRPr>
+          </a:p>
+          <a:p>
+            <a:pPr marL="0" indent="0">
+              <a:buNone/>
+              <a:defRPr/>
+            </a:pPr>
+            <a:endParaRPr lang="en-US" dirty="0" smtClean="0">
+              <a:solidFill>
+                <a:schemeClr val="bg1"/>
+              </a:solidFill>
+            </a:endParaRPr>
+          </a:p>
+          <a:p>
+            <a:pPr marL="0" indent="0">
+              <a:buFont typeface="Arial" panose="020B0604020202020204" pitchFamily="34" charset="0"/>
+              <a:buNone/>
+            </a:pPr>
+            <a:endParaRPr lang="en-US" dirty="0">
+              <a:solidFill>
+                <a:schemeClr val="bg1"/>
+              </a:solidFill>
+            </a:endParaRPr>
           </a:p>
         </p:txBody>
       </p:sp>
     </p:spTree>
     <p:extLst>
       <p:ext uri="{BB962C8B-B14F-4D97-AF65-F5344CB8AC3E}">
-        <p14:creationId xmlns:p14="http://schemas.microsoft.com/office/powerpoint/2010/main" val="78287089"/>
+        <p14:creationId xmlns:p14="http://schemas.microsoft.com/office/powerpoint/2010/main" val="3632825499"/>
       </p:ext>
     </p:extLst>
   </p:cSld>
@@ -11913,9 +11889,10 @@
           <a:lstStyle/>
           <a:p>
             <a:r>
-              <a:rPr lang="en-US" dirty="0"/>
-              <a:t>What is Solvency II?</a:t>
+              <a:rPr lang="en-US" dirty="0" smtClean="0"/>
+              <a:t>Resources</a:t>
             </a:r>
+            <a:endParaRPr lang="en-US" dirty="0"/>
           </a:p>
         </p:txBody>
       </p:sp>
@@ -11937,45 +11914,144 @@
         </p:nvSpPr>
         <p:spPr/>
         <p:txBody>
-          <a:bodyPr/>
+          <a:bodyPr>
+            <a:normAutofit/>
+          </a:bodyPr>
           <a:lstStyle/>
           <a:p>
-            <a:pPr lvl="0"/>
+            <a:pPr marL="514350" indent="-514350">
+              <a:buFont typeface="+mj-lt"/>
+              <a:buAutoNum type="arabicPeriod"/>
+              <a:defRPr/>
+            </a:pPr>
             <a:r>
-              <a:rPr lang="en-US" dirty="0"/>
-              <a:t>Edit Master text styles</a:t>
+              <a:rPr lang="en-US" dirty="0" smtClean="0">
+                <a:gradFill>
+                  <a:gsLst>
+                    <a:gs pos="0">
+                      <a:schemeClr val="tx1"/>
+                    </a:gs>
+                    <a:gs pos="100000">
+                      <a:schemeClr val="tx1"/>
+                    </a:gs>
+                  </a:gsLst>
+                  <a:lin ang="5400000" scaled="1"/>
+                </a:gradFill>
+              </a:rPr>
+              <a:t>A</a:t>
             </a:r>
           </a:p>
           <a:p>
-            <a:pPr lvl="1"/>
+            <a:pPr marL="514350" indent="-514350">
+              <a:buFont typeface="+mj-lt"/>
+              <a:buAutoNum type="arabicPeriod"/>
+              <a:defRPr/>
+            </a:pPr>
             <a:r>
-              <a:rPr lang="en-US" dirty="0"/>
-              <a:t>Second level</a:t>
+              <a:rPr lang="en-US" dirty="0" smtClean="0">
+                <a:gradFill>
+                  <a:gsLst>
+                    <a:gs pos="0">
+                      <a:schemeClr val="tx1"/>
+                    </a:gs>
+                    <a:gs pos="100000">
+                      <a:schemeClr val="tx1"/>
+                    </a:gs>
+                  </a:gsLst>
+                  <a:lin ang="5400000" scaled="1"/>
+                </a:gradFill>
+              </a:rPr>
+              <a:t>B</a:t>
             </a:r>
           </a:p>
           <a:p>
-            <a:pPr lvl="2"/>
+            <a:pPr marL="514350" indent="-514350">
+              <a:buFont typeface="+mj-lt"/>
+              <a:buAutoNum type="arabicPeriod"/>
+              <a:defRPr/>
+            </a:pPr>
             <a:r>
-              <a:rPr lang="en-US" dirty="0"/>
-              <a:t>Third level</a:t>
+              <a:rPr lang="en-US" dirty="0" smtClean="0">
+                <a:gradFill>
+                  <a:gsLst>
+                    <a:gs pos="0">
+                      <a:schemeClr val="tx1"/>
+                    </a:gs>
+                    <a:gs pos="100000">
+                      <a:schemeClr val="tx1"/>
+                    </a:gs>
+                  </a:gsLst>
+                  <a:lin ang="5400000" scaled="1"/>
+                </a:gradFill>
+              </a:rPr>
+              <a:t>C</a:t>
             </a:r>
           </a:p>
           <a:p>
-            <a:pPr lvl="3"/>
+            <a:pPr marL="514350" indent="-514350">
+              <a:buFont typeface="+mj-lt"/>
+              <a:buAutoNum type="arabicPeriod"/>
+              <a:defRPr/>
+            </a:pPr>
             <a:r>
-              <a:rPr lang="en-US" dirty="0"/>
-              <a:t>Fourth level</a:t>
+              <a:rPr lang="en-US" dirty="0" smtClean="0">
+                <a:gradFill>
+                  <a:gsLst>
+                    <a:gs pos="0">
+                      <a:schemeClr val="tx1"/>
+                    </a:gs>
+                    <a:gs pos="100000">
+                      <a:schemeClr val="tx1"/>
+                    </a:gs>
+                  </a:gsLst>
+                  <a:lin ang="5400000" scaled="1"/>
+                </a:gradFill>
+              </a:rPr>
+              <a:t>D</a:t>
             </a:r>
           </a:p>
           <a:p>
-            <a:pPr lvl="4"/>
+            <a:pPr marL="514350" indent="-514350">
+              <a:buFont typeface="+mj-lt"/>
+              <a:buAutoNum type="arabicPeriod"/>
+              <a:defRPr/>
+            </a:pPr>
             <a:r>
-              <a:rPr lang="en-US" dirty="0"/>
-              <a:t>Fifth level</a:t>
+              <a:rPr lang="en-US" dirty="0" smtClean="0">
+                <a:gradFill>
+                  <a:gsLst>
+                    <a:gs pos="0">
+                      <a:schemeClr val="tx1"/>
+                    </a:gs>
+                    <a:gs pos="100000">
+                      <a:schemeClr val="tx1"/>
+                    </a:gs>
+                  </a:gsLst>
+                  <a:lin ang="5400000" scaled="1"/>
+                </a:gradFill>
+              </a:rPr>
+              <a:t>E</a:t>
             </a:r>
           </a:p>
           <a:p>
-            <a:endParaRPr lang="en-US" dirty="0"/>
+            <a:pPr marL="514350" indent="-514350">
+              <a:buFont typeface="+mj-lt"/>
+              <a:buAutoNum type="arabicPeriod"/>
+              <a:defRPr/>
+            </a:pPr>
+            <a:endParaRPr lang="en-US" dirty="0">
+              <a:gradFill>
+                <a:gsLst>
+                  <a:gs pos="0">
+                    <a:schemeClr val="tx1"/>
+                  </a:gs>
+                  <a:gs pos="100000">
+                    <a:schemeClr val="tx1"/>
+                  </a:gs>
+                </a:gsLst>
+                <a:lin ang="5400000" scaled="1"/>
+              </a:gradFill>
+            </a:endParaRPr>
           </a:p>
         </p:txBody>
       </p:sp>
@@ -12262,6 +12338,404 @@
     </p:spTree>
     <p:extLst>
       <p:ext uri="{BB962C8B-B14F-4D97-AF65-F5344CB8AC3E}">
+        <p14:creationId xmlns:p14="http://schemas.microsoft.com/office/powerpoint/2010/main" val="78287089"/>
+      </p:ext>
+    </p:extLst>
+  </p:cSld>
+  <p:clrMapOvr>
+    <a:masterClrMapping/>
+  </p:clrMapOvr>
+</p:sld>
+</file>
+
+<file path=ppt/slides/slide21.xml><?xml version="1.0" encoding="utf-8"?>
+<p:sld xmlns:a="http://schemas.openxmlformats.org/drawingml/2006/main" xmlns:r="http://schemas.openxmlformats.org/officeDocument/2006/relationships" xmlns:p="http://schemas.openxmlformats.org/presentationml/2006/main">
+  <p:cSld>
+    <p:spTree>
+      <p:nvGrpSpPr>
+        <p:cNvPr id="1" name=""/>
+        <p:cNvGrpSpPr/>
+        <p:nvPr/>
+      </p:nvGrpSpPr>
+      <p:grpSpPr>
+        <a:xfrm>
+          <a:off x="0" y="0"/>
+          <a:ext cx="0" cy="0"/>
+          <a:chOff x="0" y="0"/>
+          <a:chExt cx="0" cy="0"/>
+        </a:xfrm>
+      </p:grpSpPr>
+      <p:sp>
+        <p:nvSpPr>
+          <p:cNvPr id="2" name="Title 1">
+            <a:extLst>
+              <a:ext uri="{FF2B5EF4-FFF2-40B4-BE49-F238E27FC236}">
+                <a16:creationId xmlns:a16="http://schemas.microsoft.com/office/drawing/2014/main" id="{F54E66FD-9E22-544E-881E-D4336EEFC608}"/>
+              </a:ext>
+            </a:extLst>
+          </p:cNvPr>
+          <p:cNvSpPr>
+            <a:spLocks noGrp="1"/>
+          </p:cNvSpPr>
+          <p:nvPr>
+            <p:ph type="title"/>
+          </p:nvPr>
+        </p:nvSpPr>
+        <p:spPr/>
+        <p:txBody>
+          <a:bodyPr/>
+          <a:lstStyle/>
+          <a:p>
+            <a:r>
+              <a:rPr lang="en-US" dirty="0"/>
+              <a:t>What is Solvency II?</a:t>
+            </a:r>
+          </a:p>
+        </p:txBody>
+      </p:sp>
+      <p:sp>
+        <p:nvSpPr>
+          <p:cNvPr id="3" name="Content Placeholder 2">
+            <a:extLst>
+              <a:ext uri="{FF2B5EF4-FFF2-40B4-BE49-F238E27FC236}">
+                <a16:creationId xmlns:a16="http://schemas.microsoft.com/office/drawing/2014/main" id="{ED9D4C28-B53F-2540-A01A-B6984758A45C}"/>
+              </a:ext>
+            </a:extLst>
+          </p:cNvPr>
+          <p:cNvSpPr>
+            <a:spLocks noGrp="1"/>
+          </p:cNvSpPr>
+          <p:nvPr>
+            <p:ph sz="quarter" idx="12"/>
+          </p:nvPr>
+        </p:nvSpPr>
+        <p:spPr/>
+        <p:txBody>
+          <a:bodyPr/>
+          <a:lstStyle/>
+          <a:p>
+            <a:pPr lvl="0"/>
+            <a:r>
+              <a:rPr lang="en-US" dirty="0"/>
+              <a:t>Edit Master text styles</a:t>
+            </a:r>
+          </a:p>
+          <a:p>
+            <a:pPr lvl="1"/>
+            <a:r>
+              <a:rPr lang="en-US" dirty="0"/>
+              <a:t>Second level</a:t>
+            </a:r>
+          </a:p>
+          <a:p>
+            <a:pPr lvl="2"/>
+            <a:r>
+              <a:rPr lang="en-US" dirty="0"/>
+              <a:t>Third level</a:t>
+            </a:r>
+          </a:p>
+          <a:p>
+            <a:pPr lvl="3"/>
+            <a:r>
+              <a:rPr lang="en-US" dirty="0"/>
+              <a:t>Fourth level</a:t>
+            </a:r>
+          </a:p>
+          <a:p>
+            <a:pPr lvl="4"/>
+            <a:r>
+              <a:rPr lang="en-US" dirty="0"/>
+              <a:t>Fifth level</a:t>
+            </a:r>
+          </a:p>
+          <a:p>
+            <a:endParaRPr lang="en-US" dirty="0"/>
+          </a:p>
+        </p:txBody>
+      </p:sp>
+      <p:sp>
+        <p:nvSpPr>
+          <p:cNvPr id="5" name="Google Shape;13;p7">
+            <a:extLst>
+              <a:ext uri="{FF2B5EF4-FFF2-40B4-BE49-F238E27FC236}">
+                <a16:creationId xmlns:a16="http://schemas.microsoft.com/office/drawing/2014/main" id="{3477D219-60EB-C54A-A37C-9A6DF49CDFBA}"/>
+              </a:ext>
+            </a:extLst>
+          </p:cNvPr>
+          <p:cNvSpPr txBox="1">
+            <a:spLocks/>
+          </p:cNvSpPr>
+          <p:nvPr/>
+        </p:nvSpPr>
+        <p:spPr>
+          <a:xfrm>
+            <a:off x="5853565" y="6565157"/>
+            <a:ext cx="484870" cy="149788"/>
+          </a:xfrm>
+          <a:prstGeom prst="rect">
+            <a:avLst/>
+          </a:prstGeom>
+          <a:noFill/>
+          <a:ln>
+            <a:noFill/>
+          </a:ln>
+        </p:spPr>
+        <p:txBody>
+          <a:bodyPr spcFirstLastPara="1" wrap="square" lIns="91425" tIns="45700" rIns="91425" bIns="45700" anchor="ctr" anchorCtr="0">
+            <a:noAutofit/>
+          </a:bodyPr>
+          <a:lstStyle>
+            <a:defPPr>
+              <a:defRPr lang="en-US"/>
+            </a:defPPr>
+            <a:lvl1pPr marL="0" marR="0" lvl="0" indent="0" algn="r" defTabSz="914400" rtl="0" eaLnBrk="1" latinLnBrk="0" hangingPunct="1">
+              <a:lnSpc>
+                <a:spcPct val="100000"/>
+              </a:lnSpc>
+              <a:spcBef>
+                <a:spcPts val="0"/>
+              </a:spcBef>
+              <a:spcAft>
+                <a:spcPts val="0"/>
+              </a:spcAft>
+              <a:buClr>
+                <a:srgbClr val="000000"/>
+              </a:buClr>
+              <a:buSzPts val="825"/>
+              <a:buFont typeface="Arial"/>
+              <a:buNone/>
+              <a:defRPr sz="1300" b="0" i="0" u="none" strike="noStrike" kern="1200" cap="none">
+                <a:solidFill>
+                  <a:schemeClr val="lt1"/>
+                </a:solidFill>
+                <a:latin typeface="Calibri"/>
+                <a:ea typeface="Calibri"/>
+                <a:cs typeface="Calibri"/>
+                <a:sym typeface="Calibri"/>
+              </a:defRPr>
+            </a:lvl1pPr>
+            <a:lvl2pPr marL="0" marR="0" lvl="1" indent="0" algn="r" defTabSz="914400" rtl="0" eaLnBrk="1" latinLnBrk="0" hangingPunct="1">
+              <a:lnSpc>
+                <a:spcPct val="100000"/>
+              </a:lnSpc>
+              <a:spcBef>
+                <a:spcPts val="0"/>
+              </a:spcBef>
+              <a:spcAft>
+                <a:spcPts val="0"/>
+              </a:spcAft>
+              <a:buClr>
+                <a:srgbClr val="000000"/>
+              </a:buClr>
+              <a:buSzPts val="825"/>
+              <a:buFont typeface="Arial"/>
+              <a:buNone/>
+              <a:defRPr sz="825" b="0" i="0" u="none" strike="noStrike" kern="1200" cap="none">
+                <a:solidFill>
+                  <a:schemeClr val="lt1"/>
+                </a:solidFill>
+                <a:latin typeface="Calibri"/>
+                <a:ea typeface="Calibri"/>
+                <a:cs typeface="Calibri"/>
+                <a:sym typeface="Calibri"/>
+              </a:defRPr>
+            </a:lvl2pPr>
+            <a:lvl3pPr marL="0" marR="0" lvl="2" indent="0" algn="r" defTabSz="914400" rtl="0" eaLnBrk="1" latinLnBrk="0" hangingPunct="1">
+              <a:lnSpc>
+                <a:spcPct val="100000"/>
+              </a:lnSpc>
+              <a:spcBef>
+                <a:spcPts val="0"/>
+              </a:spcBef>
+              <a:spcAft>
+                <a:spcPts val="0"/>
+              </a:spcAft>
+              <a:buClr>
+                <a:srgbClr val="000000"/>
+              </a:buClr>
+              <a:buSzPts val="825"/>
+              <a:buFont typeface="Arial"/>
+              <a:buNone/>
+              <a:defRPr sz="825" b="0" i="0" u="none" strike="noStrike" kern="1200" cap="none">
+                <a:solidFill>
+                  <a:schemeClr val="lt1"/>
+                </a:solidFill>
+                <a:latin typeface="Calibri"/>
+                <a:ea typeface="Calibri"/>
+                <a:cs typeface="Calibri"/>
+                <a:sym typeface="Calibri"/>
+              </a:defRPr>
+            </a:lvl3pPr>
+            <a:lvl4pPr marL="0" marR="0" lvl="3" indent="0" algn="r" defTabSz="914400" rtl="0" eaLnBrk="1" latinLnBrk="0" hangingPunct="1">
+              <a:lnSpc>
+                <a:spcPct val="100000"/>
+              </a:lnSpc>
+              <a:spcBef>
+                <a:spcPts val="0"/>
+              </a:spcBef>
+              <a:spcAft>
+                <a:spcPts val="0"/>
+              </a:spcAft>
+              <a:buClr>
+                <a:srgbClr val="000000"/>
+              </a:buClr>
+              <a:buSzPts val="825"/>
+              <a:buFont typeface="Arial"/>
+              <a:buNone/>
+              <a:defRPr sz="825" b="0" i="0" u="none" strike="noStrike" kern="1200" cap="none">
+                <a:solidFill>
+                  <a:schemeClr val="lt1"/>
+                </a:solidFill>
+                <a:latin typeface="Calibri"/>
+                <a:ea typeface="Calibri"/>
+                <a:cs typeface="Calibri"/>
+                <a:sym typeface="Calibri"/>
+              </a:defRPr>
+            </a:lvl4pPr>
+            <a:lvl5pPr marL="0" marR="0" lvl="4" indent="0" algn="r" defTabSz="914400" rtl="0" eaLnBrk="1" latinLnBrk="0" hangingPunct="1">
+              <a:lnSpc>
+                <a:spcPct val="100000"/>
+              </a:lnSpc>
+              <a:spcBef>
+                <a:spcPts val="0"/>
+              </a:spcBef>
+              <a:spcAft>
+                <a:spcPts val="0"/>
+              </a:spcAft>
+              <a:buClr>
+                <a:srgbClr val="000000"/>
+              </a:buClr>
+              <a:buSzPts val="825"/>
+              <a:buFont typeface="Arial"/>
+              <a:buNone/>
+              <a:defRPr sz="825" b="0" i="0" u="none" strike="noStrike" kern="1200" cap="none">
+                <a:solidFill>
+                  <a:schemeClr val="lt1"/>
+                </a:solidFill>
+                <a:latin typeface="Calibri"/>
+                <a:ea typeface="Calibri"/>
+                <a:cs typeface="Calibri"/>
+                <a:sym typeface="Calibri"/>
+              </a:defRPr>
+            </a:lvl5pPr>
+            <a:lvl6pPr marL="0" marR="0" lvl="5" indent="0" algn="r" defTabSz="914400" rtl="0" eaLnBrk="1" latinLnBrk="0" hangingPunct="1">
+              <a:lnSpc>
+                <a:spcPct val="100000"/>
+              </a:lnSpc>
+              <a:spcBef>
+                <a:spcPts val="0"/>
+              </a:spcBef>
+              <a:spcAft>
+                <a:spcPts val="0"/>
+              </a:spcAft>
+              <a:buClr>
+                <a:srgbClr val="000000"/>
+              </a:buClr>
+              <a:buSzPts val="825"/>
+              <a:buFont typeface="Arial"/>
+              <a:buNone/>
+              <a:defRPr sz="825" b="0" i="0" u="none" strike="noStrike" kern="1200" cap="none">
+                <a:solidFill>
+                  <a:schemeClr val="lt1"/>
+                </a:solidFill>
+                <a:latin typeface="Calibri"/>
+                <a:ea typeface="Calibri"/>
+                <a:cs typeface="Calibri"/>
+                <a:sym typeface="Calibri"/>
+              </a:defRPr>
+            </a:lvl6pPr>
+            <a:lvl7pPr marL="0" marR="0" lvl="6" indent="0" algn="r" defTabSz="914400" rtl="0" eaLnBrk="1" latinLnBrk="0" hangingPunct="1">
+              <a:lnSpc>
+                <a:spcPct val="100000"/>
+              </a:lnSpc>
+              <a:spcBef>
+                <a:spcPts val="0"/>
+              </a:spcBef>
+              <a:spcAft>
+                <a:spcPts val="0"/>
+              </a:spcAft>
+              <a:buClr>
+                <a:srgbClr val="000000"/>
+              </a:buClr>
+              <a:buSzPts val="825"/>
+              <a:buFont typeface="Arial"/>
+              <a:buNone/>
+              <a:defRPr sz="825" b="0" i="0" u="none" strike="noStrike" kern="1200" cap="none">
+                <a:solidFill>
+                  <a:schemeClr val="lt1"/>
+                </a:solidFill>
+                <a:latin typeface="Calibri"/>
+                <a:ea typeface="Calibri"/>
+                <a:cs typeface="Calibri"/>
+                <a:sym typeface="Calibri"/>
+              </a:defRPr>
+            </a:lvl7pPr>
+            <a:lvl8pPr marL="0" marR="0" lvl="7" indent="0" algn="r" defTabSz="914400" rtl="0" eaLnBrk="1" latinLnBrk="0" hangingPunct="1">
+              <a:lnSpc>
+                <a:spcPct val="100000"/>
+              </a:lnSpc>
+              <a:spcBef>
+                <a:spcPts val="0"/>
+              </a:spcBef>
+              <a:spcAft>
+                <a:spcPts val="0"/>
+              </a:spcAft>
+              <a:buClr>
+                <a:srgbClr val="000000"/>
+              </a:buClr>
+              <a:buSzPts val="825"/>
+              <a:buFont typeface="Arial"/>
+              <a:buNone/>
+              <a:defRPr sz="825" b="0" i="0" u="none" strike="noStrike" kern="1200" cap="none">
+                <a:solidFill>
+                  <a:schemeClr val="lt1"/>
+                </a:solidFill>
+                <a:latin typeface="Calibri"/>
+                <a:ea typeface="Calibri"/>
+                <a:cs typeface="Calibri"/>
+                <a:sym typeface="Calibri"/>
+              </a:defRPr>
+            </a:lvl8pPr>
+            <a:lvl9pPr marL="0" marR="0" lvl="8" indent="0" algn="r" defTabSz="914400" rtl="0" eaLnBrk="1" latinLnBrk="0" hangingPunct="1">
+              <a:lnSpc>
+                <a:spcPct val="100000"/>
+              </a:lnSpc>
+              <a:spcBef>
+                <a:spcPts val="0"/>
+              </a:spcBef>
+              <a:spcAft>
+                <a:spcPts val="0"/>
+              </a:spcAft>
+              <a:buClr>
+                <a:srgbClr val="000000"/>
+              </a:buClr>
+              <a:buSzPts val="825"/>
+              <a:buFont typeface="Arial"/>
+              <a:buNone/>
+              <a:defRPr sz="825" b="0" i="0" u="none" strike="noStrike" kern="1200" cap="none">
+                <a:solidFill>
+                  <a:schemeClr val="lt1"/>
+                </a:solidFill>
+                <a:latin typeface="Calibri"/>
+                <a:ea typeface="Calibri"/>
+                <a:cs typeface="Calibri"/>
+                <a:sym typeface="Calibri"/>
+              </a:defRPr>
+            </a:lvl9pPr>
+          </a:lstStyle>
+          <a:p>
+            <a:fld id="{00000000-1234-1234-1234-123412341234}" type="slidenum">
+              <a:rPr lang="en-US" smtClean="0"/>
+              <a:pPr/>
+              <a:t>21</a:t>
+            </a:fld>
+            <a:endParaRPr lang="en-US" dirty="0"/>
+          </a:p>
+        </p:txBody>
+      </p:sp>
+    </p:spTree>
+    <p:extLst>
+      <p:ext uri="{BB962C8B-B14F-4D97-AF65-F5344CB8AC3E}">
         <p14:creationId xmlns:p14="http://schemas.microsoft.com/office/powerpoint/2010/main" val="2601666717"/>
       </p:ext>
     </p:extLst>
@@ -12272,7 +12746,7 @@
 </p:sld>
 </file>
 
-<file path=ppt/slides/slide21.xml><?xml version="1.0" encoding="utf-8"?>
+<file path=ppt/slides/slide22.xml><?xml version="1.0" encoding="utf-8"?>
 <p:sld xmlns:a="http://schemas.openxmlformats.org/drawingml/2006/main" xmlns:r="http://schemas.openxmlformats.org/officeDocument/2006/relationships" xmlns:p="http://schemas.openxmlformats.org/presentationml/2006/main">
   <p:cSld>
     <p:spTree>
@@ -12986,7 +13460,7 @@
 </p:sld>
 </file>
 
-<file path=ppt/slides/slide22.xml><?xml version="1.0" encoding="utf-8"?>
+<file path=ppt/slides/slide23.xml><?xml version="1.0" encoding="utf-8"?>
 <p:sld xmlns:a="http://schemas.openxmlformats.org/drawingml/2006/main" xmlns:r="http://schemas.openxmlformats.org/officeDocument/2006/relationships" xmlns:p="http://schemas.openxmlformats.org/presentationml/2006/main">
   <p:cSld>
     <p:spTree>
@@ -13076,7 +13550,7 @@
 </p:sld>
 </file>
 
-<file path=ppt/slides/slide23.xml><?xml version="1.0" encoding="utf-8"?>
+<file path=ppt/slides/slide24.xml><?xml version="1.0" encoding="utf-8"?>
 <p:sld xmlns:a="http://schemas.openxmlformats.org/drawingml/2006/main" xmlns:r="http://schemas.openxmlformats.org/officeDocument/2006/relationships" xmlns:p="http://schemas.openxmlformats.org/presentationml/2006/main">
   <p:cSld>
     <p:spTree>
@@ -13117,7 +13591,7 @@
             <a:fld id="{00000000-1234-1234-1234-123412341234}" type="slidenum">
               <a:rPr lang="en-US" smtClean="0"/>
               <a:pPr/>
-              <a:t>23</a:t>
+              <a:t>24</a:t>
             </a:fld>
             <a:endParaRPr lang="en-US" sz="1300" dirty="0"/>
           </a:p>

</xml_diff>

<commit_message>
update demo 2 placeholders
</commit_message>
<xml_diff>
--- a/Brent-Hiram-BackToBasicsAnalyticsForActuaries_format.pptx
+++ b/Brent-Hiram-BackToBasicsAnalyticsForActuaries_format.pptx
@@ -5,10 +5,10 @@
     <p:sldMasterId id="2147483660" r:id="rId1"/>
   </p:sldMasterIdLst>
   <p:notesMasterIdLst>
-    <p:notesMasterId r:id="rId26"/>
+    <p:notesMasterId r:id="rId30"/>
   </p:notesMasterIdLst>
   <p:handoutMasterIdLst>
-    <p:handoutMasterId r:id="rId27"/>
+    <p:handoutMasterId r:id="rId31"/>
   </p:handoutMasterIdLst>
   <p:sldIdLst>
     <p:sldId id="256" r:id="rId2"/>
@@ -28,13 +28,17 @@
     <p:sldId id="293" r:id="rId16"/>
     <p:sldId id="288" r:id="rId17"/>
     <p:sldId id="282" r:id="rId18"/>
-    <p:sldId id="283" r:id="rId19"/>
-    <p:sldId id="284" r:id="rId20"/>
-    <p:sldId id="286" r:id="rId21"/>
-    <p:sldId id="279" r:id="rId22"/>
-    <p:sldId id="287" r:id="rId23"/>
-    <p:sldId id="270" r:id="rId24"/>
-    <p:sldId id="269" r:id="rId25"/>
+    <p:sldId id="294" r:id="rId19"/>
+    <p:sldId id="296" r:id="rId20"/>
+    <p:sldId id="297" r:id="rId21"/>
+    <p:sldId id="295" r:id="rId22"/>
+    <p:sldId id="283" r:id="rId23"/>
+    <p:sldId id="284" r:id="rId24"/>
+    <p:sldId id="286" r:id="rId25"/>
+    <p:sldId id="279" r:id="rId26"/>
+    <p:sldId id="287" r:id="rId27"/>
+    <p:sldId id="270" r:id="rId28"/>
+    <p:sldId id="269" r:id="rId29"/>
   </p:sldIdLst>
   <p:sldSz cx="12192000" cy="6858000"/>
   <p:notesSz cx="6858000" cy="9144000"/>
@@ -226,7 +230,7 @@
           <a:p>
             <a:fld id="{81BE6BFE-3CFF-4C6C-9E53-184BBC69E5E5}" type="datetimeFigureOut">
               <a:rPr lang="en-US" smtClean="0"/>
-              <a:t>9/21/2021</a:t>
+              <a:t>9/22/2021</a:t>
             </a:fld>
             <a:endParaRPr lang="en-US"/>
           </a:p>
@@ -356,7 +360,7 @@
           <a:p>
             <a:fld id="{8A05C1D3-7D3C-7345-81B7-83ECE6346BB3}" type="datetimeFigureOut">
               <a:rPr lang="en-US" smtClean="0"/>
-              <a:t>9/21/2021</a:t>
+              <a:t>9/22/2021</a:t>
             </a:fld>
             <a:endParaRPr lang="en-US"/>
           </a:p>
@@ -8038,7 +8042,7 @@
             <a:p>
               <a:r>
                 <a:rPr lang="en-GB" dirty="0" smtClean="0"/>
-                <a:t>SQL Server</a:t>
+                <a:t>Server</a:t>
               </a:r>
               <a:endParaRPr lang="en-GB" dirty="0"/>
             </a:p>
@@ -8911,7 +8915,7 @@
             <a:p>
               <a:r>
                 <a:rPr lang="en-GB" dirty="0" smtClean="0"/>
-                <a:t>SQL Server</a:t>
+                <a:t>Server</a:t>
               </a:r>
               <a:endParaRPr lang="en-GB" dirty="0"/>
             </a:p>
@@ -9224,7 +9228,7 @@
         </p:nvSpPr>
         <p:spPr>
           <a:xfrm>
-            <a:off x="9906538" y="4370862"/>
+            <a:off x="9782713" y="4351812"/>
             <a:ext cx="1172817" cy="436131"/>
           </a:xfrm>
           <a:prstGeom prst="rect">
@@ -9282,7 +9286,7 @@
         </p:nvSpPr>
         <p:spPr>
           <a:xfrm>
-            <a:off x="9904849" y="5199590"/>
+            <a:off x="9781024" y="5180540"/>
             <a:ext cx="1172817" cy="436131"/>
           </a:xfrm>
           <a:prstGeom prst="rect">
@@ -9340,7 +9344,7 @@
         </p:nvCxnSpPr>
         <p:spPr>
           <a:xfrm>
-            <a:off x="10489569" y="4806993"/>
+            <a:off x="10365744" y="4787943"/>
             <a:ext cx="0" cy="402537"/>
           </a:xfrm>
           <a:prstGeom prst="straightConnector1">
@@ -9406,7 +9410,7 @@
         </p:nvSpPr>
         <p:spPr>
           <a:xfrm>
-            <a:off x="6433920" y="2523279"/>
+            <a:off x="6770111" y="2545654"/>
             <a:ext cx="1858618" cy="369332"/>
           </a:xfrm>
           <a:prstGeom prst="rect">
@@ -9421,8 +9425,12 @@
           <a:lstStyle/>
           <a:p>
             <a:r>
+              <a:rPr lang="en-GB" b="1" dirty="0" smtClean="0"/>
+              <a:t>SQL</a:t>
+            </a:r>
+            <a:r>
               <a:rPr lang="en-GB" dirty="0" smtClean="0"/>
-              <a:t>SQL Server</a:t>
+              <a:t> Server</a:t>
             </a:r>
             <a:endParaRPr lang="en-GB" dirty="0"/>
           </a:p>
@@ -9436,7 +9444,7 @@
         </p:nvCxnSpPr>
         <p:spPr>
           <a:xfrm>
-            <a:off x="10451467" y="3871609"/>
+            <a:off x="10327642" y="3852559"/>
             <a:ext cx="0" cy="499253"/>
           </a:xfrm>
           <a:prstGeom prst="straightConnector1">
@@ -9464,305 +9472,238 @@
           </a:fontRef>
         </p:style>
       </p:cxnSp>
-      <p:grpSp>
-        <p:nvGrpSpPr>
-          <p:cNvPr id="3" name="Group 2"/>
-          <p:cNvGrpSpPr/>
+      <p:pic>
+        <p:nvPicPr>
+          <p:cNvPr id="70" name="Picture 69"/>
+          <p:cNvPicPr>
+            <a:picLocks noChangeAspect="1"/>
+          </p:cNvPicPr>
           <p:nvPr/>
-        </p:nvGrpSpPr>
-        <p:grpSpPr>
+        </p:nvPicPr>
+        <p:blipFill>
+          <a:blip r:embed="rId3"/>
+          <a:stretch>
+            <a:fillRect/>
+          </a:stretch>
+        </p:blipFill>
+        <p:spPr>
           <a:xfrm>
-            <a:off x="6443115" y="2613748"/>
-            <a:ext cx="4889608" cy="1537031"/>
-            <a:chOff x="6443115" y="1816077"/>
-            <a:chExt cx="4889608" cy="1537031"/>
+            <a:off x="7090879" y="3310170"/>
+            <a:ext cx="399202" cy="514356"/>
           </a:xfrm>
-        </p:grpSpPr>
-        <p:pic>
-          <p:nvPicPr>
-            <p:cNvPr id="69" name="Picture 68"/>
-            <p:cNvPicPr>
-              <a:picLocks noChangeAspect="1"/>
-            </p:cNvPicPr>
-            <p:nvPr/>
-          </p:nvPicPr>
-          <p:blipFill>
-            <a:blip r:embed="rId2"/>
-            <a:stretch>
-              <a:fillRect/>
-            </a:stretch>
-          </p:blipFill>
-          <p:spPr>
-            <a:xfrm>
-              <a:off x="8881188" y="2330729"/>
-              <a:ext cx="771525" cy="757748"/>
-            </a:xfrm>
-            <a:prstGeom prst="rect">
-              <a:avLst/>
-            </a:prstGeom>
-          </p:spPr>
-        </p:pic>
-        <p:pic>
-          <p:nvPicPr>
-            <p:cNvPr id="70" name="Picture 69"/>
-            <p:cNvPicPr>
-              <a:picLocks noChangeAspect="1"/>
-            </p:cNvPicPr>
-            <p:nvPr/>
-          </p:nvPicPr>
-          <p:blipFill>
-            <a:blip r:embed="rId3"/>
-            <a:stretch>
-              <a:fillRect/>
-            </a:stretch>
-          </p:blipFill>
-          <p:spPr>
-            <a:xfrm>
-              <a:off x="7090879" y="2512499"/>
-              <a:ext cx="399202" cy="514356"/>
-            </a:xfrm>
-            <a:prstGeom prst="rect">
-              <a:avLst/>
-            </a:prstGeom>
-          </p:spPr>
-        </p:pic>
-        <p:cxnSp>
-          <p:nvCxnSpPr>
-            <p:cNvPr id="73" name="Straight Arrow Connector 72"/>
-            <p:cNvCxnSpPr>
-              <a:stCxn id="70" idx="3"/>
-            </p:cNvCxnSpPr>
-            <p:nvPr/>
-          </p:nvCxnSpPr>
-          <p:spPr>
-            <a:xfrm>
-              <a:off x="7490081" y="2769677"/>
-              <a:ext cx="1186145" cy="0"/>
-            </a:xfrm>
-            <a:prstGeom prst="straightConnector1">
-              <a:avLst/>
-            </a:prstGeom>
-            <a:ln>
+          <a:prstGeom prst="rect">
+            <a:avLst/>
+          </a:prstGeom>
+        </p:spPr>
+      </p:pic>
+      <p:cxnSp>
+        <p:nvCxnSpPr>
+          <p:cNvPr id="73" name="Straight Arrow Connector 72"/>
+          <p:cNvCxnSpPr>
+            <a:stCxn id="70" idx="3"/>
+          </p:cNvCxnSpPr>
+          <p:nvPr/>
+        </p:nvCxnSpPr>
+        <p:spPr>
+          <a:xfrm>
+            <a:off x="7490081" y="3567348"/>
+            <a:ext cx="1863469" cy="0"/>
+          </a:xfrm>
+          <a:prstGeom prst="straightConnector1">
+            <a:avLst/>
+          </a:prstGeom>
+          <a:ln>
+            <a:solidFill>
+              <a:schemeClr val="tx1"/>
+            </a:solidFill>
+            <a:headEnd type="triangle"/>
+            <a:tailEnd type="triangle"/>
+          </a:ln>
+        </p:spPr>
+        <p:style>
+          <a:lnRef idx="1">
+            <a:schemeClr val="accent1"/>
+          </a:lnRef>
+          <a:fillRef idx="0">
+            <a:schemeClr val="accent1"/>
+          </a:fillRef>
+          <a:effectRef idx="0">
+            <a:schemeClr val="accent1"/>
+          </a:effectRef>
+          <a:fontRef idx="minor">
+            <a:schemeClr val="tx1"/>
+          </a:fontRef>
+        </p:style>
+      </p:cxnSp>
+      <p:sp>
+        <p:nvSpPr>
+          <p:cNvPr id="75" name="Rectangle 74"/>
+          <p:cNvSpPr/>
+          <p:nvPr/>
+        </p:nvSpPr>
+        <p:spPr>
+          <a:xfrm>
+            <a:off x="7672193" y="3307583"/>
+            <a:ext cx="1563943" cy="227395"/>
+          </a:xfrm>
+          <a:prstGeom prst="rect">
+            <a:avLst/>
+          </a:prstGeom>
+          <a:noFill/>
+          <a:ln w="9525">
+            <a:noFill/>
+          </a:ln>
+        </p:spPr>
+        <p:style>
+          <a:lnRef idx="2">
+            <a:schemeClr val="accent1">
+              <a:shade val="50000"/>
+            </a:schemeClr>
+          </a:lnRef>
+          <a:fillRef idx="1">
+            <a:schemeClr val="accent1"/>
+          </a:fillRef>
+          <a:effectRef idx="0">
+            <a:schemeClr val="accent1"/>
+          </a:effectRef>
+          <a:fontRef idx="minor">
+            <a:schemeClr val="lt1"/>
+          </a:fontRef>
+        </p:style>
+        <p:txBody>
+          <a:bodyPr rtlCol="0" anchor="ctr"/>
+          <a:lstStyle/>
+          <a:p>
+            <a:pPr algn="ctr"/>
+            <a:r>
+              <a:rPr lang="en-GB" sz="1200" dirty="0" smtClean="0">
+                <a:solidFill>
+                  <a:schemeClr val="tx1"/>
+                </a:solidFill>
+              </a:rPr>
+              <a:t>Direct Communication</a:t>
+            </a:r>
+            <a:endParaRPr lang="en-GB" sz="1200" dirty="0">
               <a:solidFill>
                 <a:schemeClr val="tx1"/>
               </a:solidFill>
-              <a:tailEnd type="triangle"/>
-            </a:ln>
-          </p:spPr>
-          <p:style>
-            <a:lnRef idx="1">
-              <a:schemeClr val="accent1"/>
-            </a:lnRef>
-            <a:fillRef idx="0">
-              <a:schemeClr val="accent1"/>
-            </a:fillRef>
-            <a:effectRef idx="0">
-              <a:schemeClr val="accent1"/>
-            </a:effectRef>
-            <a:fontRef idx="minor">
-              <a:schemeClr val="tx1"/>
-            </a:fontRef>
-          </p:style>
-        </p:cxnSp>
-        <p:sp>
-          <p:nvSpPr>
-            <p:cNvPr id="75" name="Rectangle 74"/>
-            <p:cNvSpPr/>
-            <p:nvPr/>
-          </p:nvSpPr>
-          <p:spPr>
-            <a:xfrm>
-              <a:off x="7731023" y="2480550"/>
-              <a:ext cx="804276" cy="227395"/>
-            </a:xfrm>
-            <a:prstGeom prst="rect">
-              <a:avLst/>
-            </a:prstGeom>
-            <a:noFill/>
-            <a:ln w="9525">
-              <a:noFill/>
-            </a:ln>
-          </p:spPr>
-          <p:style>
-            <a:lnRef idx="2">
-              <a:schemeClr val="accent1">
-                <a:shade val="50000"/>
-              </a:schemeClr>
-            </a:lnRef>
-            <a:fillRef idx="1">
-              <a:schemeClr val="accent1"/>
-            </a:fillRef>
-            <a:effectRef idx="0">
-              <a:schemeClr val="accent1"/>
-            </a:effectRef>
-            <a:fontRef idx="minor">
-              <a:schemeClr val="lt1"/>
-            </a:fontRef>
-          </p:style>
-          <p:txBody>
-            <a:bodyPr rtlCol="0" anchor="ctr"/>
-            <a:lstStyle/>
-            <a:p>
-              <a:pPr algn="ctr"/>
-              <a:r>
-                <a:rPr lang="en-GB" sz="1200" dirty="0" smtClean="0">
-                  <a:solidFill>
-                    <a:schemeClr val="tx1"/>
-                  </a:solidFill>
-                </a:rPr>
-                <a:t>Memory</a:t>
-              </a:r>
-              <a:endParaRPr lang="en-GB" sz="1200" dirty="0">
-                <a:solidFill>
-                  <a:schemeClr val="tx1"/>
-                </a:solidFill>
-              </a:endParaRPr>
-            </a:p>
-          </p:txBody>
-        </p:sp>
-        <p:sp>
-          <p:nvSpPr>
-            <p:cNvPr id="80" name="Rectangle 79"/>
-            <p:cNvSpPr/>
-            <p:nvPr/>
-          </p:nvSpPr>
-          <p:spPr>
-            <a:xfrm>
-              <a:off x="6443115" y="3076109"/>
-              <a:ext cx="2203232" cy="276999"/>
-            </a:xfrm>
-            <a:prstGeom prst="rect">
-              <a:avLst/>
-            </a:prstGeom>
-          </p:spPr>
-          <p:txBody>
-            <a:bodyPr wrap="none">
-              <a:spAutoFit/>
-            </a:bodyPr>
-            <a:lstStyle/>
-            <a:p>
-              <a:r>
-                <a:rPr lang="en-GB" sz="1200" dirty="0" smtClean="0"/>
-                <a:t>E:\Data_UserDB\ImpactSOA.mdf</a:t>
-              </a:r>
-              <a:endParaRPr lang="en-GB" sz="1200" dirty="0"/>
-            </a:p>
-          </p:txBody>
-        </p:sp>
-        <p:sp>
-          <p:nvSpPr>
-            <p:cNvPr id="81" name="Rectangle 80"/>
-            <p:cNvSpPr/>
-            <p:nvPr/>
-          </p:nvSpPr>
-          <p:spPr>
-            <a:xfrm>
-              <a:off x="8697920" y="1816077"/>
-              <a:ext cx="2634803" cy="1463837"/>
-            </a:xfrm>
-            <a:prstGeom prst="rect">
-              <a:avLst/>
-            </a:prstGeom>
-            <a:noFill/>
-            <a:ln w="19050"/>
-          </p:spPr>
-          <p:style>
-            <a:lnRef idx="2">
-              <a:schemeClr val="accent1">
-                <a:shade val="50000"/>
-              </a:schemeClr>
-            </a:lnRef>
-            <a:fillRef idx="1">
-              <a:schemeClr val="accent1"/>
-            </a:fillRef>
-            <a:effectRef idx="0">
-              <a:schemeClr val="accent1"/>
-            </a:effectRef>
-            <a:fontRef idx="minor">
-              <a:schemeClr val="lt1"/>
-            </a:fontRef>
-          </p:style>
-          <p:txBody>
-            <a:bodyPr rtlCol="0" anchor="ctr"/>
-            <a:lstStyle/>
-            <a:p>
-              <a:pPr algn="ctr"/>
-              <a:endParaRPr lang="en-GB"/>
-            </a:p>
-          </p:txBody>
-        </p:sp>
-        <p:sp>
-          <p:nvSpPr>
-            <p:cNvPr id="82" name="TextBox 81"/>
-            <p:cNvSpPr txBox="1"/>
-            <p:nvPr/>
-          </p:nvSpPr>
-          <p:spPr>
-            <a:xfrm>
-              <a:off x="8696231" y="1887606"/>
-              <a:ext cx="1858618" cy="369332"/>
-            </a:xfrm>
-            <a:prstGeom prst="rect">
-              <a:avLst/>
-            </a:prstGeom>
-            <a:noFill/>
-          </p:spPr>
-          <p:txBody>
-            <a:bodyPr wrap="square" rtlCol="0">
-              <a:spAutoFit/>
-            </a:bodyPr>
-            <a:lstStyle/>
-            <a:p>
-              <a:r>
-                <a:rPr lang="en-GB" dirty="0" smtClean="0"/>
-                <a:t>Engine</a:t>
-              </a:r>
-              <a:endParaRPr lang="en-GB" dirty="0"/>
-            </a:p>
-          </p:txBody>
-        </p:sp>
-        <p:pic>
-          <p:nvPicPr>
-            <p:cNvPr id="87" name="Picture 2" descr="R Logo Icon - Download in Flat Style"/>
-            <p:cNvPicPr>
-              <a:picLocks noChangeAspect="1" noChangeArrowheads="1"/>
-            </p:cNvPicPr>
-            <p:nvPr/>
-          </p:nvPicPr>
-          <p:blipFill>
-            <a:blip r:embed="rId4" cstate="print">
-              <a:extLst>
-                <a:ext uri="{28A0092B-C50C-407E-A947-70E740481C1C}">
-                  <a14:useLocalDpi xmlns:a14="http://schemas.microsoft.com/office/drawing/2010/main" val="0"/>
-                </a:ext>
-              </a:extLst>
-            </a:blip>
-            <a:srcRect/>
-            <a:stretch>
-              <a:fillRect/>
-            </a:stretch>
-          </p:blipFill>
-          <p:spPr bwMode="auto">
-            <a:xfrm>
-              <a:off x="10019445" y="2323313"/>
-              <a:ext cx="736591" cy="736591"/>
-            </a:xfrm>
-            <a:prstGeom prst="rect">
-              <a:avLst/>
-            </a:prstGeom>
-            <a:noFill/>
+            </a:endParaRPr>
+          </a:p>
+        </p:txBody>
+      </p:sp>
+      <p:sp>
+        <p:nvSpPr>
+          <p:cNvPr id="81" name="Rectangle 80"/>
+          <p:cNvSpPr/>
+          <p:nvPr/>
+        </p:nvSpPr>
+        <p:spPr>
+          <a:xfrm>
+            <a:off x="9368586" y="2613748"/>
+            <a:ext cx="1964137" cy="3182753"/>
+          </a:xfrm>
+          <a:prstGeom prst="rect">
+            <a:avLst/>
+          </a:prstGeom>
+          <a:noFill/>
+          <a:ln w="19050"/>
+        </p:spPr>
+        <p:style>
+          <a:lnRef idx="2">
+            <a:schemeClr val="accent1">
+              <a:shade val="50000"/>
+            </a:schemeClr>
+          </a:lnRef>
+          <a:fillRef idx="1">
+            <a:schemeClr val="accent1"/>
+          </a:fillRef>
+          <a:effectRef idx="0">
+            <a:schemeClr val="accent1"/>
+          </a:effectRef>
+          <a:fontRef idx="minor">
+            <a:schemeClr val="lt1"/>
+          </a:fontRef>
+        </p:style>
+        <p:txBody>
+          <a:bodyPr rtlCol="0" anchor="ctr"/>
+          <a:lstStyle/>
+          <a:p>
+            <a:pPr algn="ctr"/>
+            <a:endParaRPr lang="en-GB"/>
+          </a:p>
+        </p:txBody>
+      </p:sp>
+      <p:sp>
+        <p:nvSpPr>
+          <p:cNvPr id="82" name="TextBox 81"/>
+          <p:cNvSpPr txBox="1"/>
+          <p:nvPr/>
+        </p:nvSpPr>
+        <p:spPr>
+          <a:xfrm>
+            <a:off x="7672193" y="4700655"/>
+            <a:ext cx="859778" cy="276999"/>
+          </a:xfrm>
+          <a:prstGeom prst="rect">
+            <a:avLst/>
+          </a:prstGeom>
+          <a:noFill/>
+        </p:spPr>
+        <p:txBody>
+          <a:bodyPr wrap="square" rtlCol="0">
+            <a:spAutoFit/>
+          </a:bodyPr>
+          <a:lstStyle/>
+          <a:p>
+            <a:r>
+              <a:rPr lang="en-GB" sz="1200" dirty="0" smtClean="0"/>
+              <a:t>Launchpad</a:t>
+            </a:r>
+            <a:endParaRPr lang="en-GB" sz="1200" dirty="0"/>
+          </a:p>
+        </p:txBody>
+      </p:sp>
+      <p:pic>
+        <p:nvPicPr>
+          <p:cNvPr id="87" name="Picture 2" descr="R Logo Icon - Download in Flat Style"/>
+          <p:cNvPicPr>
+            <a:picLocks noChangeAspect="1" noChangeArrowheads="1"/>
+          </p:cNvPicPr>
+          <p:nvPr/>
+        </p:nvPicPr>
+        <p:blipFill>
+          <a:blip r:embed="rId4" cstate="print">
             <a:extLst>
-              <a:ext uri="{909E8E84-426E-40DD-AFC4-6F175D3DCCD1}">
-                <a14:hiddenFill xmlns:a14="http://schemas.microsoft.com/office/drawing/2010/main">
-                  <a:solidFill>
-                    <a:srgbClr val="FFFFFF"/>
-                  </a:solidFill>
-                </a14:hiddenFill>
+              <a:ext uri="{28A0092B-C50C-407E-A947-70E740481C1C}">
+                <a14:useLocalDpi xmlns:a14="http://schemas.microsoft.com/office/drawing/2010/main" val="0"/>
               </a:ext>
             </a:extLst>
-          </p:spPr>
-        </p:pic>
-      </p:grpSp>
+          </a:blip>
+          <a:srcRect/>
+          <a:stretch>
+            <a:fillRect/>
+          </a:stretch>
+        </p:blipFill>
+        <p:spPr bwMode="auto">
+          <a:xfrm>
+            <a:off x="9895620" y="3101934"/>
+            <a:ext cx="736591" cy="736591"/>
+          </a:xfrm>
+          <a:prstGeom prst="rect">
+            <a:avLst/>
+          </a:prstGeom>
+          <a:noFill/>
+          <a:extLst>
+            <a:ext uri="{909E8E84-426E-40DD-AFC4-6F175D3DCCD1}">
+              <a14:hiddenFill xmlns:a14="http://schemas.microsoft.com/office/drawing/2010/main">
+                <a:solidFill>
+                  <a:srgbClr val="FFFFFF"/>
+                </a:solidFill>
+              </a14:hiddenFill>
+            </a:ext>
+          </a:extLst>
+        </p:spPr>
+      </p:pic>
       <p:sp>
         <p:nvSpPr>
           <p:cNvPr id="41" name="Rectangle 40"/>
@@ -9821,7 +9762,7 @@
         </p:blipFill>
         <p:spPr>
           <a:xfrm>
-            <a:off x="7785498" y="1584605"/>
+            <a:off x="9145068" y="1575011"/>
             <a:ext cx="695325" cy="600075"/>
           </a:xfrm>
           <a:prstGeom prst="rect">
@@ -9882,7 +9823,7 @@
         </p:blipFill>
         <p:spPr bwMode="auto">
           <a:xfrm>
-            <a:off x="8646347" y="1595297"/>
+            <a:off x="7525218" y="1595297"/>
             <a:ext cx="1619850" cy="519198"/>
           </a:xfrm>
           <a:prstGeom prst="rect">
@@ -9908,8 +9849,8 @@
         </p:nvCxnSpPr>
         <p:spPr>
           <a:xfrm>
-            <a:off x="9036905" y="2171682"/>
-            <a:ext cx="0" cy="600701"/>
+            <a:off x="7724942" y="2171682"/>
+            <a:ext cx="0" cy="325028"/>
           </a:xfrm>
           <a:prstGeom prst="straightConnector1">
             <a:avLst/>
@@ -9936,6 +9877,161 @@
           </a:fontRef>
         </p:style>
       </p:cxnSp>
+      <p:pic>
+        <p:nvPicPr>
+          <p:cNvPr id="7" name="Picture 6"/>
+          <p:cNvPicPr>
+            <a:picLocks noChangeAspect="1"/>
+          </p:cNvPicPr>
+          <p:nvPr/>
+        </p:nvPicPr>
+        <p:blipFill>
+          <a:blip r:embed="rId7"/>
+          <a:stretch>
+            <a:fillRect/>
+          </a:stretch>
+        </p:blipFill>
+        <p:spPr>
+          <a:xfrm>
+            <a:off x="7856936" y="4950017"/>
+            <a:ext cx="485775" cy="828675"/>
+          </a:xfrm>
+          <a:prstGeom prst="rect">
+            <a:avLst/>
+          </a:prstGeom>
+        </p:spPr>
+      </p:pic>
+      <p:sp>
+        <p:nvSpPr>
+          <p:cNvPr id="58" name="TextBox 57"/>
+          <p:cNvSpPr txBox="1"/>
+          <p:nvPr/>
+        </p:nvSpPr>
+        <p:spPr>
+          <a:xfrm>
+            <a:off x="9353550" y="2623098"/>
+            <a:ext cx="1213102" cy="276999"/>
+          </a:xfrm>
+          <a:prstGeom prst="rect">
+            <a:avLst/>
+          </a:prstGeom>
+          <a:noFill/>
+        </p:spPr>
+        <p:txBody>
+          <a:bodyPr wrap="square" rtlCol="0">
+            <a:spAutoFit/>
+          </a:bodyPr>
+          <a:lstStyle/>
+          <a:p>
+            <a:r>
+              <a:rPr lang="en-GB" sz="1200" dirty="0" smtClean="0"/>
+              <a:t>Satellite</a:t>
+            </a:r>
+            <a:endParaRPr lang="en-GB" sz="1200" dirty="0"/>
+          </a:p>
+        </p:txBody>
+      </p:sp>
+      <p:cxnSp>
+        <p:nvCxnSpPr>
+          <p:cNvPr id="11" name="Elbow Connector 10"/>
+          <p:cNvCxnSpPr>
+            <a:stCxn id="70" idx="2"/>
+            <a:endCxn id="7" idx="1"/>
+          </p:cNvCxnSpPr>
+          <p:nvPr/>
+        </p:nvCxnSpPr>
+        <p:spPr>
+          <a:xfrm rot="16200000" flipH="1">
+            <a:off x="6803794" y="4311212"/>
+            <a:ext cx="1539829" cy="566456"/>
+          </a:xfrm>
+          <a:prstGeom prst="bentConnector2">
+            <a:avLst/>
+          </a:prstGeom>
+          <a:ln>
+            <a:solidFill>
+              <a:schemeClr val="tx1"/>
+            </a:solidFill>
+            <a:headEnd type="triangle"/>
+            <a:tailEnd type="triangle"/>
+          </a:ln>
+        </p:spPr>
+        <p:style>
+          <a:lnRef idx="1">
+            <a:schemeClr val="accent1"/>
+          </a:lnRef>
+          <a:fillRef idx="0">
+            <a:schemeClr val="accent1"/>
+          </a:fillRef>
+          <a:effectRef idx="0">
+            <a:schemeClr val="accent1"/>
+          </a:effectRef>
+          <a:fontRef idx="minor">
+            <a:schemeClr val="tx1"/>
+          </a:fontRef>
+        </p:style>
+      </p:cxnSp>
+      <p:cxnSp>
+        <p:nvCxnSpPr>
+          <p:cNvPr id="59" name="Straight Arrow Connector 58"/>
+          <p:cNvCxnSpPr/>
+          <p:nvPr/>
+        </p:nvCxnSpPr>
+        <p:spPr>
+          <a:xfrm>
+            <a:off x="8428495" y="5348910"/>
+            <a:ext cx="925055" cy="0"/>
+          </a:xfrm>
+          <a:prstGeom prst="straightConnector1">
+            <a:avLst/>
+          </a:prstGeom>
+          <a:ln>
+            <a:solidFill>
+              <a:schemeClr val="tx1"/>
+            </a:solidFill>
+            <a:headEnd type="none"/>
+            <a:tailEnd type="triangle"/>
+          </a:ln>
+        </p:spPr>
+        <p:style>
+          <a:lnRef idx="1">
+            <a:schemeClr val="accent1"/>
+          </a:lnRef>
+          <a:fillRef idx="0">
+            <a:schemeClr val="accent1"/>
+          </a:fillRef>
+          <a:effectRef idx="0">
+            <a:schemeClr val="accent1"/>
+          </a:effectRef>
+          <a:fontRef idx="minor">
+            <a:schemeClr val="tx1"/>
+          </a:fontRef>
+        </p:style>
+      </p:cxnSp>
+      <p:pic>
+        <p:nvPicPr>
+          <p:cNvPr id="60" name="Picture 59"/>
+          <p:cNvPicPr>
+            <a:picLocks noChangeAspect="1"/>
+          </p:cNvPicPr>
+          <p:nvPr/>
+        </p:nvPicPr>
+        <p:blipFill>
+          <a:blip r:embed="rId2"/>
+          <a:stretch>
+            <a:fillRect/>
+          </a:stretch>
+        </p:blipFill>
+        <p:spPr>
+          <a:xfrm>
+            <a:off x="6498087" y="2575476"/>
+            <a:ext cx="329462" cy="323578"/>
+          </a:xfrm>
+          <a:prstGeom prst="rect">
+            <a:avLst/>
+          </a:prstGeom>
+        </p:spPr>
+      </p:pic>
     </p:spTree>
     <p:extLst>
       <p:ext uri="{BB962C8B-B14F-4D97-AF65-F5344CB8AC3E}">
@@ -9973,6 +10069,30 @@
           <a:chExt cx="0" cy="0"/>
         </a:xfrm>
       </p:grpSpPr>
+      <p:pic>
+        <p:nvPicPr>
+          <p:cNvPr id="15" name="Picture 14"/>
+          <p:cNvPicPr>
+            <a:picLocks noChangeAspect="1"/>
+          </p:cNvPicPr>
+          <p:nvPr/>
+        </p:nvPicPr>
+        <p:blipFill>
+          <a:blip r:embed="rId2"/>
+          <a:stretch>
+            <a:fillRect/>
+          </a:stretch>
+        </p:blipFill>
+        <p:spPr>
+          <a:xfrm>
+            <a:off x="-491" y="-1"/>
+            <a:ext cx="12192491" cy="6861735"/>
+          </a:xfrm>
+          <a:prstGeom prst="rect">
+            <a:avLst/>
+          </a:prstGeom>
+        </p:spPr>
+      </p:pic>
       <p:sp>
         <p:nvSpPr>
           <p:cNvPr id="4" name="Slide Number Placeholder 3"/>
@@ -9997,30 +10117,6 @@
           </a:p>
         </p:txBody>
       </p:sp>
-      <p:pic>
-        <p:nvPicPr>
-          <p:cNvPr id="8" name="Picture 7"/>
-          <p:cNvPicPr>
-            <a:picLocks noChangeAspect="1"/>
-          </p:cNvPicPr>
-          <p:nvPr/>
-        </p:nvPicPr>
-        <p:blipFill>
-          <a:blip r:embed="rId2"/>
-          <a:stretch>
-            <a:fillRect/>
-          </a:stretch>
-        </p:blipFill>
-        <p:spPr>
-          <a:xfrm>
-            <a:off x="-11944" y="0"/>
-            <a:ext cx="12203944" cy="6858000"/>
-          </a:xfrm>
-          <a:prstGeom prst="rect">
-            <a:avLst/>
-          </a:prstGeom>
-        </p:spPr>
-      </p:pic>
       <p:sp>
         <p:nvSpPr>
           <p:cNvPr id="9" name="Rectangle 8"/>
@@ -10029,8 +10125,8 @@
         </p:nvSpPr>
         <p:spPr>
           <a:xfrm>
-            <a:off x="369652" y="233464"/>
-            <a:ext cx="3949430" cy="710119"/>
+            <a:off x="441545" y="321571"/>
+            <a:ext cx="3062305" cy="835590"/>
           </a:xfrm>
           <a:prstGeom prst="rect">
             <a:avLst/>
@@ -10077,16 +10173,14 @@
         </p:nvSpPr>
         <p:spPr>
           <a:xfrm>
-            <a:off x="651753" y="505838"/>
-            <a:ext cx="856034" cy="77822"/>
+            <a:off x="534074" y="606902"/>
+            <a:ext cx="1383738" cy="153749"/>
           </a:xfrm>
           <a:prstGeom prst="rect">
             <a:avLst/>
           </a:prstGeom>
           <a:solidFill>
-            <a:schemeClr val="bg1">
-              <a:lumMod val="95000"/>
-            </a:schemeClr>
+            <a:schemeClr val="tx1"/>
           </a:solidFill>
           <a:ln>
             <a:noFill/>
@@ -10148,7 +10242,7 @@
         </p:blipFill>
         <p:spPr>
           <a:xfrm rot="10800000" flipH="1">
-            <a:off x="5709019" y="321571"/>
+            <a:off x="5367718" y="617692"/>
             <a:ext cx="914400" cy="914400"/>
           </a:xfrm>
           <a:prstGeom prst="rect">
@@ -10164,8 +10258,8 @@
         </p:nvSpPr>
         <p:spPr>
           <a:xfrm>
-            <a:off x="5982511" y="0"/>
-            <a:ext cx="1147863" cy="233464"/>
+            <a:off x="6020475" y="0"/>
+            <a:ext cx="1480842" cy="233464"/>
           </a:xfrm>
           <a:prstGeom prst="rect">
             <a:avLst/>
@@ -10212,7 +10306,7 @@
         </p:nvSpPr>
         <p:spPr>
           <a:xfrm>
-            <a:off x="1" y="2088204"/>
+            <a:off x="47617" y="2743659"/>
             <a:ext cx="369652" cy="324255"/>
           </a:xfrm>
           <a:prstGeom prst="rect">
@@ -10241,6 +10335,52 @@
           </a:effectRef>
           <a:fontRef idx="minor">
             <a:schemeClr val="accent5"/>
+          </a:fontRef>
+        </p:style>
+        <p:txBody>
+          <a:bodyPr rtlCol="0" anchor="ctr"/>
+          <a:lstStyle/>
+          <a:p>
+            <a:pPr algn="ctr"/>
+            <a:endParaRPr lang="en-GB"/>
+          </a:p>
+        </p:txBody>
+      </p:sp>
+      <p:sp>
+        <p:nvSpPr>
+          <p:cNvPr id="14" name="Rectangle 13"/>
+          <p:cNvSpPr/>
+          <p:nvPr/>
+        </p:nvSpPr>
+        <p:spPr>
+          <a:xfrm>
+            <a:off x="4190325" y="930583"/>
+            <a:ext cx="1045222" cy="144308"/>
+          </a:xfrm>
+          <a:prstGeom prst="rect">
+            <a:avLst/>
+          </a:prstGeom>
+          <a:solidFill>
+            <a:schemeClr val="tx1"/>
+          </a:solidFill>
+          <a:ln>
+            <a:noFill/>
+          </a:ln>
+        </p:spPr>
+        <p:style>
+          <a:lnRef idx="2">
+            <a:schemeClr val="accent1">
+              <a:shade val="50000"/>
+            </a:schemeClr>
+          </a:lnRef>
+          <a:fillRef idx="1">
+            <a:schemeClr val="accent1"/>
+          </a:fillRef>
+          <a:effectRef idx="0">
+            <a:schemeClr val="accent1"/>
+          </a:effectRef>
+          <a:fontRef idx="minor">
+            <a:schemeClr val="lt1"/>
           </a:fontRef>
         </p:style>
         <p:txBody>
@@ -10330,87 +10470,87 @@
           <a:lstStyle/>
           <a:p>
             <a:r>
-              <a:rPr lang="en-GB" dirty="0">
+              <a:rPr lang="en-GB" sz="2400" dirty="0">
                 <a:hlinkClick r:id="rId2"/>
               </a:rPr>
               <a:t>https://</a:t>
             </a:r>
             <a:r>
-              <a:rPr lang="en-GB" dirty="0" smtClean="0">
+              <a:rPr lang="en-GB" sz="2400" dirty="0" smtClean="0">
                 <a:hlinkClick r:id="rId2"/>
               </a:rPr>
               <a:t>bit.ly/3zvALdN</a:t>
             </a:r>
             <a:r>
-              <a:rPr lang="en-GB" dirty="0" smtClean="0"/>
-              <a:t> (Part A)</a:t>
+              <a:rPr lang="en-GB" sz="2400" dirty="0" smtClean="0"/>
+              <a:t> (Code repository)</a:t>
             </a:r>
+            <a:endParaRPr lang="en-US" sz="2400" dirty="0" smtClean="0">
+              <a:hlinkClick r:id="rId3"/>
+            </a:endParaRPr>
           </a:p>
           <a:p>
             <a:r>
-              <a:rPr lang="en-US" dirty="0">
+              <a:rPr lang="en-US" sz="2400" dirty="0" smtClean="0">
                 <a:hlinkClick r:id="rId3"/>
-              </a:rPr>
-              <a:t>https://</a:t>
-            </a:r>
-            <a:r>
-              <a:rPr lang="en-US" dirty="0" smtClean="0">
-                <a:hlinkClick r:id="rId3"/>
-              </a:rPr>
-              <a:t>bit.ly/3kr7j4j</a:t>
-            </a:r>
-            <a:r>
-              <a:rPr lang="en-US" dirty="0" smtClean="0"/>
-              <a:t> </a:t>
-            </a:r>
-            <a:r>
-              <a:rPr lang="en-GB" dirty="0" smtClean="0"/>
-              <a:t>(</a:t>
-            </a:r>
-            <a:r>
-              <a:rPr lang="en-GB" dirty="0"/>
-              <a:t>Part </a:t>
-            </a:r>
-            <a:r>
-              <a:rPr lang="en-GB" dirty="0" smtClean="0"/>
-              <a:t>B)</a:t>
-            </a:r>
-            <a:endParaRPr lang="en-US" dirty="0" smtClean="0">
-              <a:hlinkClick r:id="rId4"/>
-            </a:endParaRPr>
-          </a:p>
-          <a:p>
-            <a:r>
-              <a:rPr lang="en-US" dirty="0" smtClean="0">
-                <a:hlinkClick r:id="rId4"/>
               </a:rPr>
               <a:t>https://www.rstudio.com/products/rstudio/download/</a:t>
             </a:r>
-            <a:endParaRPr lang="en-US" dirty="0" smtClean="0"/>
+            <a:endParaRPr lang="en-US" sz="2400" dirty="0" smtClean="0"/>
           </a:p>
           <a:p>
             <a:r>
-              <a:rPr lang="en-US" dirty="0">
-                <a:hlinkClick r:id="rId5"/>
+              <a:rPr lang="en-US" sz="2400" dirty="0">
+                <a:hlinkClick r:id="rId4"/>
               </a:rPr>
               <a:t>Reading data from Microsoft SQL Server into R - Stack Overflow</a:t>
             </a:r>
-            <a:endParaRPr lang="en-GB" dirty="0" smtClean="0"/>
+            <a:endParaRPr lang="en-GB" sz="2400" dirty="0" smtClean="0"/>
           </a:p>
           <a:p>
             <a:r>
-              <a:rPr lang="en-US" dirty="0" smtClean="0">
-                <a:hlinkClick r:id="rId6"/>
+              <a:rPr lang="en-US" sz="2400" dirty="0" smtClean="0">
+                <a:hlinkClick r:id="rId5"/>
               </a:rPr>
               <a:t>Install </a:t>
             </a:r>
             <a:r>
-              <a:rPr lang="en-US" dirty="0">
+              <a:rPr lang="en-US" sz="2400" dirty="0">
+                <a:hlinkClick r:id="rId5"/>
+              </a:rPr>
+              <a:t>on Windows - SQL Server Machine Learning Services | Microsoft </a:t>
+            </a:r>
+            <a:r>
+              <a:rPr lang="en-US" sz="2400" dirty="0" smtClean="0">
+                <a:hlinkClick r:id="rId5"/>
+              </a:rPr>
+              <a:t>Docs</a:t>
+            </a:r>
+            <a:endParaRPr lang="en-US" sz="2400" dirty="0" smtClean="0"/>
+          </a:p>
+          <a:p>
+            <a:r>
+              <a:rPr lang="en-US" sz="2400" dirty="0">
                 <a:hlinkClick r:id="rId6"/>
               </a:rPr>
-              <a:t>on Windows - SQL Server Machine Learning Services | Microsoft Docs</a:t>
+              <a:t>R language extension - SQL Server Machine Learning Services | Microsoft </a:t>
             </a:r>
-            <a:endParaRPr lang="en-GB" dirty="0" smtClean="0"/>
+            <a:r>
+              <a:rPr lang="en-US" sz="2400" dirty="0" smtClean="0">
+                <a:hlinkClick r:id="rId6"/>
+              </a:rPr>
+              <a:t>Docs</a:t>
+            </a:r>
+            <a:endParaRPr lang="en-US" sz="2400" dirty="0" smtClean="0"/>
+          </a:p>
+          <a:p>
+            <a:r>
+              <a:rPr lang="en-US" sz="2400" dirty="0">
+                <a:hlinkClick r:id="rId7"/>
+              </a:rPr>
+              <a:t>CREATE EXTERNAL LIBRARY (Transact-SQL) - SQL Server - SQL Server | Microsoft Docs</a:t>
+            </a:r>
+            <a:endParaRPr lang="en-GB" sz="2400" dirty="0" smtClean="0"/>
           </a:p>
         </p:txBody>
       </p:sp>
@@ -10829,320 +10969,73 @@
       </p:grpSpPr>
       <p:sp>
         <p:nvSpPr>
-          <p:cNvPr id="2" name="Title 1"/>
+          <p:cNvPr id="4" name="Slide Number Placeholder 3"/>
           <p:cNvSpPr>
             <a:spLocks noGrp="1"/>
           </p:cNvSpPr>
           <p:nvPr>
-            <p:ph type="title"/>
+            <p:ph type="sldNum" idx="4"/>
           </p:nvPr>
         </p:nvSpPr>
-        <p:spPr>
-          <a:xfrm>
-            <a:off x="720676" y="1270001"/>
-            <a:ext cx="10767024" cy="774699"/>
-          </a:xfrm>
-        </p:spPr>
+        <p:spPr/>
         <p:txBody>
-          <a:bodyPr anchor="t"/>
+          <a:bodyPr/>
           <a:lstStyle/>
           <a:p>
-            <a:r>
-              <a:rPr lang="en-GB" dirty="0" smtClean="0"/>
-              <a:t>DEMO 3</a:t>
-            </a:r>
-            <a:endParaRPr lang="en-GB" dirty="0"/>
+            <a:fld id="{00000000-1234-1234-1234-123412341234}" type="slidenum">
+              <a:rPr lang="en-US" smtClean="0"/>
+              <a:pPr/>
+              <a:t>18</a:t>
+            </a:fld>
+            <a:endParaRPr lang="en-US" sz="1300" dirty="0"/>
           </a:p>
         </p:txBody>
       </p:sp>
-      <p:sp>
-        <p:nvSpPr>
-          <p:cNvPr id="5" name="Content Placeholder 2">
+      <p:pic>
+        <p:nvPicPr>
+          <p:cNvPr id="1026" name="Picture 2" descr="https://azurecomcdn.azureedge.net/cvt-29bb5b361a30509ed9e5daf51ad1318c032a10805d9ab60ea21edf9042d6f872/images/page/services/devops/boards/screenshot.jpg"/>
+          <p:cNvPicPr>
+            <a:picLocks noChangeAspect="1" noChangeArrowheads="1"/>
+          </p:cNvPicPr>
+          <p:nvPr/>
+        </p:nvPicPr>
+        <p:blipFill>
+          <a:blip r:embed="rId2">
             <a:extLst>
-              <a:ext uri="{FF2B5EF4-FFF2-40B4-BE49-F238E27FC236}">
-                <a16:creationId xmlns:a16="http://schemas.microsoft.com/office/drawing/2014/main" id="{ED9D4C28-B53F-2540-A01A-B6984758A45C}"/>
+              <a:ext uri="{28A0092B-C50C-407E-A947-70E740481C1C}">
+                <a14:useLocalDpi xmlns:a14="http://schemas.microsoft.com/office/drawing/2010/main" val="0"/>
               </a:ext>
             </a:extLst>
-          </p:cNvPr>
-          <p:cNvSpPr txBox="1">
-            <a:spLocks/>
-          </p:cNvSpPr>
-          <p:nvPr/>
-        </p:nvSpPr>
-        <p:spPr>
+          </a:blip>
+          <a:srcRect/>
+          <a:stretch>
+            <a:fillRect/>
+          </a:stretch>
+        </p:blipFill>
+        <p:spPr bwMode="auto">
           <a:xfrm>
-            <a:off x="720676" y="2044700"/>
-            <a:ext cx="10767024" cy="3778994"/>
+            <a:off x="1095643" y="0"/>
+            <a:ext cx="10000713" cy="6375455"/>
           </a:xfrm>
           <a:prstGeom prst="rect">
             <a:avLst/>
           </a:prstGeom>
+          <a:noFill/>
+          <a:extLst>
+            <a:ext uri="{909E8E84-426E-40DD-AFC4-6F175D3DCCD1}">
+              <a14:hiddenFill xmlns:a14="http://schemas.microsoft.com/office/drawing/2010/main">
+                <a:solidFill>
+                  <a:srgbClr val="FFFFFF"/>
+                </a:solidFill>
+              </a14:hiddenFill>
+            </a:ext>
+          </a:extLst>
         </p:spPr>
-        <p:txBody>
-          <a:bodyPr/>
-          <a:lstStyle>
-            <a:lvl1pPr marL="228600" indent="-228600" algn="l" defTabSz="914400" rtl="0" eaLnBrk="1" latinLnBrk="0" hangingPunct="1">
-              <a:lnSpc>
-                <a:spcPct val="90000"/>
-              </a:lnSpc>
-              <a:spcBef>
-                <a:spcPts val="1000"/>
-              </a:spcBef>
-              <a:buFont typeface="Arial" panose="020B0604020202020204" pitchFamily="34" charset="0"/>
-              <a:buChar char="•"/>
-              <a:defRPr sz="2800" kern="1200">
-                <a:solidFill>
-                  <a:schemeClr val="tx1"/>
-                </a:solidFill>
-                <a:latin typeface="+mn-lt"/>
-                <a:ea typeface="+mn-ea"/>
-                <a:cs typeface="+mn-cs"/>
-              </a:defRPr>
-            </a:lvl1pPr>
-            <a:lvl2pPr marL="685800" indent="-228600" algn="l" defTabSz="914400" rtl="0" eaLnBrk="1" latinLnBrk="0" hangingPunct="1">
-              <a:lnSpc>
-                <a:spcPct val="90000"/>
-              </a:lnSpc>
-              <a:spcBef>
-                <a:spcPts val="500"/>
-              </a:spcBef>
-              <a:buFont typeface="Arial" panose="020B0604020202020204" pitchFamily="34" charset="0"/>
-              <a:buChar char="•"/>
-              <a:defRPr sz="2400" kern="1200">
-                <a:solidFill>
-                  <a:schemeClr val="tx1"/>
-                </a:solidFill>
-                <a:latin typeface="+mn-lt"/>
-                <a:ea typeface="+mn-ea"/>
-                <a:cs typeface="+mn-cs"/>
-              </a:defRPr>
-            </a:lvl2pPr>
-            <a:lvl3pPr marL="1143000" indent="-228600" algn="l" defTabSz="914400" rtl="0" eaLnBrk="1" latinLnBrk="0" hangingPunct="1">
-              <a:lnSpc>
-                <a:spcPct val="90000"/>
-              </a:lnSpc>
-              <a:spcBef>
-                <a:spcPts val="500"/>
-              </a:spcBef>
-              <a:buFont typeface="Arial" panose="020B0604020202020204" pitchFamily="34" charset="0"/>
-              <a:buChar char="•"/>
-              <a:defRPr sz="2000" kern="1200">
-                <a:solidFill>
-                  <a:schemeClr val="tx1"/>
-                </a:solidFill>
-                <a:latin typeface="+mn-lt"/>
-                <a:ea typeface="+mn-ea"/>
-                <a:cs typeface="+mn-cs"/>
-              </a:defRPr>
-            </a:lvl3pPr>
-            <a:lvl4pPr marL="1600200" indent="-228600" algn="l" defTabSz="914400" rtl="0" eaLnBrk="1" latinLnBrk="0" hangingPunct="1">
-              <a:lnSpc>
-                <a:spcPct val="90000"/>
-              </a:lnSpc>
-              <a:spcBef>
-                <a:spcPts val="500"/>
-              </a:spcBef>
-              <a:buFont typeface="Arial" panose="020B0604020202020204" pitchFamily="34" charset="0"/>
-              <a:buChar char="•"/>
-              <a:defRPr sz="1800" kern="1200">
-                <a:solidFill>
-                  <a:schemeClr val="tx1"/>
-                </a:solidFill>
-                <a:latin typeface="+mn-lt"/>
-                <a:ea typeface="+mn-ea"/>
-                <a:cs typeface="+mn-cs"/>
-              </a:defRPr>
-            </a:lvl4pPr>
-            <a:lvl5pPr marL="2057400" indent="-228600" algn="l" defTabSz="914400" rtl="0" eaLnBrk="1" latinLnBrk="0" hangingPunct="1">
-              <a:lnSpc>
-                <a:spcPct val="90000"/>
-              </a:lnSpc>
-              <a:spcBef>
-                <a:spcPts val="500"/>
-              </a:spcBef>
-              <a:buFont typeface="Arial" panose="020B0604020202020204" pitchFamily="34" charset="0"/>
-              <a:buChar char="•"/>
-              <a:defRPr sz="1800" kern="1200">
-                <a:solidFill>
-                  <a:schemeClr val="tx1"/>
-                </a:solidFill>
-                <a:latin typeface="+mn-lt"/>
-                <a:ea typeface="+mn-ea"/>
-                <a:cs typeface="+mn-cs"/>
-              </a:defRPr>
-            </a:lvl5pPr>
-            <a:lvl6pPr marL="2514600" indent="-228600" algn="l" defTabSz="914400" rtl="0" eaLnBrk="1" latinLnBrk="0" hangingPunct="1">
-              <a:lnSpc>
-                <a:spcPct val="90000"/>
-              </a:lnSpc>
-              <a:spcBef>
-                <a:spcPts val="500"/>
-              </a:spcBef>
-              <a:buFont typeface="Arial" panose="020B0604020202020204" pitchFamily="34" charset="0"/>
-              <a:buChar char="•"/>
-              <a:defRPr sz="1800" kern="1200">
-                <a:solidFill>
-                  <a:schemeClr val="tx1"/>
-                </a:solidFill>
-                <a:latin typeface="+mn-lt"/>
-                <a:ea typeface="+mn-ea"/>
-                <a:cs typeface="+mn-cs"/>
-              </a:defRPr>
-            </a:lvl6pPr>
-            <a:lvl7pPr marL="2971800" indent="-228600" algn="l" defTabSz="914400" rtl="0" eaLnBrk="1" latinLnBrk="0" hangingPunct="1">
-              <a:lnSpc>
-                <a:spcPct val="90000"/>
-              </a:lnSpc>
-              <a:spcBef>
-                <a:spcPts val="500"/>
-              </a:spcBef>
-              <a:buFont typeface="Arial" panose="020B0604020202020204" pitchFamily="34" charset="0"/>
-              <a:buChar char="•"/>
-              <a:defRPr sz="1800" kern="1200">
-                <a:solidFill>
-                  <a:schemeClr val="tx1"/>
-                </a:solidFill>
-                <a:latin typeface="+mn-lt"/>
-                <a:ea typeface="+mn-ea"/>
-                <a:cs typeface="+mn-cs"/>
-              </a:defRPr>
-            </a:lvl7pPr>
-            <a:lvl8pPr marL="3429000" indent="-228600" algn="l" defTabSz="914400" rtl="0" eaLnBrk="1" latinLnBrk="0" hangingPunct="1">
-              <a:lnSpc>
-                <a:spcPct val="90000"/>
-              </a:lnSpc>
-              <a:spcBef>
-                <a:spcPts val="500"/>
-              </a:spcBef>
-              <a:buFont typeface="Arial" panose="020B0604020202020204" pitchFamily="34" charset="0"/>
-              <a:buChar char="•"/>
-              <a:defRPr sz="1800" kern="1200">
-                <a:solidFill>
-                  <a:schemeClr val="tx1"/>
-                </a:solidFill>
-                <a:latin typeface="+mn-lt"/>
-                <a:ea typeface="+mn-ea"/>
-                <a:cs typeface="+mn-cs"/>
-              </a:defRPr>
-            </a:lvl8pPr>
-            <a:lvl9pPr marL="3886200" indent="-228600" algn="l" defTabSz="914400" rtl="0" eaLnBrk="1" latinLnBrk="0" hangingPunct="1">
-              <a:lnSpc>
-                <a:spcPct val="90000"/>
-              </a:lnSpc>
-              <a:spcBef>
-                <a:spcPts val="500"/>
-              </a:spcBef>
-              <a:buFont typeface="Arial" panose="020B0604020202020204" pitchFamily="34" charset="0"/>
-              <a:buChar char="•"/>
-              <a:defRPr sz="1800" kern="1200">
-                <a:solidFill>
-                  <a:schemeClr val="tx1"/>
-                </a:solidFill>
-                <a:latin typeface="+mn-lt"/>
-                <a:ea typeface="+mn-ea"/>
-                <a:cs typeface="+mn-cs"/>
-              </a:defRPr>
-            </a:lvl9pPr>
-          </a:lstStyle>
-          <a:p>
-            <a:pPr marL="0" indent="0">
-              <a:buNone/>
-              <a:defRPr/>
-            </a:pPr>
-            <a:r>
-              <a:rPr lang="en-US" dirty="0">
-                <a:solidFill>
-                  <a:schemeClr val="bg1"/>
-                </a:solidFill>
-              </a:rPr>
-              <a:t>Azure </a:t>
-            </a:r>
-            <a:r>
-              <a:rPr lang="en-US" dirty="0" smtClean="0">
-                <a:solidFill>
-                  <a:schemeClr val="bg1"/>
-                </a:solidFill>
-              </a:rPr>
-              <a:t>Data Factory</a:t>
-            </a:r>
-          </a:p>
-          <a:p>
-            <a:pPr marL="514350" indent="-514350">
-              <a:buFont typeface="+mj-lt"/>
-              <a:buAutoNum type="alphaLcParenR"/>
-              <a:defRPr/>
-            </a:pPr>
-            <a:r>
-              <a:rPr lang="en-US" dirty="0" smtClean="0">
-                <a:solidFill>
-                  <a:schemeClr val="bg1"/>
-                </a:solidFill>
-              </a:rPr>
-              <a:t>Pipelines for Orchestrating Automation</a:t>
-            </a:r>
-            <a:endParaRPr lang="en-US" dirty="0">
-              <a:solidFill>
-                <a:schemeClr val="bg1"/>
-              </a:solidFill>
-            </a:endParaRPr>
-          </a:p>
-          <a:p>
-            <a:pPr marL="514350" indent="-514350">
-              <a:buFont typeface="+mj-lt"/>
-              <a:buAutoNum type="alphaLcParenR"/>
-              <a:defRPr/>
-            </a:pPr>
-            <a:r>
-              <a:rPr lang="en-US" dirty="0" smtClean="0">
-                <a:solidFill>
-                  <a:schemeClr val="bg1"/>
-                </a:solidFill>
-              </a:rPr>
-              <a:t>Transformations: Wrangling &amp; Mapping Data Flows</a:t>
-            </a:r>
-            <a:endParaRPr lang="en-US" dirty="0">
-              <a:solidFill>
-                <a:schemeClr val="bg1"/>
-              </a:solidFill>
-            </a:endParaRPr>
-          </a:p>
-          <a:p>
-            <a:pPr marL="514350" indent="-514350">
-              <a:buFont typeface="+mj-lt"/>
-              <a:buAutoNum type="alphaLcParenR"/>
-              <a:defRPr/>
-            </a:pPr>
-            <a:r>
-              <a:rPr lang="en-US" dirty="0" smtClean="0">
-                <a:solidFill>
-                  <a:schemeClr val="bg1"/>
-                </a:solidFill>
-              </a:rPr>
-              <a:t>Data movement: Including on-premises sources</a:t>
-            </a:r>
-            <a:endParaRPr lang="en-US" dirty="0">
-              <a:solidFill>
-                <a:schemeClr val="bg1"/>
-              </a:solidFill>
-            </a:endParaRPr>
-          </a:p>
-          <a:p>
-            <a:pPr marL="0" indent="0">
-              <a:buNone/>
-              <a:defRPr/>
-            </a:pPr>
-            <a:endParaRPr lang="en-US" dirty="0">
-              <a:solidFill>
-                <a:schemeClr val="bg1"/>
-              </a:solidFill>
-            </a:endParaRPr>
-          </a:p>
-        </p:txBody>
-      </p:sp>
+      </p:pic>
     </p:spTree>
     <p:extLst>
       <p:ext uri="{BB962C8B-B14F-4D97-AF65-F5344CB8AC3E}">
-        <p14:creationId xmlns:p14="http://schemas.microsoft.com/office/powerpoint/2010/main" val="2835038701"/>
+        <p14:creationId xmlns:p14="http://schemas.microsoft.com/office/powerpoint/2010/main" val="3919383165"/>
       </p:ext>
     </p:extLst>
   </p:cSld>
@@ -11171,338 +11064,73 @@
       </p:grpSpPr>
       <p:sp>
         <p:nvSpPr>
-          <p:cNvPr id="2" name="Title 1"/>
+          <p:cNvPr id="4" name="Slide Number Placeholder 3"/>
           <p:cNvSpPr>
             <a:spLocks noGrp="1"/>
           </p:cNvSpPr>
           <p:nvPr>
-            <p:ph type="title"/>
+            <p:ph type="sldNum" idx="4"/>
           </p:nvPr>
         </p:nvSpPr>
-        <p:spPr>
-          <a:xfrm>
-            <a:off x="720676" y="1270001"/>
-            <a:ext cx="10767024" cy="774699"/>
-          </a:xfrm>
-        </p:spPr>
+        <p:spPr/>
         <p:txBody>
-          <a:bodyPr anchor="t"/>
+          <a:bodyPr/>
           <a:lstStyle/>
           <a:p>
-            <a:r>
-              <a:rPr lang="en-GB" dirty="0" smtClean="0"/>
-              <a:t>DEMO 4</a:t>
-            </a:r>
-            <a:endParaRPr lang="en-GB" dirty="0"/>
+            <a:fld id="{00000000-1234-1234-1234-123412341234}" type="slidenum">
+              <a:rPr lang="en-US" smtClean="0"/>
+              <a:pPr/>
+              <a:t>19</a:t>
+            </a:fld>
+            <a:endParaRPr lang="en-US" sz="1300" dirty="0"/>
           </a:p>
         </p:txBody>
       </p:sp>
-      <p:sp>
-        <p:nvSpPr>
-          <p:cNvPr id="5" name="Content Placeholder 2">
+      <p:pic>
+        <p:nvPicPr>
+          <p:cNvPr id="2054" name="Picture 6" descr="https://azurecomcdn.azureedge.net/cvt-29bb5b361a30509ed9e5daf51ad1318c032a10805d9ab60ea21edf9042d6f872/images/page/services/devops/repos/screenshot.jpg"/>
+          <p:cNvPicPr>
+            <a:picLocks noChangeAspect="1" noChangeArrowheads="1"/>
+          </p:cNvPicPr>
+          <p:nvPr/>
+        </p:nvPicPr>
+        <p:blipFill>
+          <a:blip r:embed="rId2" cstate="print">
             <a:extLst>
-              <a:ext uri="{FF2B5EF4-FFF2-40B4-BE49-F238E27FC236}">
-                <a16:creationId xmlns:a16="http://schemas.microsoft.com/office/drawing/2014/main" id="{ED9D4C28-B53F-2540-A01A-B6984758A45C}"/>
+              <a:ext uri="{28A0092B-C50C-407E-A947-70E740481C1C}">
+                <a14:useLocalDpi xmlns:a14="http://schemas.microsoft.com/office/drawing/2010/main" val="0"/>
               </a:ext>
             </a:extLst>
-          </p:cNvPr>
-          <p:cNvSpPr txBox="1">
-            <a:spLocks/>
-          </p:cNvSpPr>
-          <p:nvPr/>
-        </p:nvSpPr>
-        <p:spPr>
+          </a:blip>
+          <a:srcRect/>
+          <a:stretch>
+            <a:fillRect/>
+          </a:stretch>
+        </p:blipFill>
+        <p:spPr bwMode="auto">
           <a:xfrm>
-            <a:off x="720676" y="2044700"/>
-            <a:ext cx="10767024" cy="3778994"/>
+            <a:off x="1131891" y="-1"/>
+            <a:ext cx="9878327" cy="6297433"/>
           </a:xfrm>
           <a:prstGeom prst="rect">
             <a:avLst/>
           </a:prstGeom>
+          <a:noFill/>
+          <a:extLst>
+            <a:ext uri="{909E8E84-426E-40DD-AFC4-6F175D3DCCD1}">
+              <a14:hiddenFill xmlns:a14="http://schemas.microsoft.com/office/drawing/2010/main">
+                <a:solidFill>
+                  <a:srgbClr val="FFFFFF"/>
+                </a:solidFill>
+              </a14:hiddenFill>
+            </a:ext>
+          </a:extLst>
         </p:spPr>
-        <p:txBody>
-          <a:bodyPr/>
-          <a:lstStyle>
-            <a:lvl1pPr marL="228600" indent="-228600" algn="l" defTabSz="914400" rtl="0" eaLnBrk="1" latinLnBrk="0" hangingPunct="1">
-              <a:lnSpc>
-                <a:spcPct val="90000"/>
-              </a:lnSpc>
-              <a:spcBef>
-                <a:spcPts val="1000"/>
-              </a:spcBef>
-              <a:buFont typeface="Arial" panose="020B0604020202020204" pitchFamily="34" charset="0"/>
-              <a:buChar char="•"/>
-              <a:defRPr sz="2800" kern="1200">
-                <a:solidFill>
-                  <a:schemeClr val="tx1"/>
-                </a:solidFill>
-                <a:latin typeface="+mn-lt"/>
-                <a:ea typeface="+mn-ea"/>
-                <a:cs typeface="+mn-cs"/>
-              </a:defRPr>
-            </a:lvl1pPr>
-            <a:lvl2pPr marL="685800" indent="-228600" algn="l" defTabSz="914400" rtl="0" eaLnBrk="1" latinLnBrk="0" hangingPunct="1">
-              <a:lnSpc>
-                <a:spcPct val="90000"/>
-              </a:lnSpc>
-              <a:spcBef>
-                <a:spcPts val="500"/>
-              </a:spcBef>
-              <a:buFont typeface="Arial" panose="020B0604020202020204" pitchFamily="34" charset="0"/>
-              <a:buChar char="•"/>
-              <a:defRPr sz="2400" kern="1200">
-                <a:solidFill>
-                  <a:schemeClr val="tx1"/>
-                </a:solidFill>
-                <a:latin typeface="+mn-lt"/>
-                <a:ea typeface="+mn-ea"/>
-                <a:cs typeface="+mn-cs"/>
-              </a:defRPr>
-            </a:lvl2pPr>
-            <a:lvl3pPr marL="1143000" indent="-228600" algn="l" defTabSz="914400" rtl="0" eaLnBrk="1" latinLnBrk="0" hangingPunct="1">
-              <a:lnSpc>
-                <a:spcPct val="90000"/>
-              </a:lnSpc>
-              <a:spcBef>
-                <a:spcPts val="500"/>
-              </a:spcBef>
-              <a:buFont typeface="Arial" panose="020B0604020202020204" pitchFamily="34" charset="0"/>
-              <a:buChar char="•"/>
-              <a:defRPr sz="2000" kern="1200">
-                <a:solidFill>
-                  <a:schemeClr val="tx1"/>
-                </a:solidFill>
-                <a:latin typeface="+mn-lt"/>
-                <a:ea typeface="+mn-ea"/>
-                <a:cs typeface="+mn-cs"/>
-              </a:defRPr>
-            </a:lvl3pPr>
-            <a:lvl4pPr marL="1600200" indent="-228600" algn="l" defTabSz="914400" rtl="0" eaLnBrk="1" latinLnBrk="0" hangingPunct="1">
-              <a:lnSpc>
-                <a:spcPct val="90000"/>
-              </a:lnSpc>
-              <a:spcBef>
-                <a:spcPts val="500"/>
-              </a:spcBef>
-              <a:buFont typeface="Arial" panose="020B0604020202020204" pitchFamily="34" charset="0"/>
-              <a:buChar char="•"/>
-              <a:defRPr sz="1800" kern="1200">
-                <a:solidFill>
-                  <a:schemeClr val="tx1"/>
-                </a:solidFill>
-                <a:latin typeface="+mn-lt"/>
-                <a:ea typeface="+mn-ea"/>
-                <a:cs typeface="+mn-cs"/>
-              </a:defRPr>
-            </a:lvl4pPr>
-            <a:lvl5pPr marL="2057400" indent="-228600" algn="l" defTabSz="914400" rtl="0" eaLnBrk="1" latinLnBrk="0" hangingPunct="1">
-              <a:lnSpc>
-                <a:spcPct val="90000"/>
-              </a:lnSpc>
-              <a:spcBef>
-                <a:spcPts val="500"/>
-              </a:spcBef>
-              <a:buFont typeface="Arial" panose="020B0604020202020204" pitchFamily="34" charset="0"/>
-              <a:buChar char="•"/>
-              <a:defRPr sz="1800" kern="1200">
-                <a:solidFill>
-                  <a:schemeClr val="tx1"/>
-                </a:solidFill>
-                <a:latin typeface="+mn-lt"/>
-                <a:ea typeface="+mn-ea"/>
-                <a:cs typeface="+mn-cs"/>
-              </a:defRPr>
-            </a:lvl5pPr>
-            <a:lvl6pPr marL="2514600" indent="-228600" algn="l" defTabSz="914400" rtl="0" eaLnBrk="1" latinLnBrk="0" hangingPunct="1">
-              <a:lnSpc>
-                <a:spcPct val="90000"/>
-              </a:lnSpc>
-              <a:spcBef>
-                <a:spcPts val="500"/>
-              </a:spcBef>
-              <a:buFont typeface="Arial" panose="020B0604020202020204" pitchFamily="34" charset="0"/>
-              <a:buChar char="•"/>
-              <a:defRPr sz="1800" kern="1200">
-                <a:solidFill>
-                  <a:schemeClr val="tx1"/>
-                </a:solidFill>
-                <a:latin typeface="+mn-lt"/>
-                <a:ea typeface="+mn-ea"/>
-                <a:cs typeface="+mn-cs"/>
-              </a:defRPr>
-            </a:lvl6pPr>
-            <a:lvl7pPr marL="2971800" indent="-228600" algn="l" defTabSz="914400" rtl="0" eaLnBrk="1" latinLnBrk="0" hangingPunct="1">
-              <a:lnSpc>
-                <a:spcPct val="90000"/>
-              </a:lnSpc>
-              <a:spcBef>
-                <a:spcPts val="500"/>
-              </a:spcBef>
-              <a:buFont typeface="Arial" panose="020B0604020202020204" pitchFamily="34" charset="0"/>
-              <a:buChar char="•"/>
-              <a:defRPr sz="1800" kern="1200">
-                <a:solidFill>
-                  <a:schemeClr val="tx1"/>
-                </a:solidFill>
-                <a:latin typeface="+mn-lt"/>
-                <a:ea typeface="+mn-ea"/>
-                <a:cs typeface="+mn-cs"/>
-              </a:defRPr>
-            </a:lvl7pPr>
-            <a:lvl8pPr marL="3429000" indent="-228600" algn="l" defTabSz="914400" rtl="0" eaLnBrk="1" latinLnBrk="0" hangingPunct="1">
-              <a:lnSpc>
-                <a:spcPct val="90000"/>
-              </a:lnSpc>
-              <a:spcBef>
-                <a:spcPts val="500"/>
-              </a:spcBef>
-              <a:buFont typeface="Arial" panose="020B0604020202020204" pitchFamily="34" charset="0"/>
-              <a:buChar char="•"/>
-              <a:defRPr sz="1800" kern="1200">
-                <a:solidFill>
-                  <a:schemeClr val="tx1"/>
-                </a:solidFill>
-                <a:latin typeface="+mn-lt"/>
-                <a:ea typeface="+mn-ea"/>
-                <a:cs typeface="+mn-cs"/>
-              </a:defRPr>
-            </a:lvl8pPr>
-            <a:lvl9pPr marL="3886200" indent="-228600" algn="l" defTabSz="914400" rtl="0" eaLnBrk="1" latinLnBrk="0" hangingPunct="1">
-              <a:lnSpc>
-                <a:spcPct val="90000"/>
-              </a:lnSpc>
-              <a:spcBef>
-                <a:spcPts val="500"/>
-              </a:spcBef>
-              <a:buFont typeface="Arial" panose="020B0604020202020204" pitchFamily="34" charset="0"/>
-              <a:buChar char="•"/>
-              <a:defRPr sz="1800" kern="1200">
-                <a:solidFill>
-                  <a:schemeClr val="tx1"/>
-                </a:solidFill>
-                <a:latin typeface="+mn-lt"/>
-                <a:ea typeface="+mn-ea"/>
-                <a:cs typeface="+mn-cs"/>
-              </a:defRPr>
-            </a:lvl9pPr>
-          </a:lstStyle>
-          <a:p>
-            <a:pPr marL="0" indent="0">
-              <a:buNone/>
-              <a:defRPr/>
-            </a:pPr>
-            <a:r>
-              <a:rPr lang="en-US" dirty="0" smtClean="0">
-                <a:solidFill>
-                  <a:schemeClr val="bg1"/>
-                </a:solidFill>
-              </a:rPr>
-              <a:t>Azure Synapse</a:t>
-            </a:r>
-          </a:p>
-          <a:p>
-            <a:pPr marL="514350" indent="-514350">
-              <a:buFont typeface="+mj-lt"/>
-              <a:buAutoNum type="alphaLcParenR"/>
-              <a:defRPr/>
-            </a:pPr>
-            <a:r>
-              <a:rPr lang="en-US" dirty="0" smtClean="0">
-                <a:solidFill>
-                  <a:schemeClr val="bg1"/>
-                </a:solidFill>
-              </a:rPr>
-              <a:t>Data exploration</a:t>
-            </a:r>
-            <a:endParaRPr lang="en-US" dirty="0">
-              <a:solidFill>
-                <a:schemeClr val="bg1"/>
-              </a:solidFill>
-            </a:endParaRPr>
-          </a:p>
-          <a:p>
-            <a:pPr marL="514350" indent="-514350">
-              <a:buFont typeface="+mj-lt"/>
-              <a:buAutoNum type="alphaLcParenR"/>
-              <a:defRPr/>
-            </a:pPr>
-            <a:r>
-              <a:rPr lang="en-US" dirty="0" smtClean="0">
-                <a:solidFill>
-                  <a:schemeClr val="bg1"/>
-                </a:solidFill>
-              </a:rPr>
-              <a:t>Notebook development</a:t>
-            </a:r>
-            <a:endParaRPr lang="en-US" dirty="0">
-              <a:solidFill>
-                <a:schemeClr val="bg1"/>
-              </a:solidFill>
-            </a:endParaRPr>
-          </a:p>
-          <a:p>
-            <a:pPr marL="514350" indent="-514350">
-              <a:buFont typeface="+mj-lt"/>
-              <a:buAutoNum type="alphaLcParenR"/>
-              <a:defRPr/>
-            </a:pPr>
-            <a:r>
-              <a:rPr lang="en-US" dirty="0" smtClean="0">
-                <a:solidFill>
-                  <a:schemeClr val="bg1"/>
-                </a:solidFill>
-              </a:rPr>
-              <a:t>Server-less pools</a:t>
-            </a:r>
-          </a:p>
-          <a:p>
-            <a:pPr marL="514350" indent="-514350">
-              <a:buFont typeface="+mj-lt"/>
-              <a:buAutoNum type="alphaLcParenR"/>
-              <a:defRPr/>
-            </a:pPr>
-            <a:r>
-              <a:rPr lang="en-US" dirty="0" smtClean="0">
-                <a:solidFill>
-                  <a:schemeClr val="bg1"/>
-                </a:solidFill>
-              </a:rPr>
-              <a:t>Purview: Data Dictionary &amp; Process Flows</a:t>
-            </a:r>
-            <a:endParaRPr lang="en-US" dirty="0">
-              <a:solidFill>
-                <a:schemeClr val="bg1"/>
-              </a:solidFill>
-            </a:endParaRPr>
-          </a:p>
-          <a:p>
-            <a:pPr marL="0" indent="0">
-              <a:buNone/>
-              <a:defRPr/>
-            </a:pPr>
-            <a:endParaRPr lang="en-US" dirty="0" smtClean="0">
-              <a:solidFill>
-                <a:schemeClr val="bg1"/>
-              </a:solidFill>
-            </a:endParaRPr>
-          </a:p>
-          <a:p>
-            <a:pPr marL="0" indent="0">
-              <a:buFont typeface="Arial" panose="020B0604020202020204" pitchFamily="34" charset="0"/>
-              <a:buNone/>
-            </a:pPr>
-            <a:endParaRPr lang="en-US" dirty="0">
-              <a:solidFill>
-                <a:schemeClr val="bg1"/>
-              </a:solidFill>
-            </a:endParaRPr>
-          </a:p>
-        </p:txBody>
-      </p:sp>
+      </p:pic>
     </p:spTree>
     <p:extLst>
       <p:ext uri="{BB962C8B-B14F-4D97-AF65-F5344CB8AC3E}">
-        <p14:creationId xmlns:p14="http://schemas.microsoft.com/office/powerpoint/2010/main" val="3632825499"/>
+        <p14:creationId xmlns:p14="http://schemas.microsoft.com/office/powerpoint/2010/main" val="2113417599"/>
       </p:ext>
     </p:extLst>
   </p:cSld>
@@ -11869,6 +11497,945 @@
       </p:grpSpPr>
       <p:sp>
         <p:nvSpPr>
+          <p:cNvPr id="4" name="Slide Number Placeholder 3"/>
+          <p:cNvSpPr>
+            <a:spLocks noGrp="1"/>
+          </p:cNvSpPr>
+          <p:nvPr>
+            <p:ph type="sldNum" idx="4"/>
+          </p:nvPr>
+        </p:nvSpPr>
+        <p:spPr/>
+        <p:txBody>
+          <a:bodyPr/>
+          <a:lstStyle/>
+          <a:p>
+            <a:fld id="{00000000-1234-1234-1234-123412341234}" type="slidenum">
+              <a:rPr lang="en-US" smtClean="0"/>
+              <a:pPr/>
+              <a:t>20</a:t>
+            </a:fld>
+            <a:endParaRPr lang="en-US" sz="1300" dirty="0"/>
+          </a:p>
+        </p:txBody>
+      </p:sp>
+      <p:pic>
+        <p:nvPicPr>
+          <p:cNvPr id="2052" name="Picture 4" descr="https://azurecomcdn.azureedge.net/cvt-29bb5b361a30509ed9e5daf51ad1318c032a10805d9ab60ea21edf9042d6f872/images/page/services/devops/repos/collaborate.jpg"/>
+          <p:cNvPicPr>
+            <a:picLocks noChangeAspect="1" noChangeArrowheads="1"/>
+          </p:cNvPicPr>
+          <p:nvPr/>
+        </p:nvPicPr>
+        <p:blipFill>
+          <a:blip r:embed="rId2">
+            <a:extLst>
+              <a:ext uri="{28A0092B-C50C-407E-A947-70E740481C1C}">
+                <a14:useLocalDpi xmlns:a14="http://schemas.microsoft.com/office/drawing/2010/main" val="0"/>
+              </a:ext>
+            </a:extLst>
+          </a:blip>
+          <a:srcRect/>
+          <a:stretch>
+            <a:fillRect/>
+          </a:stretch>
+        </p:blipFill>
+        <p:spPr bwMode="auto">
+          <a:xfrm>
+            <a:off x="1091418" y="0"/>
+            <a:ext cx="10009164" cy="6297433"/>
+          </a:xfrm>
+          <a:prstGeom prst="rect">
+            <a:avLst/>
+          </a:prstGeom>
+          <a:noFill/>
+          <a:extLst>
+            <a:ext uri="{909E8E84-426E-40DD-AFC4-6F175D3DCCD1}">
+              <a14:hiddenFill xmlns:a14="http://schemas.microsoft.com/office/drawing/2010/main">
+                <a:solidFill>
+                  <a:srgbClr val="FFFFFF"/>
+                </a:solidFill>
+              </a14:hiddenFill>
+            </a:ext>
+          </a:extLst>
+        </p:spPr>
+      </p:pic>
+    </p:spTree>
+    <p:extLst>
+      <p:ext uri="{BB962C8B-B14F-4D97-AF65-F5344CB8AC3E}">
+        <p14:creationId xmlns:p14="http://schemas.microsoft.com/office/powerpoint/2010/main" val="1195688599"/>
+      </p:ext>
+    </p:extLst>
+  </p:cSld>
+  <p:clrMapOvr>
+    <a:masterClrMapping/>
+  </p:clrMapOvr>
+</p:sld>
+</file>
+
+<file path=ppt/slides/slide21.xml><?xml version="1.0" encoding="utf-8"?>
+<p:sld xmlns:a="http://schemas.openxmlformats.org/drawingml/2006/main" xmlns:r="http://schemas.openxmlformats.org/officeDocument/2006/relationships" xmlns:p="http://schemas.openxmlformats.org/presentationml/2006/main">
+  <p:cSld>
+    <p:spTree>
+      <p:nvGrpSpPr>
+        <p:cNvPr id="1" name=""/>
+        <p:cNvGrpSpPr/>
+        <p:nvPr/>
+      </p:nvGrpSpPr>
+      <p:grpSpPr>
+        <a:xfrm>
+          <a:off x="0" y="0"/>
+          <a:ext cx="0" cy="0"/>
+          <a:chOff x="0" y="0"/>
+          <a:chExt cx="0" cy="0"/>
+        </a:xfrm>
+      </p:grpSpPr>
+      <p:sp>
+        <p:nvSpPr>
+          <p:cNvPr id="2" name="Title 1"/>
+          <p:cNvSpPr>
+            <a:spLocks noGrp="1"/>
+          </p:cNvSpPr>
+          <p:nvPr>
+            <p:ph type="title"/>
+          </p:nvPr>
+        </p:nvSpPr>
+        <p:spPr/>
+        <p:txBody>
+          <a:bodyPr/>
+          <a:lstStyle/>
+          <a:p>
+            <a:r>
+              <a:rPr lang="en-GB" dirty="0" smtClean="0"/>
+              <a:t>Resources Demo </a:t>
+            </a:r>
+            <a:r>
+              <a:rPr lang="en-GB" dirty="0" smtClean="0"/>
+              <a:t>2</a:t>
+            </a:r>
+            <a:endParaRPr lang="en-GB" dirty="0"/>
+          </a:p>
+        </p:txBody>
+      </p:sp>
+      <p:sp>
+        <p:nvSpPr>
+          <p:cNvPr id="3" name="Content Placeholder 2"/>
+          <p:cNvSpPr>
+            <a:spLocks noGrp="1"/>
+          </p:cNvSpPr>
+          <p:nvPr>
+            <p:ph sz="quarter" idx="12"/>
+          </p:nvPr>
+        </p:nvSpPr>
+        <p:spPr/>
+        <p:txBody>
+          <a:bodyPr>
+            <a:normAutofit/>
+          </a:bodyPr>
+          <a:lstStyle/>
+          <a:p>
+            <a:r>
+              <a:rPr lang="en-US" sz="2400" dirty="0">
+                <a:hlinkClick r:id="rId2"/>
+              </a:rPr>
+              <a:t>Understand what you get with Azure Boards - Azure Boards | Microsoft </a:t>
+            </a:r>
+            <a:r>
+              <a:rPr lang="en-US" sz="2400" dirty="0" smtClean="0">
+                <a:hlinkClick r:id="rId2"/>
+              </a:rPr>
+              <a:t>Docs</a:t>
+            </a:r>
+            <a:endParaRPr lang="en-US" sz="2400" dirty="0" smtClean="0"/>
+          </a:p>
+          <a:p>
+            <a:r>
+              <a:rPr lang="en-US" sz="2400" dirty="0">
+                <a:hlinkClick r:id="rId3"/>
+              </a:rPr>
+              <a:t>Azure Repos – </a:t>
+            </a:r>
+            <a:r>
+              <a:rPr lang="en-US" sz="2400" dirty="0" err="1">
+                <a:hlinkClick r:id="rId3"/>
+              </a:rPr>
+              <a:t>Git</a:t>
+            </a:r>
+            <a:r>
+              <a:rPr lang="en-US" sz="2400" dirty="0">
+                <a:hlinkClick r:id="rId3"/>
+              </a:rPr>
+              <a:t> Repositories | Microsoft Azure</a:t>
+            </a:r>
+            <a:endParaRPr lang="en-GB" sz="2400" dirty="0" smtClean="0"/>
+          </a:p>
+        </p:txBody>
+      </p:sp>
+      <p:sp>
+        <p:nvSpPr>
+          <p:cNvPr id="4" name="Slide Number Placeholder 3"/>
+          <p:cNvSpPr>
+            <a:spLocks noGrp="1"/>
+          </p:cNvSpPr>
+          <p:nvPr>
+            <p:ph type="sldNum" idx="4"/>
+          </p:nvPr>
+        </p:nvSpPr>
+        <p:spPr/>
+        <p:txBody>
+          <a:bodyPr/>
+          <a:lstStyle/>
+          <a:p>
+            <a:fld id="{00000000-1234-1234-1234-123412341234}" type="slidenum">
+              <a:rPr lang="en-US" smtClean="0"/>
+              <a:pPr/>
+              <a:t>21</a:t>
+            </a:fld>
+            <a:endParaRPr lang="en-US" sz="1300" dirty="0"/>
+          </a:p>
+        </p:txBody>
+      </p:sp>
+    </p:spTree>
+    <p:extLst>
+      <p:ext uri="{BB962C8B-B14F-4D97-AF65-F5344CB8AC3E}">
+        <p14:creationId xmlns:p14="http://schemas.microsoft.com/office/powerpoint/2010/main" val="4166827310"/>
+      </p:ext>
+    </p:extLst>
+  </p:cSld>
+  <p:clrMapOvr>
+    <a:masterClrMapping/>
+  </p:clrMapOvr>
+  <p:timing>
+    <p:tnLst>
+      <p:par>
+        <p:cTn id="1" dur="indefinite" restart="never" nodeType="tmRoot"/>
+      </p:par>
+    </p:tnLst>
+  </p:timing>
+</p:sld>
+</file>
+
+<file path=ppt/slides/slide22.xml><?xml version="1.0" encoding="utf-8"?>
+<p:sld xmlns:a="http://schemas.openxmlformats.org/drawingml/2006/main" xmlns:r="http://schemas.openxmlformats.org/officeDocument/2006/relationships" xmlns:p="http://schemas.openxmlformats.org/presentationml/2006/main">
+  <p:cSld>
+    <p:spTree>
+      <p:nvGrpSpPr>
+        <p:cNvPr id="1" name=""/>
+        <p:cNvGrpSpPr/>
+        <p:nvPr/>
+      </p:nvGrpSpPr>
+      <p:grpSpPr>
+        <a:xfrm>
+          <a:off x="0" y="0"/>
+          <a:ext cx="0" cy="0"/>
+          <a:chOff x="0" y="0"/>
+          <a:chExt cx="0" cy="0"/>
+        </a:xfrm>
+      </p:grpSpPr>
+      <p:sp>
+        <p:nvSpPr>
+          <p:cNvPr id="2" name="Title 1"/>
+          <p:cNvSpPr>
+            <a:spLocks noGrp="1"/>
+          </p:cNvSpPr>
+          <p:nvPr>
+            <p:ph type="title"/>
+          </p:nvPr>
+        </p:nvSpPr>
+        <p:spPr>
+          <a:xfrm>
+            <a:off x="720676" y="1270001"/>
+            <a:ext cx="10767024" cy="774699"/>
+          </a:xfrm>
+        </p:spPr>
+        <p:txBody>
+          <a:bodyPr anchor="t"/>
+          <a:lstStyle/>
+          <a:p>
+            <a:r>
+              <a:rPr lang="en-GB" dirty="0" smtClean="0"/>
+              <a:t>DEMO 3</a:t>
+            </a:r>
+            <a:endParaRPr lang="en-GB" dirty="0"/>
+          </a:p>
+        </p:txBody>
+      </p:sp>
+      <p:sp>
+        <p:nvSpPr>
+          <p:cNvPr id="5" name="Content Placeholder 2">
+            <a:extLst>
+              <a:ext uri="{FF2B5EF4-FFF2-40B4-BE49-F238E27FC236}">
+                <a16:creationId xmlns:a16="http://schemas.microsoft.com/office/drawing/2014/main" id="{ED9D4C28-B53F-2540-A01A-B6984758A45C}"/>
+              </a:ext>
+            </a:extLst>
+          </p:cNvPr>
+          <p:cNvSpPr txBox="1">
+            <a:spLocks/>
+          </p:cNvSpPr>
+          <p:nvPr/>
+        </p:nvSpPr>
+        <p:spPr>
+          <a:xfrm>
+            <a:off x="720676" y="2044700"/>
+            <a:ext cx="10767024" cy="3778994"/>
+          </a:xfrm>
+          <a:prstGeom prst="rect">
+            <a:avLst/>
+          </a:prstGeom>
+        </p:spPr>
+        <p:txBody>
+          <a:bodyPr/>
+          <a:lstStyle>
+            <a:lvl1pPr marL="228600" indent="-228600" algn="l" defTabSz="914400" rtl="0" eaLnBrk="1" latinLnBrk="0" hangingPunct="1">
+              <a:lnSpc>
+                <a:spcPct val="90000"/>
+              </a:lnSpc>
+              <a:spcBef>
+                <a:spcPts val="1000"/>
+              </a:spcBef>
+              <a:buFont typeface="Arial" panose="020B0604020202020204" pitchFamily="34" charset="0"/>
+              <a:buChar char="•"/>
+              <a:defRPr sz="2800" kern="1200">
+                <a:solidFill>
+                  <a:schemeClr val="tx1"/>
+                </a:solidFill>
+                <a:latin typeface="+mn-lt"/>
+                <a:ea typeface="+mn-ea"/>
+                <a:cs typeface="+mn-cs"/>
+              </a:defRPr>
+            </a:lvl1pPr>
+            <a:lvl2pPr marL="685800" indent="-228600" algn="l" defTabSz="914400" rtl="0" eaLnBrk="1" latinLnBrk="0" hangingPunct="1">
+              <a:lnSpc>
+                <a:spcPct val="90000"/>
+              </a:lnSpc>
+              <a:spcBef>
+                <a:spcPts val="500"/>
+              </a:spcBef>
+              <a:buFont typeface="Arial" panose="020B0604020202020204" pitchFamily="34" charset="0"/>
+              <a:buChar char="•"/>
+              <a:defRPr sz="2400" kern="1200">
+                <a:solidFill>
+                  <a:schemeClr val="tx1"/>
+                </a:solidFill>
+                <a:latin typeface="+mn-lt"/>
+                <a:ea typeface="+mn-ea"/>
+                <a:cs typeface="+mn-cs"/>
+              </a:defRPr>
+            </a:lvl2pPr>
+            <a:lvl3pPr marL="1143000" indent="-228600" algn="l" defTabSz="914400" rtl="0" eaLnBrk="1" latinLnBrk="0" hangingPunct="1">
+              <a:lnSpc>
+                <a:spcPct val="90000"/>
+              </a:lnSpc>
+              <a:spcBef>
+                <a:spcPts val="500"/>
+              </a:spcBef>
+              <a:buFont typeface="Arial" panose="020B0604020202020204" pitchFamily="34" charset="0"/>
+              <a:buChar char="•"/>
+              <a:defRPr sz="2000" kern="1200">
+                <a:solidFill>
+                  <a:schemeClr val="tx1"/>
+                </a:solidFill>
+                <a:latin typeface="+mn-lt"/>
+                <a:ea typeface="+mn-ea"/>
+                <a:cs typeface="+mn-cs"/>
+              </a:defRPr>
+            </a:lvl3pPr>
+            <a:lvl4pPr marL="1600200" indent="-228600" algn="l" defTabSz="914400" rtl="0" eaLnBrk="1" latinLnBrk="0" hangingPunct="1">
+              <a:lnSpc>
+                <a:spcPct val="90000"/>
+              </a:lnSpc>
+              <a:spcBef>
+                <a:spcPts val="500"/>
+              </a:spcBef>
+              <a:buFont typeface="Arial" panose="020B0604020202020204" pitchFamily="34" charset="0"/>
+              <a:buChar char="•"/>
+              <a:defRPr sz="1800" kern="1200">
+                <a:solidFill>
+                  <a:schemeClr val="tx1"/>
+                </a:solidFill>
+                <a:latin typeface="+mn-lt"/>
+                <a:ea typeface="+mn-ea"/>
+                <a:cs typeface="+mn-cs"/>
+              </a:defRPr>
+            </a:lvl4pPr>
+            <a:lvl5pPr marL="2057400" indent="-228600" algn="l" defTabSz="914400" rtl="0" eaLnBrk="1" latinLnBrk="0" hangingPunct="1">
+              <a:lnSpc>
+                <a:spcPct val="90000"/>
+              </a:lnSpc>
+              <a:spcBef>
+                <a:spcPts val="500"/>
+              </a:spcBef>
+              <a:buFont typeface="Arial" panose="020B0604020202020204" pitchFamily="34" charset="0"/>
+              <a:buChar char="•"/>
+              <a:defRPr sz="1800" kern="1200">
+                <a:solidFill>
+                  <a:schemeClr val="tx1"/>
+                </a:solidFill>
+                <a:latin typeface="+mn-lt"/>
+                <a:ea typeface="+mn-ea"/>
+                <a:cs typeface="+mn-cs"/>
+              </a:defRPr>
+            </a:lvl5pPr>
+            <a:lvl6pPr marL="2514600" indent="-228600" algn="l" defTabSz="914400" rtl="0" eaLnBrk="1" latinLnBrk="0" hangingPunct="1">
+              <a:lnSpc>
+                <a:spcPct val="90000"/>
+              </a:lnSpc>
+              <a:spcBef>
+                <a:spcPts val="500"/>
+              </a:spcBef>
+              <a:buFont typeface="Arial" panose="020B0604020202020204" pitchFamily="34" charset="0"/>
+              <a:buChar char="•"/>
+              <a:defRPr sz="1800" kern="1200">
+                <a:solidFill>
+                  <a:schemeClr val="tx1"/>
+                </a:solidFill>
+                <a:latin typeface="+mn-lt"/>
+                <a:ea typeface="+mn-ea"/>
+                <a:cs typeface="+mn-cs"/>
+              </a:defRPr>
+            </a:lvl6pPr>
+            <a:lvl7pPr marL="2971800" indent="-228600" algn="l" defTabSz="914400" rtl="0" eaLnBrk="1" latinLnBrk="0" hangingPunct="1">
+              <a:lnSpc>
+                <a:spcPct val="90000"/>
+              </a:lnSpc>
+              <a:spcBef>
+                <a:spcPts val="500"/>
+              </a:spcBef>
+              <a:buFont typeface="Arial" panose="020B0604020202020204" pitchFamily="34" charset="0"/>
+              <a:buChar char="•"/>
+              <a:defRPr sz="1800" kern="1200">
+                <a:solidFill>
+                  <a:schemeClr val="tx1"/>
+                </a:solidFill>
+                <a:latin typeface="+mn-lt"/>
+                <a:ea typeface="+mn-ea"/>
+                <a:cs typeface="+mn-cs"/>
+              </a:defRPr>
+            </a:lvl7pPr>
+            <a:lvl8pPr marL="3429000" indent="-228600" algn="l" defTabSz="914400" rtl="0" eaLnBrk="1" latinLnBrk="0" hangingPunct="1">
+              <a:lnSpc>
+                <a:spcPct val="90000"/>
+              </a:lnSpc>
+              <a:spcBef>
+                <a:spcPts val="500"/>
+              </a:spcBef>
+              <a:buFont typeface="Arial" panose="020B0604020202020204" pitchFamily="34" charset="0"/>
+              <a:buChar char="•"/>
+              <a:defRPr sz="1800" kern="1200">
+                <a:solidFill>
+                  <a:schemeClr val="tx1"/>
+                </a:solidFill>
+                <a:latin typeface="+mn-lt"/>
+                <a:ea typeface="+mn-ea"/>
+                <a:cs typeface="+mn-cs"/>
+              </a:defRPr>
+            </a:lvl8pPr>
+            <a:lvl9pPr marL="3886200" indent="-228600" algn="l" defTabSz="914400" rtl="0" eaLnBrk="1" latinLnBrk="0" hangingPunct="1">
+              <a:lnSpc>
+                <a:spcPct val="90000"/>
+              </a:lnSpc>
+              <a:spcBef>
+                <a:spcPts val="500"/>
+              </a:spcBef>
+              <a:buFont typeface="Arial" panose="020B0604020202020204" pitchFamily="34" charset="0"/>
+              <a:buChar char="•"/>
+              <a:defRPr sz="1800" kern="1200">
+                <a:solidFill>
+                  <a:schemeClr val="tx1"/>
+                </a:solidFill>
+                <a:latin typeface="+mn-lt"/>
+                <a:ea typeface="+mn-ea"/>
+                <a:cs typeface="+mn-cs"/>
+              </a:defRPr>
+            </a:lvl9pPr>
+          </a:lstStyle>
+          <a:p>
+            <a:pPr marL="0" indent="0">
+              <a:buNone/>
+              <a:defRPr/>
+            </a:pPr>
+            <a:r>
+              <a:rPr lang="en-US" dirty="0">
+                <a:solidFill>
+                  <a:schemeClr val="bg1"/>
+                </a:solidFill>
+              </a:rPr>
+              <a:t>Azure </a:t>
+            </a:r>
+            <a:r>
+              <a:rPr lang="en-US" dirty="0" smtClean="0">
+                <a:solidFill>
+                  <a:schemeClr val="bg1"/>
+                </a:solidFill>
+              </a:rPr>
+              <a:t>Data Factory</a:t>
+            </a:r>
+          </a:p>
+          <a:p>
+            <a:pPr marL="514350" indent="-514350">
+              <a:buFont typeface="+mj-lt"/>
+              <a:buAutoNum type="alphaLcParenR"/>
+              <a:defRPr/>
+            </a:pPr>
+            <a:r>
+              <a:rPr lang="en-US" dirty="0" smtClean="0">
+                <a:solidFill>
+                  <a:schemeClr val="bg1"/>
+                </a:solidFill>
+              </a:rPr>
+              <a:t>Pipelines for Orchestrating Automation</a:t>
+            </a:r>
+            <a:endParaRPr lang="en-US" dirty="0">
+              <a:solidFill>
+                <a:schemeClr val="bg1"/>
+              </a:solidFill>
+            </a:endParaRPr>
+          </a:p>
+          <a:p>
+            <a:pPr marL="514350" indent="-514350">
+              <a:buFont typeface="+mj-lt"/>
+              <a:buAutoNum type="alphaLcParenR"/>
+              <a:defRPr/>
+            </a:pPr>
+            <a:r>
+              <a:rPr lang="en-US" dirty="0" smtClean="0">
+                <a:solidFill>
+                  <a:schemeClr val="bg1"/>
+                </a:solidFill>
+              </a:rPr>
+              <a:t>Transformations: Wrangling &amp; Mapping Data Flows</a:t>
+            </a:r>
+            <a:endParaRPr lang="en-US" dirty="0">
+              <a:solidFill>
+                <a:schemeClr val="bg1"/>
+              </a:solidFill>
+            </a:endParaRPr>
+          </a:p>
+          <a:p>
+            <a:pPr marL="514350" indent="-514350">
+              <a:buFont typeface="+mj-lt"/>
+              <a:buAutoNum type="alphaLcParenR"/>
+              <a:defRPr/>
+            </a:pPr>
+            <a:r>
+              <a:rPr lang="en-US" dirty="0" smtClean="0">
+                <a:solidFill>
+                  <a:schemeClr val="bg1"/>
+                </a:solidFill>
+              </a:rPr>
+              <a:t>Data movement: Including on-premises sources</a:t>
+            </a:r>
+            <a:endParaRPr lang="en-US" dirty="0">
+              <a:solidFill>
+                <a:schemeClr val="bg1"/>
+              </a:solidFill>
+            </a:endParaRPr>
+          </a:p>
+          <a:p>
+            <a:pPr marL="0" indent="0">
+              <a:buNone/>
+              <a:defRPr/>
+            </a:pPr>
+            <a:endParaRPr lang="en-US" dirty="0">
+              <a:solidFill>
+                <a:schemeClr val="bg1"/>
+              </a:solidFill>
+            </a:endParaRPr>
+          </a:p>
+        </p:txBody>
+      </p:sp>
+    </p:spTree>
+    <p:extLst>
+      <p:ext uri="{BB962C8B-B14F-4D97-AF65-F5344CB8AC3E}">
+        <p14:creationId xmlns:p14="http://schemas.microsoft.com/office/powerpoint/2010/main" val="2835038701"/>
+      </p:ext>
+    </p:extLst>
+  </p:cSld>
+  <p:clrMapOvr>
+    <a:masterClrMapping/>
+  </p:clrMapOvr>
+</p:sld>
+</file>
+
+<file path=ppt/slides/slide23.xml><?xml version="1.0" encoding="utf-8"?>
+<p:sld xmlns:a="http://schemas.openxmlformats.org/drawingml/2006/main" xmlns:r="http://schemas.openxmlformats.org/officeDocument/2006/relationships" xmlns:p="http://schemas.openxmlformats.org/presentationml/2006/main">
+  <p:cSld>
+    <p:spTree>
+      <p:nvGrpSpPr>
+        <p:cNvPr id="1" name=""/>
+        <p:cNvGrpSpPr/>
+        <p:nvPr/>
+      </p:nvGrpSpPr>
+      <p:grpSpPr>
+        <a:xfrm>
+          <a:off x="0" y="0"/>
+          <a:ext cx="0" cy="0"/>
+          <a:chOff x="0" y="0"/>
+          <a:chExt cx="0" cy="0"/>
+        </a:xfrm>
+      </p:grpSpPr>
+      <p:sp>
+        <p:nvSpPr>
+          <p:cNvPr id="2" name="Title 1"/>
+          <p:cNvSpPr>
+            <a:spLocks noGrp="1"/>
+          </p:cNvSpPr>
+          <p:nvPr>
+            <p:ph type="title"/>
+          </p:nvPr>
+        </p:nvSpPr>
+        <p:spPr>
+          <a:xfrm>
+            <a:off x="720676" y="1270001"/>
+            <a:ext cx="10767024" cy="774699"/>
+          </a:xfrm>
+        </p:spPr>
+        <p:txBody>
+          <a:bodyPr anchor="t"/>
+          <a:lstStyle/>
+          <a:p>
+            <a:r>
+              <a:rPr lang="en-GB" dirty="0" smtClean="0"/>
+              <a:t>DEMO 4</a:t>
+            </a:r>
+            <a:endParaRPr lang="en-GB" dirty="0"/>
+          </a:p>
+        </p:txBody>
+      </p:sp>
+      <p:sp>
+        <p:nvSpPr>
+          <p:cNvPr id="5" name="Content Placeholder 2">
+            <a:extLst>
+              <a:ext uri="{FF2B5EF4-FFF2-40B4-BE49-F238E27FC236}">
+                <a16:creationId xmlns:a16="http://schemas.microsoft.com/office/drawing/2014/main" id="{ED9D4C28-B53F-2540-A01A-B6984758A45C}"/>
+              </a:ext>
+            </a:extLst>
+          </p:cNvPr>
+          <p:cNvSpPr txBox="1">
+            <a:spLocks/>
+          </p:cNvSpPr>
+          <p:nvPr/>
+        </p:nvSpPr>
+        <p:spPr>
+          <a:xfrm>
+            <a:off x="720676" y="2044700"/>
+            <a:ext cx="10767024" cy="3778994"/>
+          </a:xfrm>
+          <a:prstGeom prst="rect">
+            <a:avLst/>
+          </a:prstGeom>
+        </p:spPr>
+        <p:txBody>
+          <a:bodyPr/>
+          <a:lstStyle>
+            <a:lvl1pPr marL="228600" indent="-228600" algn="l" defTabSz="914400" rtl="0" eaLnBrk="1" latinLnBrk="0" hangingPunct="1">
+              <a:lnSpc>
+                <a:spcPct val="90000"/>
+              </a:lnSpc>
+              <a:spcBef>
+                <a:spcPts val="1000"/>
+              </a:spcBef>
+              <a:buFont typeface="Arial" panose="020B0604020202020204" pitchFamily="34" charset="0"/>
+              <a:buChar char="•"/>
+              <a:defRPr sz="2800" kern="1200">
+                <a:solidFill>
+                  <a:schemeClr val="tx1"/>
+                </a:solidFill>
+                <a:latin typeface="+mn-lt"/>
+                <a:ea typeface="+mn-ea"/>
+                <a:cs typeface="+mn-cs"/>
+              </a:defRPr>
+            </a:lvl1pPr>
+            <a:lvl2pPr marL="685800" indent="-228600" algn="l" defTabSz="914400" rtl="0" eaLnBrk="1" latinLnBrk="0" hangingPunct="1">
+              <a:lnSpc>
+                <a:spcPct val="90000"/>
+              </a:lnSpc>
+              <a:spcBef>
+                <a:spcPts val="500"/>
+              </a:spcBef>
+              <a:buFont typeface="Arial" panose="020B0604020202020204" pitchFamily="34" charset="0"/>
+              <a:buChar char="•"/>
+              <a:defRPr sz="2400" kern="1200">
+                <a:solidFill>
+                  <a:schemeClr val="tx1"/>
+                </a:solidFill>
+                <a:latin typeface="+mn-lt"/>
+                <a:ea typeface="+mn-ea"/>
+                <a:cs typeface="+mn-cs"/>
+              </a:defRPr>
+            </a:lvl2pPr>
+            <a:lvl3pPr marL="1143000" indent="-228600" algn="l" defTabSz="914400" rtl="0" eaLnBrk="1" latinLnBrk="0" hangingPunct="1">
+              <a:lnSpc>
+                <a:spcPct val="90000"/>
+              </a:lnSpc>
+              <a:spcBef>
+                <a:spcPts val="500"/>
+              </a:spcBef>
+              <a:buFont typeface="Arial" panose="020B0604020202020204" pitchFamily="34" charset="0"/>
+              <a:buChar char="•"/>
+              <a:defRPr sz="2000" kern="1200">
+                <a:solidFill>
+                  <a:schemeClr val="tx1"/>
+                </a:solidFill>
+                <a:latin typeface="+mn-lt"/>
+                <a:ea typeface="+mn-ea"/>
+                <a:cs typeface="+mn-cs"/>
+              </a:defRPr>
+            </a:lvl3pPr>
+            <a:lvl4pPr marL="1600200" indent="-228600" algn="l" defTabSz="914400" rtl="0" eaLnBrk="1" latinLnBrk="0" hangingPunct="1">
+              <a:lnSpc>
+                <a:spcPct val="90000"/>
+              </a:lnSpc>
+              <a:spcBef>
+                <a:spcPts val="500"/>
+              </a:spcBef>
+              <a:buFont typeface="Arial" panose="020B0604020202020204" pitchFamily="34" charset="0"/>
+              <a:buChar char="•"/>
+              <a:defRPr sz="1800" kern="1200">
+                <a:solidFill>
+                  <a:schemeClr val="tx1"/>
+                </a:solidFill>
+                <a:latin typeface="+mn-lt"/>
+                <a:ea typeface="+mn-ea"/>
+                <a:cs typeface="+mn-cs"/>
+              </a:defRPr>
+            </a:lvl4pPr>
+            <a:lvl5pPr marL="2057400" indent="-228600" algn="l" defTabSz="914400" rtl="0" eaLnBrk="1" latinLnBrk="0" hangingPunct="1">
+              <a:lnSpc>
+                <a:spcPct val="90000"/>
+              </a:lnSpc>
+              <a:spcBef>
+                <a:spcPts val="500"/>
+              </a:spcBef>
+              <a:buFont typeface="Arial" panose="020B0604020202020204" pitchFamily="34" charset="0"/>
+              <a:buChar char="•"/>
+              <a:defRPr sz="1800" kern="1200">
+                <a:solidFill>
+                  <a:schemeClr val="tx1"/>
+                </a:solidFill>
+                <a:latin typeface="+mn-lt"/>
+                <a:ea typeface="+mn-ea"/>
+                <a:cs typeface="+mn-cs"/>
+              </a:defRPr>
+            </a:lvl5pPr>
+            <a:lvl6pPr marL="2514600" indent="-228600" algn="l" defTabSz="914400" rtl="0" eaLnBrk="1" latinLnBrk="0" hangingPunct="1">
+              <a:lnSpc>
+                <a:spcPct val="90000"/>
+              </a:lnSpc>
+              <a:spcBef>
+                <a:spcPts val="500"/>
+              </a:spcBef>
+              <a:buFont typeface="Arial" panose="020B0604020202020204" pitchFamily="34" charset="0"/>
+              <a:buChar char="•"/>
+              <a:defRPr sz="1800" kern="1200">
+                <a:solidFill>
+                  <a:schemeClr val="tx1"/>
+                </a:solidFill>
+                <a:latin typeface="+mn-lt"/>
+                <a:ea typeface="+mn-ea"/>
+                <a:cs typeface="+mn-cs"/>
+              </a:defRPr>
+            </a:lvl6pPr>
+            <a:lvl7pPr marL="2971800" indent="-228600" algn="l" defTabSz="914400" rtl="0" eaLnBrk="1" latinLnBrk="0" hangingPunct="1">
+              <a:lnSpc>
+                <a:spcPct val="90000"/>
+              </a:lnSpc>
+              <a:spcBef>
+                <a:spcPts val="500"/>
+              </a:spcBef>
+              <a:buFont typeface="Arial" panose="020B0604020202020204" pitchFamily="34" charset="0"/>
+              <a:buChar char="•"/>
+              <a:defRPr sz="1800" kern="1200">
+                <a:solidFill>
+                  <a:schemeClr val="tx1"/>
+                </a:solidFill>
+                <a:latin typeface="+mn-lt"/>
+                <a:ea typeface="+mn-ea"/>
+                <a:cs typeface="+mn-cs"/>
+              </a:defRPr>
+            </a:lvl7pPr>
+            <a:lvl8pPr marL="3429000" indent="-228600" algn="l" defTabSz="914400" rtl="0" eaLnBrk="1" latinLnBrk="0" hangingPunct="1">
+              <a:lnSpc>
+                <a:spcPct val="90000"/>
+              </a:lnSpc>
+              <a:spcBef>
+                <a:spcPts val="500"/>
+              </a:spcBef>
+              <a:buFont typeface="Arial" panose="020B0604020202020204" pitchFamily="34" charset="0"/>
+              <a:buChar char="•"/>
+              <a:defRPr sz="1800" kern="1200">
+                <a:solidFill>
+                  <a:schemeClr val="tx1"/>
+                </a:solidFill>
+                <a:latin typeface="+mn-lt"/>
+                <a:ea typeface="+mn-ea"/>
+                <a:cs typeface="+mn-cs"/>
+              </a:defRPr>
+            </a:lvl8pPr>
+            <a:lvl9pPr marL="3886200" indent="-228600" algn="l" defTabSz="914400" rtl="0" eaLnBrk="1" latinLnBrk="0" hangingPunct="1">
+              <a:lnSpc>
+                <a:spcPct val="90000"/>
+              </a:lnSpc>
+              <a:spcBef>
+                <a:spcPts val="500"/>
+              </a:spcBef>
+              <a:buFont typeface="Arial" panose="020B0604020202020204" pitchFamily="34" charset="0"/>
+              <a:buChar char="•"/>
+              <a:defRPr sz="1800" kern="1200">
+                <a:solidFill>
+                  <a:schemeClr val="tx1"/>
+                </a:solidFill>
+                <a:latin typeface="+mn-lt"/>
+                <a:ea typeface="+mn-ea"/>
+                <a:cs typeface="+mn-cs"/>
+              </a:defRPr>
+            </a:lvl9pPr>
+          </a:lstStyle>
+          <a:p>
+            <a:pPr marL="0" indent="0">
+              <a:buNone/>
+              <a:defRPr/>
+            </a:pPr>
+            <a:r>
+              <a:rPr lang="en-US" dirty="0" smtClean="0">
+                <a:solidFill>
+                  <a:schemeClr val="bg1"/>
+                </a:solidFill>
+              </a:rPr>
+              <a:t>Azure Synapse</a:t>
+            </a:r>
+          </a:p>
+          <a:p>
+            <a:pPr marL="514350" indent="-514350">
+              <a:buFont typeface="+mj-lt"/>
+              <a:buAutoNum type="alphaLcParenR"/>
+              <a:defRPr/>
+            </a:pPr>
+            <a:r>
+              <a:rPr lang="en-US" dirty="0" smtClean="0">
+                <a:solidFill>
+                  <a:schemeClr val="bg1"/>
+                </a:solidFill>
+              </a:rPr>
+              <a:t>Data exploration</a:t>
+            </a:r>
+            <a:endParaRPr lang="en-US" dirty="0">
+              <a:solidFill>
+                <a:schemeClr val="bg1"/>
+              </a:solidFill>
+            </a:endParaRPr>
+          </a:p>
+          <a:p>
+            <a:pPr marL="514350" indent="-514350">
+              <a:buFont typeface="+mj-lt"/>
+              <a:buAutoNum type="alphaLcParenR"/>
+              <a:defRPr/>
+            </a:pPr>
+            <a:r>
+              <a:rPr lang="en-US" dirty="0" smtClean="0">
+                <a:solidFill>
+                  <a:schemeClr val="bg1"/>
+                </a:solidFill>
+              </a:rPr>
+              <a:t>Notebook development</a:t>
+            </a:r>
+            <a:endParaRPr lang="en-US" dirty="0">
+              <a:solidFill>
+                <a:schemeClr val="bg1"/>
+              </a:solidFill>
+            </a:endParaRPr>
+          </a:p>
+          <a:p>
+            <a:pPr marL="514350" indent="-514350">
+              <a:buFont typeface="+mj-lt"/>
+              <a:buAutoNum type="alphaLcParenR"/>
+              <a:defRPr/>
+            </a:pPr>
+            <a:r>
+              <a:rPr lang="en-US" dirty="0" smtClean="0">
+                <a:solidFill>
+                  <a:schemeClr val="bg1"/>
+                </a:solidFill>
+              </a:rPr>
+              <a:t>Server-less pools</a:t>
+            </a:r>
+          </a:p>
+          <a:p>
+            <a:pPr marL="514350" indent="-514350">
+              <a:buFont typeface="+mj-lt"/>
+              <a:buAutoNum type="alphaLcParenR"/>
+              <a:defRPr/>
+            </a:pPr>
+            <a:r>
+              <a:rPr lang="en-US" dirty="0" smtClean="0">
+                <a:solidFill>
+                  <a:schemeClr val="bg1"/>
+                </a:solidFill>
+              </a:rPr>
+              <a:t>Purview: Data Dictionary &amp; Process Flows</a:t>
+            </a:r>
+            <a:endParaRPr lang="en-US" dirty="0">
+              <a:solidFill>
+                <a:schemeClr val="bg1"/>
+              </a:solidFill>
+            </a:endParaRPr>
+          </a:p>
+          <a:p>
+            <a:pPr marL="0" indent="0">
+              <a:buNone/>
+              <a:defRPr/>
+            </a:pPr>
+            <a:endParaRPr lang="en-US" dirty="0" smtClean="0">
+              <a:solidFill>
+                <a:schemeClr val="bg1"/>
+              </a:solidFill>
+            </a:endParaRPr>
+          </a:p>
+          <a:p>
+            <a:pPr marL="0" indent="0">
+              <a:buFont typeface="Arial" panose="020B0604020202020204" pitchFamily="34" charset="0"/>
+              <a:buNone/>
+            </a:pPr>
+            <a:endParaRPr lang="en-US" dirty="0">
+              <a:solidFill>
+                <a:schemeClr val="bg1"/>
+              </a:solidFill>
+            </a:endParaRPr>
+          </a:p>
+        </p:txBody>
+      </p:sp>
+    </p:spTree>
+    <p:extLst>
+      <p:ext uri="{BB962C8B-B14F-4D97-AF65-F5344CB8AC3E}">
+        <p14:creationId xmlns:p14="http://schemas.microsoft.com/office/powerpoint/2010/main" val="3632825499"/>
+      </p:ext>
+    </p:extLst>
+  </p:cSld>
+  <p:clrMapOvr>
+    <a:masterClrMapping/>
+  </p:clrMapOvr>
+</p:sld>
+</file>
+
+<file path=ppt/slides/slide24.xml><?xml version="1.0" encoding="utf-8"?>
+<p:sld xmlns:a="http://schemas.openxmlformats.org/drawingml/2006/main" xmlns:r="http://schemas.openxmlformats.org/officeDocument/2006/relationships" xmlns:p="http://schemas.openxmlformats.org/presentationml/2006/main">
+  <p:cSld>
+    <p:spTree>
+      <p:nvGrpSpPr>
+        <p:cNvPr id="1" name=""/>
+        <p:cNvGrpSpPr/>
+        <p:nvPr/>
+      </p:nvGrpSpPr>
+      <p:grpSpPr>
+        <a:xfrm>
+          <a:off x="0" y="0"/>
+          <a:ext cx="0" cy="0"/>
+          <a:chOff x="0" y="0"/>
+          <a:chExt cx="0" cy="0"/>
+        </a:xfrm>
+      </p:grpSpPr>
+      <p:sp>
+        <p:nvSpPr>
           <p:cNvPr id="2" name="Title 1">
             <a:extLst>
               <a:ext uri="{FF2B5EF4-FFF2-40B4-BE49-F238E27FC236}">
@@ -12329,7 +12896,7 @@
             <a:fld id="{00000000-1234-1234-1234-123412341234}" type="slidenum">
               <a:rPr lang="en-US" smtClean="0"/>
               <a:pPr/>
-              <a:t>20</a:t>
+              <a:t>24</a:t>
             </a:fld>
             <a:endParaRPr lang="en-US" dirty="0"/>
           </a:p>
@@ -12348,7 +12915,7 @@
 </p:sld>
 </file>
 
-<file path=ppt/slides/slide21.xml><?xml version="1.0" encoding="utf-8"?>
+<file path=ppt/slides/slide25.xml><?xml version="1.0" encoding="utf-8"?>
 <p:sld xmlns:a="http://schemas.openxmlformats.org/drawingml/2006/main" xmlns:r="http://schemas.openxmlformats.org/officeDocument/2006/relationships" xmlns:p="http://schemas.openxmlformats.org/presentationml/2006/main">
   <p:cSld>
     <p:spTree>
@@ -12727,7 +13294,7 @@
             <a:fld id="{00000000-1234-1234-1234-123412341234}" type="slidenum">
               <a:rPr lang="en-US" smtClean="0"/>
               <a:pPr/>
-              <a:t>21</a:t>
+              <a:t>25</a:t>
             </a:fld>
             <a:endParaRPr lang="en-US" dirty="0"/>
           </a:p>
@@ -12746,7 +13313,7 @@
 </p:sld>
 </file>
 
-<file path=ppt/slides/slide22.xml><?xml version="1.0" encoding="utf-8"?>
+<file path=ppt/slides/slide26.xml><?xml version="1.0" encoding="utf-8"?>
 <p:sld xmlns:a="http://schemas.openxmlformats.org/drawingml/2006/main" xmlns:r="http://schemas.openxmlformats.org/officeDocument/2006/relationships" xmlns:p="http://schemas.openxmlformats.org/presentationml/2006/main">
   <p:cSld>
     <p:spTree>
@@ -13460,7 +14027,7 @@
 </p:sld>
 </file>
 
-<file path=ppt/slides/slide23.xml><?xml version="1.0" encoding="utf-8"?>
+<file path=ppt/slides/slide27.xml><?xml version="1.0" encoding="utf-8"?>
 <p:sld xmlns:a="http://schemas.openxmlformats.org/drawingml/2006/main" xmlns:r="http://schemas.openxmlformats.org/officeDocument/2006/relationships" xmlns:p="http://schemas.openxmlformats.org/presentationml/2006/main">
   <p:cSld>
     <p:spTree>
@@ -13550,7 +14117,7 @@
 </p:sld>
 </file>
 
-<file path=ppt/slides/slide24.xml><?xml version="1.0" encoding="utf-8"?>
+<file path=ppt/slides/slide28.xml><?xml version="1.0" encoding="utf-8"?>
 <p:sld xmlns:a="http://schemas.openxmlformats.org/drawingml/2006/main" xmlns:r="http://schemas.openxmlformats.org/officeDocument/2006/relationships" xmlns:p="http://schemas.openxmlformats.org/presentationml/2006/main">
   <p:cSld>
     <p:spTree>
@@ -13591,7 +14158,7 @@
             <a:fld id="{00000000-1234-1234-1234-123412341234}" type="slidenum">
               <a:rPr lang="en-US" smtClean="0"/>
               <a:pPr/>
-              <a:t>24</a:t>
+              <a:t>28</a:t>
             </a:fld>
             <a:endParaRPr lang="en-US" sz="1300" dirty="0"/>
           </a:p>

</xml_diff>